<commit_message>
updated powerpoint, added ER diagram
</commit_message>
<xml_diff>
--- a/DBMS_PROJECT.pptx
+++ b/DBMS_PROJECT.pptx
@@ -10,7 +10,9 @@
     <p:sldId id="259" r:id="rId4"/>
     <p:sldId id="262" r:id="rId5"/>
     <p:sldId id="260" r:id="rId6"/>
-    <p:sldId id="261" r:id="rId7"/>
+    <p:sldId id="263" r:id="rId7"/>
+    <p:sldId id="264" r:id="rId8"/>
+    <p:sldId id="261" r:id="rId9"/>
   </p:sldIdLst>
   <p:sldSz cx="12192000" cy="6858000"/>
   <p:notesSz cx="6858000" cy="9144000"/>
@@ -109,6 +111,11 @@
       </a:defRPr>
     </a:lvl9pPr>
   </p:defaultTextStyle>
+  <p:extLst>
+    <p:ext uri="{EFAFB233-063F-42B5-8137-9DF3F51BA10A}">
+      <p15:sldGuideLst xmlns:p15="http://schemas.microsoft.com/office/powerpoint/2012/main"/>
+    </p:ext>
+  </p:extLst>
 </p:presentation>
 </file>
 
@@ -162,7 +169,7 @@
           <a:noFill/>
           <a:extLst>
             <a:ext uri="{909E8E84-426E-40dd-AFC4-6F175D3DCCD1}">
-              <a14:hiddenFill xmlns:a14="http://schemas.microsoft.com/office/drawing/2010/main" xmlns="">
+              <a14:hiddenFill xmlns="" xmlns:a14="http://schemas.microsoft.com/office/drawing/2010/main">
                 <a:solidFill>
                   <a:srgbClr val="FFFFFF"/>
                 </a:solidFill>
@@ -222,7 +229,7 @@
             </a:ln>
             <a:extLst>
               <a:ext uri="{91240B29-F687-4f45-9708-019B960494DF}">
-                <a14:hiddenLine xmlns:a14="http://schemas.microsoft.com/office/drawing/2010/main" xmlns="" w="9525">
+                <a14:hiddenLine xmlns="" xmlns:a14="http://schemas.microsoft.com/office/drawing/2010/main" w="9525">
                   <a:solidFill>
                     <a:srgbClr val="000000"/>
                   </a:solidFill>
@@ -312,7 +319,7 @@
             </a:ln>
             <a:extLst>
               <a:ext uri="{91240B29-F687-4f45-9708-019B960494DF}">
-                <a14:hiddenLine xmlns:a14="http://schemas.microsoft.com/office/drawing/2010/main" xmlns="" w="9525">
+                <a14:hiddenLine xmlns="" xmlns:a14="http://schemas.microsoft.com/office/drawing/2010/main" w="9525">
                   <a:solidFill>
                     <a:srgbClr val="000000"/>
                   </a:solidFill>
@@ -402,7 +409,7 @@
             </a:ln>
             <a:extLst>
               <a:ext uri="{91240B29-F687-4f45-9708-019B960494DF}">
-                <a14:hiddenLine xmlns:a14="http://schemas.microsoft.com/office/drawing/2010/main" xmlns="" w="9525">
+                <a14:hiddenLine xmlns="" xmlns:a14="http://schemas.microsoft.com/office/drawing/2010/main" w="9525">
                   <a:solidFill>
                     <a:srgbClr val="000000"/>
                   </a:solidFill>
@@ -436,7 +443,7 @@
             </a:ln>
             <a:extLst>
               <a:ext uri="{91240B29-F687-4f45-9708-019B960494DF}">
-                <a14:hiddenLine xmlns:a14="http://schemas.microsoft.com/office/drawing/2010/main" xmlns="" w="9525">
+                <a14:hiddenLine xmlns="" xmlns:a14="http://schemas.microsoft.com/office/drawing/2010/main" w="9525">
                   <a:solidFill>
                     <a:srgbClr val="000000"/>
                   </a:solidFill>
@@ -526,7 +533,7 @@
             </a:ln>
             <a:extLst>
               <a:ext uri="{91240B29-F687-4f45-9708-019B960494DF}">
-                <a14:hiddenLine xmlns:a14="http://schemas.microsoft.com/office/drawing/2010/main" xmlns="" w="9525">
+                <a14:hiddenLine xmlns="" xmlns:a14="http://schemas.microsoft.com/office/drawing/2010/main" w="9525">
                   <a:solidFill>
                     <a:srgbClr val="000000"/>
                   </a:solidFill>
@@ -588,7 +595,7 @@
             </a:ln>
             <a:extLst>
               <a:ext uri="{91240B29-F687-4f45-9708-019B960494DF}">
-                <a14:hiddenLine xmlns:a14="http://schemas.microsoft.com/office/drawing/2010/main" xmlns="" w="9525">
+                <a14:hiddenLine xmlns="" xmlns:a14="http://schemas.microsoft.com/office/drawing/2010/main" w="9525">
                   <a:solidFill>
                     <a:srgbClr val="000000"/>
                   </a:solidFill>
@@ -650,7 +657,7 @@
             </a:ln>
             <a:extLst>
               <a:ext uri="{91240B29-F687-4f45-9708-019B960494DF}">
-                <a14:hiddenLine xmlns:a14="http://schemas.microsoft.com/office/drawing/2010/main" xmlns="" w="9525">
+                <a14:hiddenLine xmlns="" xmlns:a14="http://schemas.microsoft.com/office/drawing/2010/main" w="9525">
                   <a:solidFill>
                     <a:srgbClr val="000000"/>
                   </a:solidFill>
@@ -740,7 +747,7 @@
             </a:ln>
             <a:extLst>
               <a:ext uri="{91240B29-F687-4f45-9708-019B960494DF}">
-                <a14:hiddenLine xmlns:a14="http://schemas.microsoft.com/office/drawing/2010/main" xmlns="" w="9525">
+                <a14:hiddenLine xmlns="" xmlns:a14="http://schemas.microsoft.com/office/drawing/2010/main" w="9525">
                   <a:solidFill>
                     <a:srgbClr val="000000"/>
                   </a:solidFill>
@@ -802,7 +809,7 @@
             </a:ln>
             <a:extLst>
               <a:ext uri="{91240B29-F687-4f45-9708-019B960494DF}">
-                <a14:hiddenLine xmlns:a14="http://schemas.microsoft.com/office/drawing/2010/main" xmlns="" w="9525">
+                <a14:hiddenLine xmlns="" xmlns:a14="http://schemas.microsoft.com/office/drawing/2010/main" w="9525">
                   <a:solidFill>
                     <a:srgbClr val="000000"/>
                   </a:solidFill>
@@ -864,7 +871,7 @@
             </a:ln>
             <a:extLst>
               <a:ext uri="{91240B29-F687-4f45-9708-019B960494DF}">
-                <a14:hiddenLine xmlns:a14="http://schemas.microsoft.com/office/drawing/2010/main" xmlns="" w="9525">
+                <a14:hiddenLine xmlns="" xmlns:a14="http://schemas.microsoft.com/office/drawing/2010/main" w="9525">
                   <a:solidFill>
                     <a:srgbClr val="000000"/>
                   </a:solidFill>
@@ -954,7 +961,7 @@
             </a:ln>
             <a:extLst>
               <a:ext uri="{91240B29-F687-4f45-9708-019B960494DF}">
-                <a14:hiddenLine xmlns:a14="http://schemas.microsoft.com/office/drawing/2010/main" xmlns="" w="9525">
+                <a14:hiddenLine xmlns="" xmlns:a14="http://schemas.microsoft.com/office/drawing/2010/main" w="9525">
                   <a:solidFill>
                     <a:srgbClr val="000000"/>
                   </a:solidFill>
@@ -1044,7 +1051,7 @@
             </a:ln>
             <a:extLst>
               <a:ext uri="{91240B29-F687-4f45-9708-019B960494DF}">
-                <a14:hiddenLine xmlns:a14="http://schemas.microsoft.com/office/drawing/2010/main" xmlns="" w="9525">
+                <a14:hiddenLine xmlns="" xmlns:a14="http://schemas.microsoft.com/office/drawing/2010/main" w="9525">
                   <a:solidFill>
                     <a:srgbClr val="000000"/>
                   </a:solidFill>
@@ -1106,7 +1113,7 @@
             </a:ln>
             <a:extLst>
               <a:ext uri="{91240B29-F687-4f45-9708-019B960494DF}">
-                <a14:hiddenLine xmlns:a14="http://schemas.microsoft.com/office/drawing/2010/main" xmlns="" w="9525">
+                <a14:hiddenLine xmlns="" xmlns:a14="http://schemas.microsoft.com/office/drawing/2010/main" w="9525">
                   <a:solidFill>
                     <a:srgbClr val="000000"/>
                   </a:solidFill>
@@ -1216,7 +1223,7 @@
             </a:ln>
             <a:extLst>
               <a:ext uri="{91240B29-F687-4f45-9708-019B960494DF}">
-                <a14:hiddenLine xmlns:a14="http://schemas.microsoft.com/office/drawing/2010/main" xmlns="" w="9525">
+                <a14:hiddenLine xmlns="" xmlns:a14="http://schemas.microsoft.com/office/drawing/2010/main" w="9525">
                   <a:solidFill>
                     <a:srgbClr val="000000"/>
                   </a:solidFill>
@@ -1278,7 +1285,7 @@
             </a:ln>
             <a:extLst>
               <a:ext uri="{91240B29-F687-4f45-9708-019B960494DF}">
-                <a14:hiddenLine xmlns:a14="http://schemas.microsoft.com/office/drawing/2010/main" xmlns="" w="9525">
+                <a14:hiddenLine xmlns="" xmlns:a14="http://schemas.microsoft.com/office/drawing/2010/main" w="9525">
                   <a:solidFill>
                     <a:srgbClr val="000000"/>
                   </a:solidFill>
@@ -1368,7 +1375,7 @@
             </a:ln>
             <a:extLst>
               <a:ext uri="{91240B29-F687-4f45-9708-019B960494DF}">
-                <a14:hiddenLine xmlns:a14="http://schemas.microsoft.com/office/drawing/2010/main" xmlns="" w="9525">
+                <a14:hiddenLine xmlns="" xmlns:a14="http://schemas.microsoft.com/office/drawing/2010/main" w="9525">
                   <a:solidFill>
                     <a:srgbClr val="000000"/>
                   </a:solidFill>
@@ -1458,7 +1465,7 @@
             </a:ln>
             <a:extLst>
               <a:ext uri="{91240B29-F687-4f45-9708-019B960494DF}">
-                <a14:hiddenLine xmlns:a14="http://schemas.microsoft.com/office/drawing/2010/main" xmlns="" w="9525">
+                <a14:hiddenLine xmlns="" xmlns:a14="http://schemas.microsoft.com/office/drawing/2010/main" w="9525">
                   <a:solidFill>
                     <a:srgbClr val="000000"/>
                   </a:solidFill>
@@ -1520,7 +1527,7 @@
             </a:ln>
             <a:extLst>
               <a:ext uri="{91240B29-F687-4f45-9708-019B960494DF}">
-                <a14:hiddenLine xmlns:a14="http://schemas.microsoft.com/office/drawing/2010/main" xmlns="" w="9525">
+                <a14:hiddenLine xmlns="" xmlns:a14="http://schemas.microsoft.com/office/drawing/2010/main" w="9525">
                   <a:solidFill>
                     <a:srgbClr val="000000"/>
                   </a:solidFill>
@@ -1610,7 +1617,7 @@
             </a:ln>
             <a:extLst>
               <a:ext uri="{91240B29-F687-4f45-9708-019B960494DF}">
-                <a14:hiddenLine xmlns:a14="http://schemas.microsoft.com/office/drawing/2010/main" xmlns="" w="9525">
+                <a14:hiddenLine xmlns="" xmlns:a14="http://schemas.microsoft.com/office/drawing/2010/main" w="9525">
                   <a:solidFill>
                     <a:srgbClr val="000000"/>
                   </a:solidFill>
@@ -1700,7 +1707,7 @@
             </a:ln>
             <a:extLst>
               <a:ext uri="{91240B29-F687-4f45-9708-019B960494DF}">
-                <a14:hiddenLine xmlns:a14="http://schemas.microsoft.com/office/drawing/2010/main" xmlns="" w="9525">
+                <a14:hiddenLine xmlns="" xmlns:a14="http://schemas.microsoft.com/office/drawing/2010/main" w="9525">
                   <a:solidFill>
                     <a:srgbClr val="000000"/>
                   </a:solidFill>
@@ -1756,7 +1763,7 @@
             </a:ln>
             <a:extLst>
               <a:ext uri="{91240B29-F687-4f45-9708-019B960494DF}">
-                <a14:hiddenLine xmlns:a14="http://schemas.microsoft.com/office/drawing/2010/main" xmlns="" w="9525">
+                <a14:hiddenLine xmlns="" xmlns:a14="http://schemas.microsoft.com/office/drawing/2010/main" w="9525">
                   <a:solidFill>
                     <a:srgbClr val="000000"/>
                   </a:solidFill>
@@ -1846,7 +1853,7 @@
             </a:ln>
             <a:extLst>
               <a:ext uri="{91240B29-F687-4f45-9708-019B960494DF}">
-                <a14:hiddenLine xmlns:a14="http://schemas.microsoft.com/office/drawing/2010/main" xmlns="" w="9525">
+                <a14:hiddenLine xmlns="" xmlns:a14="http://schemas.microsoft.com/office/drawing/2010/main" w="9525">
                   <a:solidFill>
                     <a:srgbClr val="000000"/>
                   </a:solidFill>
@@ -1902,7 +1909,7 @@
             </a:ln>
             <a:extLst>
               <a:ext uri="{91240B29-F687-4f45-9708-019B960494DF}">
-                <a14:hiddenLine xmlns:a14="http://schemas.microsoft.com/office/drawing/2010/main" xmlns="" w="9525">
+                <a14:hiddenLine xmlns="" xmlns:a14="http://schemas.microsoft.com/office/drawing/2010/main" w="9525">
                   <a:solidFill>
                     <a:srgbClr val="000000"/>
                   </a:solidFill>
@@ -1992,7 +1999,7 @@
             </a:ln>
             <a:extLst>
               <a:ext uri="{91240B29-F687-4f45-9708-019B960494DF}">
-                <a14:hiddenLine xmlns:a14="http://schemas.microsoft.com/office/drawing/2010/main" xmlns="" w="9525">
+                <a14:hiddenLine xmlns="" xmlns:a14="http://schemas.microsoft.com/office/drawing/2010/main" w="9525">
                   <a:solidFill>
                     <a:srgbClr val="000000"/>
                   </a:solidFill>
@@ -2060,7 +2067,7 @@
             </a:ln>
             <a:extLst>
               <a:ext uri="{91240B29-F687-4f45-9708-019B960494DF}">
-                <a14:hiddenLine xmlns:a14="http://schemas.microsoft.com/office/drawing/2010/main" xmlns="" w="9525">
+                <a14:hiddenLine xmlns="" xmlns:a14="http://schemas.microsoft.com/office/drawing/2010/main" w="9525">
                   <a:solidFill>
                     <a:srgbClr val="000000"/>
                   </a:solidFill>
@@ -2150,7 +2157,7 @@
             </a:ln>
             <a:extLst>
               <a:ext uri="{91240B29-F687-4f45-9708-019B960494DF}">
-                <a14:hiddenLine xmlns:a14="http://schemas.microsoft.com/office/drawing/2010/main" xmlns="" w="9525">
+                <a14:hiddenLine xmlns="" xmlns:a14="http://schemas.microsoft.com/office/drawing/2010/main" w="9525">
                   <a:solidFill>
                     <a:srgbClr val="000000"/>
                   </a:solidFill>
@@ -2218,7 +2225,7 @@
             </a:ln>
             <a:extLst>
               <a:ext uri="{91240B29-F687-4f45-9708-019B960494DF}">
-                <a14:hiddenLine xmlns:a14="http://schemas.microsoft.com/office/drawing/2010/main" xmlns="" w="9525">
+                <a14:hiddenLine xmlns="" xmlns:a14="http://schemas.microsoft.com/office/drawing/2010/main" w="9525">
                   <a:solidFill>
                     <a:srgbClr val="000000"/>
                   </a:solidFill>
@@ -2308,7 +2315,7 @@
             </a:ln>
             <a:extLst>
               <a:ext uri="{91240B29-F687-4f45-9708-019B960494DF}">
-                <a14:hiddenLine xmlns:a14="http://schemas.microsoft.com/office/drawing/2010/main" xmlns="" w="9525">
+                <a14:hiddenLine xmlns="" xmlns:a14="http://schemas.microsoft.com/office/drawing/2010/main" w="9525">
                   <a:solidFill>
                     <a:srgbClr val="000000"/>
                   </a:solidFill>
@@ -2342,7 +2349,7 @@
             </a:ln>
             <a:extLst>
               <a:ext uri="{91240B29-F687-4f45-9708-019B960494DF}">
-                <a14:hiddenLine xmlns:a14="http://schemas.microsoft.com/office/drawing/2010/main" xmlns="" w="9525">
+                <a14:hiddenLine xmlns="" xmlns:a14="http://schemas.microsoft.com/office/drawing/2010/main" w="9525">
                   <a:solidFill>
                     <a:srgbClr val="000000"/>
                   </a:solidFill>
@@ -2432,7 +2439,7 @@
             </a:ln>
             <a:extLst>
               <a:ext uri="{91240B29-F687-4f45-9708-019B960494DF}">
-                <a14:hiddenLine xmlns:a14="http://schemas.microsoft.com/office/drawing/2010/main" xmlns="" w="9525">
+                <a14:hiddenLine xmlns="" xmlns:a14="http://schemas.microsoft.com/office/drawing/2010/main" w="9525">
                   <a:solidFill>
                     <a:srgbClr val="000000"/>
                   </a:solidFill>
@@ -2494,7 +2501,7 @@
             </a:ln>
             <a:extLst>
               <a:ext uri="{91240B29-F687-4f45-9708-019B960494DF}">
-                <a14:hiddenLine xmlns:a14="http://schemas.microsoft.com/office/drawing/2010/main" xmlns="" w="9525">
+                <a14:hiddenLine xmlns="" xmlns:a14="http://schemas.microsoft.com/office/drawing/2010/main" w="9525">
                   <a:solidFill>
                     <a:srgbClr val="000000"/>
                   </a:solidFill>
@@ -2556,7 +2563,7 @@
             </a:ln>
             <a:extLst>
               <a:ext uri="{91240B29-F687-4f45-9708-019B960494DF}">
-                <a14:hiddenLine xmlns:a14="http://schemas.microsoft.com/office/drawing/2010/main" xmlns="" w="9525">
+                <a14:hiddenLine xmlns="" xmlns:a14="http://schemas.microsoft.com/office/drawing/2010/main" w="9525">
                   <a:solidFill>
                     <a:srgbClr val="000000"/>
                   </a:solidFill>
@@ -2646,7 +2653,7 @@
             </a:ln>
             <a:extLst>
               <a:ext uri="{91240B29-F687-4f45-9708-019B960494DF}">
-                <a14:hiddenLine xmlns:a14="http://schemas.microsoft.com/office/drawing/2010/main" xmlns="" w="9525">
+                <a14:hiddenLine xmlns="" xmlns:a14="http://schemas.microsoft.com/office/drawing/2010/main" w="9525">
                   <a:solidFill>
                     <a:srgbClr val="000000"/>
                   </a:solidFill>
@@ -2714,7 +2721,7 @@
             </a:ln>
             <a:extLst>
               <a:ext uri="{91240B29-F687-4f45-9708-019B960494DF}">
-                <a14:hiddenLine xmlns:a14="http://schemas.microsoft.com/office/drawing/2010/main" xmlns="" w="9525">
+                <a14:hiddenLine xmlns="" xmlns:a14="http://schemas.microsoft.com/office/drawing/2010/main" w="9525">
                   <a:solidFill>
                     <a:srgbClr val="000000"/>
                   </a:solidFill>
@@ -2776,7 +2783,7 @@
             </a:ln>
             <a:extLst>
               <a:ext uri="{91240B29-F687-4f45-9708-019B960494DF}">
-                <a14:hiddenLine xmlns:a14="http://schemas.microsoft.com/office/drawing/2010/main" xmlns="" w="9525">
+                <a14:hiddenLine xmlns="" xmlns:a14="http://schemas.microsoft.com/office/drawing/2010/main" w="9525">
                   <a:solidFill>
                     <a:srgbClr val="000000"/>
                   </a:solidFill>
@@ -2866,7 +2873,7 @@
             </a:ln>
             <a:extLst>
               <a:ext uri="{91240B29-F687-4f45-9708-019B960494DF}">
-                <a14:hiddenLine xmlns:a14="http://schemas.microsoft.com/office/drawing/2010/main" xmlns="" w="9525">
+                <a14:hiddenLine xmlns="" xmlns:a14="http://schemas.microsoft.com/office/drawing/2010/main" w="9525">
                   <a:solidFill>
                     <a:srgbClr val="000000"/>
                   </a:solidFill>
@@ -2928,7 +2935,7 @@
             </a:ln>
             <a:extLst>
               <a:ext uri="{91240B29-F687-4f45-9708-019B960494DF}">
-                <a14:hiddenLine xmlns:a14="http://schemas.microsoft.com/office/drawing/2010/main" xmlns="" w="9525">
+                <a14:hiddenLine xmlns="" xmlns:a14="http://schemas.microsoft.com/office/drawing/2010/main" w="9525">
                   <a:solidFill>
                     <a:srgbClr val="000000"/>
                   </a:solidFill>
@@ -3018,7 +3025,7 @@
             </a:ln>
             <a:extLst>
               <a:ext uri="{91240B29-F687-4f45-9708-019B960494DF}">
-                <a14:hiddenLine xmlns:a14="http://schemas.microsoft.com/office/drawing/2010/main" xmlns="" w="9525">
+                <a14:hiddenLine xmlns="" xmlns:a14="http://schemas.microsoft.com/office/drawing/2010/main" w="9525">
                   <a:solidFill>
                     <a:srgbClr val="000000"/>
                   </a:solidFill>
@@ -3080,7 +3087,7 @@
             </a:ln>
             <a:extLst>
               <a:ext uri="{91240B29-F687-4f45-9708-019B960494DF}">
-                <a14:hiddenLine xmlns:a14="http://schemas.microsoft.com/office/drawing/2010/main" xmlns="" w="9525">
+                <a14:hiddenLine xmlns="" xmlns:a14="http://schemas.microsoft.com/office/drawing/2010/main" w="9525">
                   <a:solidFill>
                     <a:srgbClr val="000000"/>
                   </a:solidFill>
@@ -3170,7 +3177,7 @@
             </a:ln>
             <a:extLst>
               <a:ext uri="{91240B29-F687-4f45-9708-019B960494DF}">
-                <a14:hiddenLine xmlns:a14="http://schemas.microsoft.com/office/drawing/2010/main" xmlns="" w="9525">
+                <a14:hiddenLine xmlns="" xmlns:a14="http://schemas.microsoft.com/office/drawing/2010/main" w="9525">
                   <a:solidFill>
                     <a:srgbClr val="000000"/>
                   </a:solidFill>
@@ -3204,7 +3211,7 @@
             </a:ln>
             <a:extLst>
               <a:ext uri="{91240B29-F687-4f45-9708-019B960494DF}">
-                <a14:hiddenLine xmlns:a14="http://schemas.microsoft.com/office/drawing/2010/main" xmlns="" w="9525">
+                <a14:hiddenLine xmlns="" xmlns:a14="http://schemas.microsoft.com/office/drawing/2010/main" w="9525">
                   <a:solidFill>
                     <a:srgbClr val="000000"/>
                   </a:solidFill>
@@ -3269,7 +3276,7 @@
             </a:ln>
             <a:extLst>
               <a:ext uri="{91240B29-F687-4f45-9708-019B960494DF}">
-                <a14:hiddenLine xmlns:a14="http://schemas.microsoft.com/office/drawing/2010/main" xmlns="" w="9525">
+                <a14:hiddenLine xmlns="" xmlns:a14="http://schemas.microsoft.com/office/drawing/2010/main" w="9525">
                   <a:solidFill>
                     <a:srgbClr val="000000"/>
                   </a:solidFill>
@@ -3359,7 +3366,7 @@
             </a:ln>
             <a:extLst>
               <a:ext uri="{91240B29-F687-4f45-9708-019B960494DF}">
-                <a14:hiddenLine xmlns:a14="http://schemas.microsoft.com/office/drawing/2010/main" xmlns="" w="9525">
+                <a14:hiddenLine xmlns="" xmlns:a14="http://schemas.microsoft.com/office/drawing/2010/main" w="9525">
                   <a:solidFill>
                     <a:srgbClr val="000000"/>
                   </a:solidFill>
@@ -3421,7 +3428,7 @@
             </a:ln>
             <a:extLst>
               <a:ext uri="{91240B29-F687-4f45-9708-019B960494DF}">
-                <a14:hiddenLine xmlns:a14="http://schemas.microsoft.com/office/drawing/2010/main" xmlns="" w="9525">
+                <a14:hiddenLine xmlns="" xmlns:a14="http://schemas.microsoft.com/office/drawing/2010/main" w="9525">
                   <a:solidFill>
                     <a:srgbClr val="000000"/>
                   </a:solidFill>
@@ -3511,7 +3518,7 @@
             </a:ln>
             <a:extLst>
               <a:ext uri="{91240B29-F687-4f45-9708-019B960494DF}">
-                <a14:hiddenLine xmlns:a14="http://schemas.microsoft.com/office/drawing/2010/main" xmlns="" w="9525">
+                <a14:hiddenLine xmlns="" xmlns:a14="http://schemas.microsoft.com/office/drawing/2010/main" w="9525">
                   <a:solidFill>
                     <a:srgbClr val="000000"/>
                   </a:solidFill>
@@ -3601,7 +3608,7 @@
             </a:ln>
             <a:extLst>
               <a:ext uri="{91240B29-F687-4f45-9708-019B960494DF}">
-                <a14:hiddenLine xmlns:a14="http://schemas.microsoft.com/office/drawing/2010/main" xmlns="" w="9525">
+                <a14:hiddenLine xmlns="" xmlns:a14="http://schemas.microsoft.com/office/drawing/2010/main" w="9525">
                   <a:solidFill>
                     <a:srgbClr val="000000"/>
                   </a:solidFill>
@@ -3666,7 +3673,7 @@
             </a:ln>
             <a:extLst>
               <a:ext uri="{91240B29-F687-4f45-9708-019B960494DF}">
-                <a14:hiddenLine xmlns:a14="http://schemas.microsoft.com/office/drawing/2010/main" xmlns="" w="9525">
+                <a14:hiddenLine xmlns="" xmlns:a14="http://schemas.microsoft.com/office/drawing/2010/main" w="9525">
                   <a:solidFill>
                     <a:srgbClr val="000000"/>
                   </a:solidFill>
@@ -3728,7 +3735,7 @@
             </a:ln>
             <a:extLst>
               <a:ext uri="{91240B29-F687-4f45-9708-019B960494DF}">
-                <a14:hiddenLine xmlns:a14="http://schemas.microsoft.com/office/drawing/2010/main" xmlns="" w="9525">
+                <a14:hiddenLine xmlns="" xmlns:a14="http://schemas.microsoft.com/office/drawing/2010/main" w="9525">
                   <a:solidFill>
                     <a:srgbClr val="000000"/>
                   </a:solidFill>
@@ -3818,7 +3825,7 @@
             </a:ln>
             <a:extLst>
               <a:ext uri="{91240B29-F687-4f45-9708-019B960494DF}">
-                <a14:hiddenLine xmlns:a14="http://schemas.microsoft.com/office/drawing/2010/main" xmlns="" w="9525">
+                <a14:hiddenLine xmlns="" xmlns:a14="http://schemas.microsoft.com/office/drawing/2010/main" w="9525">
                   <a:solidFill>
                     <a:srgbClr val="000000"/>
                   </a:solidFill>
@@ -3908,7 +3915,7 @@
             </a:ln>
             <a:extLst>
               <a:ext uri="{91240B29-F687-4f45-9708-019B960494DF}">
-                <a14:hiddenLine xmlns:a14="http://schemas.microsoft.com/office/drawing/2010/main" xmlns="" w="9525">
+                <a14:hiddenLine xmlns="" xmlns:a14="http://schemas.microsoft.com/office/drawing/2010/main" w="9525">
                   <a:solidFill>
                     <a:srgbClr val="000000"/>
                   </a:solidFill>
@@ -3970,7 +3977,7 @@
             </a:ln>
             <a:extLst>
               <a:ext uri="{91240B29-F687-4f45-9708-019B960494DF}">
-                <a14:hiddenLine xmlns:a14="http://schemas.microsoft.com/office/drawing/2010/main" xmlns="" w="9525">
+                <a14:hiddenLine xmlns="" xmlns:a14="http://schemas.microsoft.com/office/drawing/2010/main" w="9525">
                   <a:solidFill>
                     <a:srgbClr val="000000"/>
                   </a:solidFill>
@@ -4090,7 +4097,7 @@
             </a:ln>
             <a:extLst>
               <a:ext uri="{91240B29-F687-4f45-9708-019B960494DF}">
-                <a14:hiddenLine xmlns:a14="http://schemas.microsoft.com/office/drawing/2010/main" xmlns="" w="9525">
+                <a14:hiddenLine xmlns="" xmlns:a14="http://schemas.microsoft.com/office/drawing/2010/main" w="9525">
                   <a:solidFill>
                     <a:srgbClr val="000000"/>
                   </a:solidFill>
@@ -4158,7 +4165,7 @@
             </a:ln>
             <a:extLst>
               <a:ext uri="{91240B29-F687-4f45-9708-019B960494DF}">
-                <a14:hiddenLine xmlns:a14="http://schemas.microsoft.com/office/drawing/2010/main" xmlns="" w="9525">
+                <a14:hiddenLine xmlns="" xmlns:a14="http://schemas.microsoft.com/office/drawing/2010/main" w="9525">
                   <a:solidFill>
                     <a:srgbClr val="000000"/>
                   </a:solidFill>
@@ -4248,7 +4255,7 @@
             </a:ln>
             <a:extLst>
               <a:ext uri="{91240B29-F687-4f45-9708-019B960494DF}">
-                <a14:hiddenLine xmlns:a14="http://schemas.microsoft.com/office/drawing/2010/main" xmlns="" w="9525">
+                <a14:hiddenLine xmlns="" xmlns:a14="http://schemas.microsoft.com/office/drawing/2010/main" w="9525">
                   <a:solidFill>
                     <a:srgbClr val="000000"/>
                   </a:solidFill>
@@ -4388,7 +4395,7 @@
           <a:p>
             <a:fld id="{F87B3B20-FBE3-4704-A244-A865425B53EA}" type="datetimeFigureOut">
               <a:rPr lang="en-US" smtClean="0"/>
-              <a:t>12/1/2024</a:t>
+              <a:t>12/2/24</a:t>
             </a:fld>
             <a:endParaRPr lang="en-US"/>
           </a:p>
@@ -4655,7 +4662,7 @@
           <a:p>
             <a:fld id="{F87B3B20-FBE3-4704-A244-A865425B53EA}" type="datetimeFigureOut">
               <a:rPr lang="en-US" smtClean="0"/>
-              <a:t>12/1/2024</a:t>
+              <a:t>12/2/24</a:t>
             </a:fld>
             <a:endParaRPr lang="en-US"/>
           </a:p>
@@ -4851,7 +4858,7 @@
           <a:p>
             <a:fld id="{F87B3B20-FBE3-4704-A244-A865425B53EA}" type="datetimeFigureOut">
               <a:rPr lang="en-US" smtClean="0"/>
-              <a:t>12/1/2024</a:t>
+              <a:t>12/2/24</a:t>
             </a:fld>
             <a:endParaRPr lang="en-US"/>
           </a:p>
@@ -5114,7 +5121,7 @@
           <a:p>
             <a:fld id="{F87B3B20-FBE3-4704-A244-A865425B53EA}" type="datetimeFigureOut">
               <a:rPr lang="en-US" smtClean="0"/>
-              <a:t>12/1/2024</a:t>
+              <a:t>12/2/24</a:t>
             </a:fld>
             <a:endParaRPr lang="en-US"/>
           </a:p>
@@ -5548,7 +5555,7 @@
           <a:p>
             <a:fld id="{F87B3B20-FBE3-4704-A244-A865425B53EA}" type="datetimeFigureOut">
               <a:rPr lang="en-US" smtClean="0"/>
-              <a:t>12/1/2024</a:t>
+              <a:t>12/2/24</a:t>
             </a:fld>
             <a:endParaRPr lang="en-US"/>
           </a:p>
@@ -6094,7 +6101,7 @@
           <a:p>
             <a:fld id="{F87B3B20-FBE3-4704-A244-A865425B53EA}" type="datetimeFigureOut">
               <a:rPr lang="en-US" smtClean="0"/>
-              <a:t>12/1/2024</a:t>
+              <a:t>12/2/24</a:t>
             </a:fld>
             <a:endParaRPr lang="en-US"/>
           </a:p>
@@ -6814,7 +6821,7 @@
           <a:p>
             <a:fld id="{F87B3B20-FBE3-4704-A244-A865425B53EA}" type="datetimeFigureOut">
               <a:rPr lang="en-US" smtClean="0"/>
-              <a:t>12/1/2024</a:t>
+              <a:t>12/2/24</a:t>
             </a:fld>
             <a:endParaRPr lang="en-US"/>
           </a:p>
@@ -6984,7 +6991,7 @@
           <a:p>
             <a:fld id="{F87B3B20-FBE3-4704-A244-A865425B53EA}" type="datetimeFigureOut">
               <a:rPr lang="en-US" smtClean="0"/>
-              <a:t>12/1/2024</a:t>
+              <a:t>12/2/24</a:t>
             </a:fld>
             <a:endParaRPr lang="en-US"/>
           </a:p>
@@ -7164,7 +7171,7 @@
           <a:p>
             <a:fld id="{F87B3B20-FBE3-4704-A244-A865425B53EA}" type="datetimeFigureOut">
               <a:rPr lang="en-US" smtClean="0"/>
-              <a:t>12/1/2024</a:t>
+              <a:t>12/2/24</a:t>
             </a:fld>
             <a:endParaRPr lang="en-US"/>
           </a:p>
@@ -7334,7 +7341,7 @@
           <a:p>
             <a:fld id="{F87B3B20-FBE3-4704-A244-A865425B53EA}" type="datetimeFigureOut">
               <a:rPr lang="en-US" smtClean="0"/>
-              <a:t>12/1/2024</a:t>
+              <a:t>12/2/24</a:t>
             </a:fld>
             <a:endParaRPr lang="en-US"/>
           </a:p>
@@ -7584,7 +7591,7 @@
           <a:p>
             <a:fld id="{F87B3B20-FBE3-4704-A244-A865425B53EA}" type="datetimeFigureOut">
               <a:rPr lang="en-US" smtClean="0"/>
-              <a:t>12/1/2024</a:t>
+              <a:t>12/2/24</a:t>
             </a:fld>
             <a:endParaRPr lang="en-US"/>
           </a:p>
@@ -7816,7 +7823,7 @@
           <a:p>
             <a:fld id="{F87B3B20-FBE3-4704-A244-A865425B53EA}" type="datetimeFigureOut">
               <a:rPr lang="en-US" smtClean="0"/>
-              <a:t>12/1/2024</a:t>
+              <a:t>12/2/24</a:t>
             </a:fld>
             <a:endParaRPr lang="en-US"/>
           </a:p>
@@ -8197,7 +8204,7 @@
           <a:p>
             <a:fld id="{F87B3B20-FBE3-4704-A244-A865425B53EA}" type="datetimeFigureOut">
               <a:rPr lang="en-US" smtClean="0"/>
-              <a:t>12/1/2024</a:t>
+              <a:t>12/2/24</a:t>
             </a:fld>
             <a:endParaRPr lang="en-US"/>
           </a:p>
@@ -8315,7 +8322,7 @@
           <a:p>
             <a:fld id="{F87B3B20-FBE3-4704-A244-A865425B53EA}" type="datetimeFigureOut">
               <a:rPr lang="en-US" smtClean="0"/>
-              <a:t>12/1/2024</a:t>
+              <a:t>12/2/24</a:t>
             </a:fld>
             <a:endParaRPr lang="en-US"/>
           </a:p>
@@ -8410,7 +8417,7 @@
           <a:p>
             <a:fld id="{F87B3B20-FBE3-4704-A244-A865425B53EA}" type="datetimeFigureOut">
               <a:rPr lang="en-US" smtClean="0"/>
-              <a:t>12/1/2024</a:t>
+              <a:t>12/2/24</a:t>
             </a:fld>
             <a:endParaRPr lang="en-US"/>
           </a:p>
@@ -8659,7 +8666,7 @@
           <a:p>
             <a:fld id="{F87B3B20-FBE3-4704-A244-A865425B53EA}" type="datetimeFigureOut">
               <a:rPr lang="en-US" smtClean="0"/>
-              <a:t>12/1/2024</a:t>
+              <a:t>12/2/24</a:t>
             </a:fld>
             <a:endParaRPr lang="en-US"/>
           </a:p>
@@ -8939,7 +8946,7 @@
           <a:p>
             <a:fld id="{F87B3B20-FBE3-4704-A244-A865425B53EA}" type="datetimeFigureOut">
               <a:rPr lang="en-US" smtClean="0"/>
-              <a:t>12/1/2024</a:t>
+              <a:t>12/2/24</a:t>
             </a:fld>
             <a:endParaRPr lang="en-US"/>
           </a:p>
@@ -9055,7 +9062,7 @@
           <a:noFill/>
           <a:extLst>
             <a:ext uri="{909E8E84-426E-40dd-AFC4-6F175D3DCCD1}">
-              <a14:hiddenFill xmlns:a14="http://schemas.microsoft.com/office/drawing/2010/main" xmlns="">
+              <a14:hiddenFill xmlns="" xmlns:a14="http://schemas.microsoft.com/office/drawing/2010/main">
                 <a:solidFill>
                   <a:srgbClr val="FFFFFF"/>
                 </a:solidFill>
@@ -9129,7 +9136,7 @@
               </a:ln>
               <a:extLst>
                 <a:ext uri="{91240B29-F687-4f45-9708-019B960494DF}">
-                  <a14:hiddenLine xmlns:a14="http://schemas.microsoft.com/office/drawing/2010/main" xmlns="" w="9525">
+                  <a14:hiddenLine xmlns="" xmlns:a14="http://schemas.microsoft.com/office/drawing/2010/main" w="9525">
                     <a:solidFill>
                       <a:srgbClr val="000000"/>
                     </a:solidFill>
@@ -9219,7 +9226,7 @@
               </a:ln>
               <a:extLst>
                 <a:ext uri="{91240B29-F687-4f45-9708-019B960494DF}">
-                  <a14:hiddenLine xmlns:a14="http://schemas.microsoft.com/office/drawing/2010/main" xmlns="" w="9525">
+                  <a14:hiddenLine xmlns="" xmlns:a14="http://schemas.microsoft.com/office/drawing/2010/main" w="9525">
                     <a:solidFill>
                       <a:srgbClr val="000000"/>
                     </a:solidFill>
@@ -9309,7 +9316,7 @@
               </a:ln>
               <a:extLst>
                 <a:ext uri="{91240B29-F687-4f45-9708-019B960494DF}">
-                  <a14:hiddenLine xmlns:a14="http://schemas.microsoft.com/office/drawing/2010/main" xmlns="" w="9525">
+                  <a14:hiddenLine xmlns="" xmlns:a14="http://schemas.microsoft.com/office/drawing/2010/main" w="9525">
                     <a:solidFill>
                       <a:srgbClr val="000000"/>
                     </a:solidFill>
@@ -9371,7 +9378,7 @@
               </a:ln>
               <a:extLst>
                 <a:ext uri="{91240B29-F687-4f45-9708-019B960494DF}">
-                  <a14:hiddenLine xmlns:a14="http://schemas.microsoft.com/office/drawing/2010/main" xmlns="" w="9525">
+                  <a14:hiddenLine xmlns="" xmlns:a14="http://schemas.microsoft.com/office/drawing/2010/main" w="9525">
                     <a:solidFill>
                       <a:srgbClr val="000000"/>
                     </a:solidFill>
@@ -9461,7 +9468,7 @@
               </a:ln>
               <a:extLst>
                 <a:ext uri="{91240B29-F687-4f45-9708-019B960494DF}">
-                  <a14:hiddenLine xmlns:a14="http://schemas.microsoft.com/office/drawing/2010/main" xmlns="" w="9525">
+                  <a14:hiddenLine xmlns="" xmlns:a14="http://schemas.microsoft.com/office/drawing/2010/main" w="9525">
                     <a:solidFill>
                       <a:srgbClr val="000000"/>
                     </a:solidFill>
@@ -9523,7 +9530,7 @@
               </a:ln>
               <a:extLst>
                 <a:ext uri="{91240B29-F687-4f45-9708-019B960494DF}">
-                  <a14:hiddenLine xmlns:a14="http://schemas.microsoft.com/office/drawing/2010/main" xmlns="" w="9525">
+                  <a14:hiddenLine xmlns="" xmlns:a14="http://schemas.microsoft.com/office/drawing/2010/main" w="9525">
                     <a:solidFill>
                       <a:srgbClr val="000000"/>
                     </a:solidFill>
@@ -9585,7 +9592,7 @@
               </a:ln>
               <a:extLst>
                 <a:ext uri="{91240B29-F687-4f45-9708-019B960494DF}">
-                  <a14:hiddenLine xmlns:a14="http://schemas.microsoft.com/office/drawing/2010/main" xmlns="" w="9525">
+                  <a14:hiddenLine xmlns="" xmlns:a14="http://schemas.microsoft.com/office/drawing/2010/main" w="9525">
                     <a:solidFill>
                       <a:srgbClr val="000000"/>
                     </a:solidFill>
@@ -9675,7 +9682,7 @@
               </a:ln>
               <a:extLst>
                 <a:ext uri="{91240B29-F687-4f45-9708-019B960494DF}">
-                  <a14:hiddenLine xmlns:a14="http://schemas.microsoft.com/office/drawing/2010/main" xmlns="" w="9525">
+                  <a14:hiddenLine xmlns="" xmlns:a14="http://schemas.microsoft.com/office/drawing/2010/main" w="9525">
                     <a:solidFill>
                       <a:srgbClr val="000000"/>
                     </a:solidFill>
@@ -9765,7 +9772,7 @@
               </a:ln>
               <a:extLst>
                 <a:ext uri="{91240B29-F687-4f45-9708-019B960494DF}">
-                  <a14:hiddenLine xmlns:a14="http://schemas.microsoft.com/office/drawing/2010/main" xmlns="" w="9525">
+                  <a14:hiddenLine xmlns="" xmlns:a14="http://schemas.microsoft.com/office/drawing/2010/main" w="9525">
                     <a:solidFill>
                       <a:srgbClr val="000000"/>
                     </a:solidFill>
@@ -9827,7 +9834,7 @@
               </a:ln>
               <a:extLst>
                 <a:ext uri="{91240B29-F687-4f45-9708-019B960494DF}">
-                  <a14:hiddenLine xmlns:a14="http://schemas.microsoft.com/office/drawing/2010/main" xmlns="" w="9525">
+                  <a14:hiddenLine xmlns="" xmlns:a14="http://schemas.microsoft.com/office/drawing/2010/main" w="9525">
                     <a:solidFill>
                       <a:srgbClr val="000000"/>
                     </a:solidFill>
@@ -9937,7 +9944,7 @@
               </a:ln>
               <a:extLst>
                 <a:ext uri="{91240B29-F687-4f45-9708-019B960494DF}">
-                  <a14:hiddenLine xmlns:a14="http://schemas.microsoft.com/office/drawing/2010/main" xmlns="" w="9525">
+                  <a14:hiddenLine xmlns="" xmlns:a14="http://schemas.microsoft.com/office/drawing/2010/main" w="9525">
                     <a:solidFill>
                       <a:srgbClr val="000000"/>
                     </a:solidFill>
@@ -10021,7 +10028,7 @@
               </a:ln>
               <a:extLst>
                 <a:ext uri="{91240B29-F687-4f45-9708-019B960494DF}">
-                  <a14:hiddenLine xmlns:a14="http://schemas.microsoft.com/office/drawing/2010/main" xmlns="" w="9525">
+                  <a14:hiddenLine xmlns="" xmlns:a14="http://schemas.microsoft.com/office/drawing/2010/main" w="9525">
                     <a:solidFill>
                       <a:srgbClr val="000000"/>
                     </a:solidFill>
@@ -10083,7 +10090,7 @@
               </a:ln>
               <a:extLst>
                 <a:ext uri="{91240B29-F687-4f45-9708-019B960494DF}">
-                  <a14:hiddenLine xmlns:a14="http://schemas.microsoft.com/office/drawing/2010/main" xmlns="" w="9525">
+                  <a14:hiddenLine xmlns="" xmlns:a14="http://schemas.microsoft.com/office/drawing/2010/main" w="9525">
                     <a:solidFill>
                       <a:srgbClr val="000000"/>
                     </a:solidFill>
@@ -10145,7 +10152,7 @@
               </a:ln>
               <a:extLst>
                 <a:ext uri="{91240B29-F687-4f45-9708-019B960494DF}">
-                  <a14:hiddenLine xmlns:a14="http://schemas.microsoft.com/office/drawing/2010/main" xmlns="" w="9525">
+                  <a14:hiddenLine xmlns="" xmlns:a14="http://schemas.microsoft.com/office/drawing/2010/main" w="9525">
                     <a:solidFill>
                       <a:srgbClr val="000000"/>
                     </a:solidFill>
@@ -10235,7 +10242,7 @@
               </a:ln>
               <a:extLst>
                 <a:ext uri="{91240B29-F687-4f45-9708-019B960494DF}">
-                  <a14:hiddenLine xmlns:a14="http://schemas.microsoft.com/office/drawing/2010/main" xmlns="" w="9525">
+                  <a14:hiddenLine xmlns="" xmlns:a14="http://schemas.microsoft.com/office/drawing/2010/main" w="9525">
                     <a:solidFill>
                       <a:srgbClr val="000000"/>
                     </a:solidFill>
@@ -10269,7 +10276,7 @@
               </a:ln>
               <a:extLst>
                 <a:ext uri="{91240B29-F687-4f45-9708-019B960494DF}">
-                  <a14:hiddenLine xmlns:a14="http://schemas.microsoft.com/office/drawing/2010/main" xmlns="" w="9525">
+                  <a14:hiddenLine xmlns="" xmlns:a14="http://schemas.microsoft.com/office/drawing/2010/main" w="9525">
                     <a:solidFill>
                       <a:srgbClr val="000000"/>
                     </a:solidFill>
@@ -10334,7 +10341,7 @@
               </a:ln>
               <a:extLst>
                 <a:ext uri="{91240B29-F687-4f45-9708-019B960494DF}">
-                  <a14:hiddenLine xmlns:a14="http://schemas.microsoft.com/office/drawing/2010/main" xmlns="" w="9525">
+                  <a14:hiddenLine xmlns="" xmlns:a14="http://schemas.microsoft.com/office/drawing/2010/main" w="9525">
                     <a:solidFill>
                       <a:srgbClr val="000000"/>
                     </a:solidFill>
@@ -10424,7 +10431,7 @@
               </a:ln>
               <a:extLst>
                 <a:ext uri="{91240B29-F687-4f45-9708-019B960494DF}">
-                  <a14:hiddenLine xmlns:a14="http://schemas.microsoft.com/office/drawing/2010/main" xmlns="" w="9525">
+                  <a14:hiddenLine xmlns="" xmlns:a14="http://schemas.microsoft.com/office/drawing/2010/main" w="9525">
                     <a:solidFill>
                       <a:srgbClr val="000000"/>
                     </a:solidFill>
@@ -10486,7 +10493,7 @@
               </a:ln>
               <a:extLst>
                 <a:ext uri="{91240B29-F687-4f45-9708-019B960494DF}">
-                  <a14:hiddenLine xmlns:a14="http://schemas.microsoft.com/office/drawing/2010/main" xmlns="" w="9525">
+                  <a14:hiddenLine xmlns="" xmlns:a14="http://schemas.microsoft.com/office/drawing/2010/main" w="9525">
                     <a:solidFill>
                       <a:srgbClr val="000000"/>
                     </a:solidFill>
@@ -10576,7 +10583,7 @@
               </a:ln>
               <a:extLst>
                 <a:ext uri="{91240B29-F687-4f45-9708-019B960494DF}">
-                  <a14:hiddenLine xmlns:a14="http://schemas.microsoft.com/office/drawing/2010/main" xmlns="" w="9525">
+                  <a14:hiddenLine xmlns="" xmlns:a14="http://schemas.microsoft.com/office/drawing/2010/main" w="9525">
                     <a:solidFill>
                       <a:srgbClr val="000000"/>
                     </a:solidFill>
@@ -10641,7 +10648,7 @@
               </a:ln>
               <a:extLst>
                 <a:ext uri="{91240B29-F687-4f45-9708-019B960494DF}">
-                  <a14:hiddenLine xmlns:a14="http://schemas.microsoft.com/office/drawing/2010/main" xmlns="" w="9525">
+                  <a14:hiddenLine xmlns="" xmlns:a14="http://schemas.microsoft.com/office/drawing/2010/main" w="9525">
                     <a:solidFill>
                       <a:srgbClr val="000000"/>
                     </a:solidFill>
@@ -10703,7 +10710,7 @@
               </a:ln>
               <a:extLst>
                 <a:ext uri="{91240B29-F687-4f45-9708-019B960494DF}">
-                  <a14:hiddenLine xmlns:a14="http://schemas.microsoft.com/office/drawing/2010/main" xmlns="" w="9525">
+                  <a14:hiddenLine xmlns="" xmlns:a14="http://schemas.microsoft.com/office/drawing/2010/main" w="9525">
                     <a:solidFill>
                       <a:srgbClr val="000000"/>
                     </a:solidFill>
@@ -10793,7 +10800,7 @@
               </a:ln>
               <a:extLst>
                 <a:ext uri="{91240B29-F687-4f45-9708-019B960494DF}">
-                  <a14:hiddenLine xmlns:a14="http://schemas.microsoft.com/office/drawing/2010/main" xmlns="" w="9525">
+                  <a14:hiddenLine xmlns="" xmlns:a14="http://schemas.microsoft.com/office/drawing/2010/main" w="9525">
                     <a:solidFill>
                       <a:srgbClr val="000000"/>
                     </a:solidFill>
@@ -10883,7 +10890,7 @@
               </a:ln>
               <a:extLst>
                 <a:ext uri="{91240B29-F687-4f45-9708-019B960494DF}">
-                  <a14:hiddenLine xmlns:a14="http://schemas.microsoft.com/office/drawing/2010/main" xmlns="" w="9525">
+                  <a14:hiddenLine xmlns="" xmlns:a14="http://schemas.microsoft.com/office/drawing/2010/main" w="9525">
                     <a:solidFill>
                       <a:srgbClr val="000000"/>
                     </a:solidFill>
@@ -10948,7 +10955,7 @@
               </a:ln>
               <a:extLst>
                 <a:ext uri="{91240B29-F687-4f45-9708-019B960494DF}">
-                  <a14:hiddenLine xmlns:a14="http://schemas.microsoft.com/office/drawing/2010/main" xmlns="" w="9525">
+                  <a14:hiddenLine xmlns="" xmlns:a14="http://schemas.microsoft.com/office/drawing/2010/main" w="9525">
                     <a:solidFill>
                       <a:srgbClr val="000000"/>
                     </a:solidFill>
@@ -11068,7 +11075,7 @@
               </a:ln>
               <a:extLst>
                 <a:ext uri="{91240B29-F687-4f45-9708-019B960494DF}">
-                  <a14:hiddenLine xmlns:a14="http://schemas.microsoft.com/office/drawing/2010/main" xmlns="" w="9525">
+                  <a14:hiddenLine xmlns="" xmlns:a14="http://schemas.microsoft.com/office/drawing/2010/main" w="9525">
                     <a:solidFill>
                       <a:srgbClr val="000000"/>
                     </a:solidFill>
@@ -11166,7 +11173,7 @@
               </a:ln>
               <a:extLst>
                 <a:ext uri="{91240B29-F687-4f45-9708-019B960494DF}">
-                  <a14:hiddenLine xmlns:a14="http://schemas.microsoft.com/office/drawing/2010/main" xmlns="" w="9525">
+                  <a14:hiddenLine xmlns="" xmlns:a14="http://schemas.microsoft.com/office/drawing/2010/main" w="9525">
                     <a:solidFill>
                       <a:srgbClr val="000000"/>
                     </a:solidFill>
@@ -11281,7 +11288,7 @@
               </a:ln>
               <a:extLst>
                 <a:ext uri="{91240B29-F687-4f45-9708-019B960494DF}">
-                  <a14:hiddenLine xmlns:a14="http://schemas.microsoft.com/office/drawing/2010/main" xmlns="" w="9525">
+                  <a14:hiddenLine xmlns="" xmlns:a14="http://schemas.microsoft.com/office/drawing/2010/main" w="9525">
                     <a:solidFill>
                       <a:srgbClr val="000000"/>
                     </a:solidFill>
@@ -11371,7 +11378,7 @@
               </a:ln>
               <a:extLst>
                 <a:ext uri="{91240B29-F687-4f45-9708-019B960494DF}">
-                  <a14:hiddenLine xmlns:a14="http://schemas.microsoft.com/office/drawing/2010/main" xmlns="" w="9525">
+                  <a14:hiddenLine xmlns="" xmlns:a14="http://schemas.microsoft.com/office/drawing/2010/main" w="9525">
                     <a:solidFill>
                       <a:srgbClr val="000000"/>
                     </a:solidFill>
@@ -11436,7 +11443,7 @@
               </a:ln>
               <a:extLst>
                 <a:ext uri="{91240B29-F687-4f45-9708-019B960494DF}">
-                  <a14:hiddenLine xmlns:a14="http://schemas.microsoft.com/office/drawing/2010/main" xmlns="" w="9525">
+                  <a14:hiddenLine xmlns="" xmlns:a14="http://schemas.microsoft.com/office/drawing/2010/main" w="9525">
                     <a:solidFill>
                       <a:srgbClr val="000000"/>
                     </a:solidFill>
@@ -11526,7 +11533,7 @@
               </a:ln>
               <a:extLst>
                 <a:ext uri="{91240B29-F687-4f45-9708-019B960494DF}">
-                  <a14:hiddenLine xmlns:a14="http://schemas.microsoft.com/office/drawing/2010/main" xmlns="" w="9525">
+                  <a14:hiddenLine xmlns="" xmlns:a14="http://schemas.microsoft.com/office/drawing/2010/main" w="9525">
                     <a:solidFill>
                       <a:srgbClr val="000000"/>
                     </a:solidFill>
@@ -11594,7 +11601,7 @@
               </a:ln>
               <a:extLst>
                 <a:ext uri="{91240B29-F687-4f45-9708-019B960494DF}">
-                  <a14:hiddenLine xmlns:a14="http://schemas.microsoft.com/office/drawing/2010/main" xmlns="" w="9525">
+                  <a14:hiddenLine xmlns="" xmlns:a14="http://schemas.microsoft.com/office/drawing/2010/main" w="9525">
                     <a:solidFill>
                       <a:srgbClr val="000000"/>
                     </a:solidFill>
@@ -11684,7 +11691,7 @@
               </a:ln>
               <a:extLst>
                 <a:ext uri="{91240B29-F687-4f45-9708-019B960494DF}">
-                  <a14:hiddenLine xmlns:a14="http://schemas.microsoft.com/office/drawing/2010/main" xmlns="" w="9525">
+                  <a14:hiddenLine xmlns="" xmlns:a14="http://schemas.microsoft.com/office/drawing/2010/main" w="9525">
                     <a:solidFill>
                       <a:srgbClr val="000000"/>
                     </a:solidFill>
@@ -11752,7 +11759,7 @@
               </a:ln>
               <a:extLst>
                 <a:ext uri="{91240B29-F687-4f45-9708-019B960494DF}">
-                  <a14:hiddenLine xmlns:a14="http://schemas.microsoft.com/office/drawing/2010/main" xmlns="" w="9525">
+                  <a14:hiddenLine xmlns="" xmlns:a14="http://schemas.microsoft.com/office/drawing/2010/main" w="9525">
                     <a:solidFill>
                       <a:srgbClr val="000000"/>
                     </a:solidFill>
@@ -11842,7 +11849,7 @@
               </a:ln>
               <a:extLst>
                 <a:ext uri="{91240B29-F687-4f45-9708-019B960494DF}">
-                  <a14:hiddenLine xmlns:a14="http://schemas.microsoft.com/office/drawing/2010/main" xmlns="" w="9525">
+                  <a14:hiddenLine xmlns="" xmlns:a14="http://schemas.microsoft.com/office/drawing/2010/main" w="9525">
                     <a:solidFill>
                       <a:srgbClr val="000000"/>
                     </a:solidFill>
@@ -11876,7 +11883,7 @@
               </a:ln>
               <a:extLst>
                 <a:ext uri="{91240B29-F687-4f45-9708-019B960494DF}">
-                  <a14:hiddenLine xmlns:a14="http://schemas.microsoft.com/office/drawing/2010/main" xmlns="" w="9525">
+                  <a14:hiddenLine xmlns="" xmlns:a14="http://schemas.microsoft.com/office/drawing/2010/main" w="9525">
                     <a:solidFill>
                       <a:srgbClr val="000000"/>
                     </a:solidFill>
@@ -12016,7 +12023,7 @@
           <a:p>
             <a:fld id="{F87B3B20-FBE3-4704-A244-A865425B53EA}" type="datetimeFigureOut">
               <a:rPr lang="en-US" smtClean="0"/>
-              <a:t>12/1/2024</a:t>
+              <a:t>12/2/24</a:t>
             </a:fld>
             <a:endParaRPr lang="en-US"/>
           </a:p>
@@ -12578,7 +12585,7 @@
             </a:ln>
             <a:extLst>
               <a:ext uri="{91240B29-F687-4f45-9708-019B960494DF}">
-                <a14:hiddenLine xmlns="" xmlns:a16="http://schemas.microsoft.com/office/drawing/2014/main" xmlns:p14="http://schemas.microsoft.com/office/powerpoint/2010/main" xmlns:a14="http://schemas.microsoft.com/office/drawing/2010/main" w="9525">
+                <a14:hiddenLine xmlns:a14="http://schemas.microsoft.com/office/drawing/2010/main" xmlns:p14="http://schemas.microsoft.com/office/powerpoint/2010/main" xmlns:a16="http://schemas.microsoft.com/office/drawing/2014/main" xmlns="" w="9525">
                   <a:solidFill>
                     <a:srgbClr val="000000"/>
                   </a:solidFill>
@@ -12690,7 +12697,7 @@
             </a:ln>
             <a:extLst>
               <a:ext uri="{91240B29-F687-4f45-9708-019B960494DF}">
-                <a14:hiddenLine xmlns="" xmlns:a16="http://schemas.microsoft.com/office/drawing/2014/main" xmlns:p14="http://schemas.microsoft.com/office/powerpoint/2010/main" xmlns:a14="http://schemas.microsoft.com/office/drawing/2010/main" w="9525">
+                <a14:hiddenLine xmlns:a14="http://schemas.microsoft.com/office/drawing/2010/main" xmlns:p14="http://schemas.microsoft.com/office/powerpoint/2010/main" xmlns:a16="http://schemas.microsoft.com/office/drawing/2014/main" xmlns="" w="9525">
                   <a:solidFill>
                     <a:srgbClr val="000000"/>
                   </a:solidFill>
@@ -12802,7 +12809,7 @@
             </a:ln>
             <a:extLst>
               <a:ext uri="{91240B29-F687-4f45-9708-019B960494DF}">
-                <a14:hiddenLine xmlns="" xmlns:a16="http://schemas.microsoft.com/office/drawing/2014/main" xmlns:p14="http://schemas.microsoft.com/office/powerpoint/2010/main" xmlns:a14="http://schemas.microsoft.com/office/drawing/2010/main" w="9525">
+                <a14:hiddenLine xmlns:a14="http://schemas.microsoft.com/office/drawing/2010/main" xmlns:p14="http://schemas.microsoft.com/office/powerpoint/2010/main" xmlns:a16="http://schemas.microsoft.com/office/drawing/2014/main" xmlns="" w="9525">
                   <a:solidFill>
                     <a:srgbClr val="000000"/>
                   </a:solidFill>
@@ -12858,7 +12865,7 @@
             </a:ln>
             <a:extLst>
               <a:ext uri="{91240B29-F687-4f45-9708-019B960494DF}">
-                <a14:hiddenLine xmlns="" xmlns:a16="http://schemas.microsoft.com/office/drawing/2014/main" xmlns:p14="http://schemas.microsoft.com/office/powerpoint/2010/main" xmlns:a14="http://schemas.microsoft.com/office/drawing/2010/main" w="9525">
+                <a14:hiddenLine xmlns:a14="http://schemas.microsoft.com/office/drawing/2010/main" xmlns:p14="http://schemas.microsoft.com/office/powerpoint/2010/main" xmlns:a16="http://schemas.microsoft.com/office/drawing/2014/main" xmlns="" w="9525">
                   <a:solidFill>
                     <a:srgbClr val="000000"/>
                   </a:solidFill>
@@ -12970,7 +12977,7 @@
             </a:ln>
             <a:extLst>
               <a:ext uri="{91240B29-F687-4f45-9708-019B960494DF}">
-                <a14:hiddenLine xmlns="" xmlns:a16="http://schemas.microsoft.com/office/drawing/2014/main" xmlns:p14="http://schemas.microsoft.com/office/powerpoint/2010/main" xmlns:a14="http://schemas.microsoft.com/office/drawing/2010/main" w="9525">
+                <a14:hiddenLine xmlns:a14="http://schemas.microsoft.com/office/drawing/2010/main" xmlns:p14="http://schemas.microsoft.com/office/powerpoint/2010/main" xmlns:a16="http://schemas.microsoft.com/office/drawing/2014/main" xmlns="" w="9525">
                   <a:solidFill>
                     <a:srgbClr val="000000"/>
                   </a:solidFill>
@@ -13054,7 +13061,7 @@
             </a:ln>
             <a:extLst>
               <a:ext uri="{91240B29-F687-4f45-9708-019B960494DF}">
-                <a14:hiddenLine xmlns="" xmlns:a16="http://schemas.microsoft.com/office/drawing/2014/main" xmlns:p14="http://schemas.microsoft.com/office/powerpoint/2010/main" xmlns:a14="http://schemas.microsoft.com/office/drawing/2010/main" w="9525">
+                <a14:hiddenLine xmlns:a14="http://schemas.microsoft.com/office/drawing/2010/main" xmlns:p14="http://schemas.microsoft.com/office/powerpoint/2010/main" xmlns:a16="http://schemas.microsoft.com/office/drawing/2014/main" xmlns="" w="9525">
                   <a:solidFill>
                     <a:srgbClr val="000000"/>
                   </a:solidFill>
@@ -13138,7 +13145,7 @@
             </a:ln>
             <a:extLst>
               <a:ext uri="{91240B29-F687-4f45-9708-019B960494DF}">
-                <a14:hiddenLine xmlns="" xmlns:a16="http://schemas.microsoft.com/office/drawing/2014/main" xmlns:p14="http://schemas.microsoft.com/office/powerpoint/2010/main" xmlns:a14="http://schemas.microsoft.com/office/drawing/2010/main" w="9525">
+                <a14:hiddenLine xmlns:a14="http://schemas.microsoft.com/office/drawing/2010/main" xmlns:p14="http://schemas.microsoft.com/office/powerpoint/2010/main" xmlns:a16="http://schemas.microsoft.com/office/drawing/2014/main" xmlns="" w="9525">
                   <a:solidFill>
                     <a:srgbClr val="000000"/>
                   </a:solidFill>
@@ -13250,7 +13257,7 @@
             </a:ln>
             <a:extLst>
               <a:ext uri="{91240B29-F687-4f45-9708-019B960494DF}">
-                <a14:hiddenLine xmlns="" xmlns:a16="http://schemas.microsoft.com/office/drawing/2014/main" xmlns:p14="http://schemas.microsoft.com/office/powerpoint/2010/main" xmlns:a14="http://schemas.microsoft.com/office/drawing/2010/main" w="9525">
+                <a14:hiddenLine xmlns:a14="http://schemas.microsoft.com/office/drawing/2010/main" xmlns:p14="http://schemas.microsoft.com/office/powerpoint/2010/main" xmlns:a16="http://schemas.microsoft.com/office/drawing/2014/main" xmlns="" w="9525">
                   <a:solidFill>
                     <a:srgbClr val="000000"/>
                   </a:solidFill>
@@ -13334,7 +13341,7 @@
             </a:ln>
             <a:extLst>
               <a:ext uri="{91240B29-F687-4f45-9708-019B960494DF}">
-                <a14:hiddenLine xmlns="" xmlns:a16="http://schemas.microsoft.com/office/drawing/2014/main" xmlns:p14="http://schemas.microsoft.com/office/powerpoint/2010/main" xmlns:a14="http://schemas.microsoft.com/office/drawing/2010/main" w="9525">
+                <a14:hiddenLine xmlns:a14="http://schemas.microsoft.com/office/drawing/2010/main" xmlns:p14="http://schemas.microsoft.com/office/powerpoint/2010/main" xmlns:a16="http://schemas.microsoft.com/office/drawing/2014/main" xmlns="" w="9525">
                   <a:solidFill>
                     <a:srgbClr val="000000"/>
                   </a:solidFill>
@@ -13418,7 +13425,7 @@
             </a:ln>
             <a:extLst>
               <a:ext uri="{91240B29-F687-4f45-9708-019B960494DF}">
-                <a14:hiddenLine xmlns="" xmlns:a16="http://schemas.microsoft.com/office/drawing/2014/main" xmlns:p14="http://schemas.microsoft.com/office/powerpoint/2010/main" xmlns:a14="http://schemas.microsoft.com/office/drawing/2010/main" w="9525">
+                <a14:hiddenLine xmlns:a14="http://schemas.microsoft.com/office/drawing/2010/main" xmlns:p14="http://schemas.microsoft.com/office/powerpoint/2010/main" xmlns:a16="http://schemas.microsoft.com/office/drawing/2014/main" xmlns="" w="9525">
                   <a:solidFill>
                     <a:srgbClr val="000000"/>
                   </a:solidFill>
@@ -13530,7 +13537,7 @@
             </a:ln>
             <a:extLst>
               <a:ext uri="{91240B29-F687-4f45-9708-019B960494DF}">
-                <a14:hiddenLine xmlns="" xmlns:a16="http://schemas.microsoft.com/office/drawing/2014/main" xmlns:p14="http://schemas.microsoft.com/office/powerpoint/2010/main" xmlns:a14="http://schemas.microsoft.com/office/drawing/2010/main" w="9525">
+                <a14:hiddenLine xmlns:a14="http://schemas.microsoft.com/office/drawing/2010/main" xmlns:p14="http://schemas.microsoft.com/office/powerpoint/2010/main" xmlns:a16="http://schemas.microsoft.com/office/drawing/2014/main" xmlns="" w="9525">
                   <a:solidFill>
                     <a:srgbClr val="000000"/>
                   </a:solidFill>
@@ -13642,7 +13649,7 @@
             </a:ln>
             <a:extLst>
               <a:ext uri="{91240B29-F687-4f45-9708-019B960494DF}">
-                <a14:hiddenLine xmlns="" xmlns:a16="http://schemas.microsoft.com/office/drawing/2014/main" xmlns:p14="http://schemas.microsoft.com/office/powerpoint/2010/main" xmlns:a14="http://schemas.microsoft.com/office/drawing/2010/main" w="9525">
+                <a14:hiddenLine xmlns:a14="http://schemas.microsoft.com/office/drawing/2010/main" xmlns:p14="http://schemas.microsoft.com/office/powerpoint/2010/main" xmlns:a16="http://schemas.microsoft.com/office/drawing/2014/main" xmlns="" w="9525">
                   <a:solidFill>
                     <a:srgbClr val="000000"/>
                   </a:solidFill>
@@ -13726,7 +13733,7 @@
             </a:ln>
             <a:extLst>
               <a:ext uri="{91240B29-F687-4f45-9708-019B960494DF}">
-                <a14:hiddenLine xmlns="" xmlns:a16="http://schemas.microsoft.com/office/drawing/2014/main" xmlns:p14="http://schemas.microsoft.com/office/powerpoint/2010/main" xmlns:a14="http://schemas.microsoft.com/office/drawing/2010/main" w="9525">
+                <a14:hiddenLine xmlns:a14="http://schemas.microsoft.com/office/drawing/2010/main" xmlns:p14="http://schemas.microsoft.com/office/powerpoint/2010/main" xmlns:a16="http://schemas.microsoft.com/office/drawing/2014/main" xmlns="" w="9525">
                   <a:solidFill>
                     <a:srgbClr val="000000"/>
                   </a:solidFill>
@@ -13858,7 +13865,7 @@
             </a:ln>
             <a:extLst>
               <a:ext uri="{91240B29-F687-4f45-9708-019B960494DF}">
-                <a14:hiddenLine xmlns="" xmlns:a16="http://schemas.microsoft.com/office/drawing/2014/main" xmlns:p14="http://schemas.microsoft.com/office/powerpoint/2010/main" xmlns:a14="http://schemas.microsoft.com/office/drawing/2010/main" w="9525">
+                <a14:hiddenLine xmlns:a14="http://schemas.microsoft.com/office/drawing/2010/main" xmlns:p14="http://schemas.microsoft.com/office/powerpoint/2010/main" xmlns:a16="http://schemas.microsoft.com/office/drawing/2014/main" xmlns="" w="9525">
                   <a:solidFill>
                     <a:srgbClr val="000000"/>
                   </a:solidFill>
@@ -13942,7 +13949,7 @@
             </a:ln>
             <a:extLst>
               <a:ext uri="{91240B29-F687-4f45-9708-019B960494DF}">
-                <a14:hiddenLine xmlns="" xmlns:a16="http://schemas.microsoft.com/office/drawing/2014/main" xmlns:p14="http://schemas.microsoft.com/office/powerpoint/2010/main" xmlns:a14="http://schemas.microsoft.com/office/drawing/2010/main" w="9525">
+                <a14:hiddenLine xmlns:a14="http://schemas.microsoft.com/office/drawing/2010/main" xmlns:p14="http://schemas.microsoft.com/office/powerpoint/2010/main" xmlns:a16="http://schemas.microsoft.com/office/drawing/2014/main" xmlns="" w="9525">
                   <a:solidFill>
                     <a:srgbClr val="000000"/>
                   </a:solidFill>
@@ -14054,7 +14061,7 @@
             </a:ln>
             <a:extLst>
               <a:ext uri="{91240B29-F687-4f45-9708-019B960494DF}">
-                <a14:hiddenLine xmlns="" xmlns:a16="http://schemas.microsoft.com/office/drawing/2014/main" xmlns:p14="http://schemas.microsoft.com/office/powerpoint/2010/main" xmlns:a14="http://schemas.microsoft.com/office/drawing/2010/main" w="9525">
+                <a14:hiddenLine xmlns:a14="http://schemas.microsoft.com/office/drawing/2010/main" xmlns:p14="http://schemas.microsoft.com/office/powerpoint/2010/main" xmlns:a16="http://schemas.microsoft.com/office/drawing/2014/main" xmlns="" w="9525">
                   <a:solidFill>
                     <a:srgbClr val="000000"/>
                   </a:solidFill>
@@ -14166,7 +14173,7 @@
             </a:ln>
             <a:extLst>
               <a:ext uri="{91240B29-F687-4f45-9708-019B960494DF}">
-                <a14:hiddenLine xmlns="" xmlns:a16="http://schemas.microsoft.com/office/drawing/2014/main" xmlns:p14="http://schemas.microsoft.com/office/powerpoint/2010/main" xmlns:a14="http://schemas.microsoft.com/office/drawing/2010/main" w="9525">
+                <a14:hiddenLine xmlns:a14="http://schemas.microsoft.com/office/drawing/2010/main" xmlns:p14="http://schemas.microsoft.com/office/powerpoint/2010/main" xmlns:a16="http://schemas.microsoft.com/office/drawing/2014/main" xmlns="" w="9525">
                   <a:solidFill>
                     <a:srgbClr val="000000"/>
                   </a:solidFill>
@@ -14250,7 +14257,7 @@
             </a:ln>
             <a:extLst>
               <a:ext uri="{91240B29-F687-4f45-9708-019B960494DF}">
-                <a14:hiddenLine xmlns="" xmlns:a16="http://schemas.microsoft.com/office/drawing/2014/main" xmlns:p14="http://schemas.microsoft.com/office/powerpoint/2010/main" xmlns:a14="http://schemas.microsoft.com/office/drawing/2010/main" w="9525">
+                <a14:hiddenLine xmlns:a14="http://schemas.microsoft.com/office/drawing/2010/main" xmlns:p14="http://schemas.microsoft.com/office/powerpoint/2010/main" xmlns:a16="http://schemas.microsoft.com/office/drawing/2014/main" xmlns="" w="9525">
                   <a:solidFill>
                     <a:srgbClr val="000000"/>
                   </a:solidFill>
@@ -14362,7 +14369,7 @@
             </a:ln>
             <a:extLst>
               <a:ext uri="{91240B29-F687-4f45-9708-019B960494DF}">
-                <a14:hiddenLine xmlns="" xmlns:a16="http://schemas.microsoft.com/office/drawing/2014/main" xmlns:p14="http://schemas.microsoft.com/office/powerpoint/2010/main" xmlns:a14="http://schemas.microsoft.com/office/drawing/2010/main" w="9525">
+                <a14:hiddenLine xmlns:a14="http://schemas.microsoft.com/office/drawing/2010/main" xmlns:p14="http://schemas.microsoft.com/office/powerpoint/2010/main" xmlns:a16="http://schemas.microsoft.com/office/drawing/2014/main" xmlns="" w="9525">
                   <a:solidFill>
                     <a:srgbClr val="000000"/>
                   </a:solidFill>
@@ -14474,7 +14481,7 @@
             </a:ln>
             <a:extLst>
               <a:ext uri="{91240B29-F687-4f45-9708-019B960494DF}">
-                <a14:hiddenLine xmlns="" xmlns:a16="http://schemas.microsoft.com/office/drawing/2014/main" xmlns:p14="http://schemas.microsoft.com/office/powerpoint/2010/main" xmlns:a14="http://schemas.microsoft.com/office/drawing/2010/main" w="9525">
+                <a14:hiddenLine xmlns:a14="http://schemas.microsoft.com/office/drawing/2010/main" xmlns:p14="http://schemas.microsoft.com/office/powerpoint/2010/main" xmlns:a16="http://schemas.microsoft.com/office/drawing/2014/main" xmlns="" w="9525">
                   <a:solidFill>
                     <a:srgbClr val="000000"/>
                   </a:solidFill>
@@ -14552,7 +14559,7 @@
             </a:ln>
             <a:extLst>
               <a:ext uri="{91240B29-F687-4f45-9708-019B960494DF}">
-                <a14:hiddenLine xmlns="" xmlns:a16="http://schemas.microsoft.com/office/drawing/2014/main" xmlns:p14="http://schemas.microsoft.com/office/powerpoint/2010/main" xmlns:a14="http://schemas.microsoft.com/office/drawing/2010/main" w="9525">
+                <a14:hiddenLine xmlns:a14="http://schemas.microsoft.com/office/drawing/2010/main" xmlns:p14="http://schemas.microsoft.com/office/powerpoint/2010/main" xmlns:a16="http://schemas.microsoft.com/office/drawing/2014/main" xmlns="" w="9525">
                   <a:solidFill>
                     <a:srgbClr val="000000"/>
                   </a:solidFill>
@@ -14664,7 +14671,7 @@
             </a:ln>
             <a:extLst>
               <a:ext uri="{91240B29-F687-4f45-9708-019B960494DF}">
-                <a14:hiddenLine xmlns="" xmlns:a16="http://schemas.microsoft.com/office/drawing/2014/main" xmlns:p14="http://schemas.microsoft.com/office/powerpoint/2010/main" xmlns:a14="http://schemas.microsoft.com/office/drawing/2010/main" w="9525">
+                <a14:hiddenLine xmlns:a14="http://schemas.microsoft.com/office/drawing/2010/main" xmlns:p14="http://schemas.microsoft.com/office/powerpoint/2010/main" xmlns:a16="http://schemas.microsoft.com/office/drawing/2014/main" xmlns="" w="9525">
                   <a:solidFill>
                     <a:srgbClr val="000000"/>
                   </a:solidFill>
@@ -14742,7 +14749,7 @@
             </a:ln>
             <a:extLst>
               <a:ext uri="{91240B29-F687-4f45-9708-019B960494DF}">
-                <a14:hiddenLine xmlns="" xmlns:a16="http://schemas.microsoft.com/office/drawing/2014/main" xmlns:p14="http://schemas.microsoft.com/office/powerpoint/2010/main" xmlns:a14="http://schemas.microsoft.com/office/drawing/2010/main" w="9525">
+                <a14:hiddenLine xmlns:a14="http://schemas.microsoft.com/office/drawing/2010/main" xmlns:p14="http://schemas.microsoft.com/office/powerpoint/2010/main" xmlns:a16="http://schemas.microsoft.com/office/drawing/2014/main" xmlns="" w="9525">
                   <a:solidFill>
                     <a:srgbClr val="000000"/>
                   </a:solidFill>
@@ -14854,7 +14861,7 @@
             </a:ln>
             <a:extLst>
               <a:ext uri="{91240B29-F687-4f45-9708-019B960494DF}">
-                <a14:hiddenLine xmlns="" xmlns:a16="http://schemas.microsoft.com/office/drawing/2014/main" xmlns:p14="http://schemas.microsoft.com/office/powerpoint/2010/main" xmlns:a14="http://schemas.microsoft.com/office/drawing/2010/main" w="9525">
+                <a14:hiddenLine xmlns:a14="http://schemas.microsoft.com/office/drawing/2010/main" xmlns:p14="http://schemas.microsoft.com/office/powerpoint/2010/main" xmlns:a16="http://schemas.microsoft.com/office/drawing/2014/main" xmlns="" w="9525">
                   <a:solidFill>
                     <a:srgbClr val="000000"/>
                   </a:solidFill>
@@ -14944,7 +14951,7 @@
             </a:ln>
             <a:extLst>
               <a:ext uri="{91240B29-F687-4f45-9708-019B960494DF}">
-                <a14:hiddenLine xmlns="" xmlns:a16="http://schemas.microsoft.com/office/drawing/2014/main" xmlns:p14="http://schemas.microsoft.com/office/powerpoint/2010/main" xmlns:a14="http://schemas.microsoft.com/office/drawing/2010/main" w="9525">
+                <a14:hiddenLine xmlns:a14="http://schemas.microsoft.com/office/drawing/2010/main" xmlns:p14="http://schemas.microsoft.com/office/powerpoint/2010/main" xmlns:a16="http://schemas.microsoft.com/office/drawing/2014/main" xmlns="" w="9525">
                   <a:solidFill>
                     <a:srgbClr val="000000"/>
                   </a:solidFill>
@@ -15056,7 +15063,7 @@
             </a:ln>
             <a:extLst>
               <a:ext uri="{91240B29-F687-4f45-9708-019B960494DF}">
-                <a14:hiddenLine xmlns="" xmlns:a16="http://schemas.microsoft.com/office/drawing/2014/main" xmlns:p14="http://schemas.microsoft.com/office/powerpoint/2010/main" xmlns:a14="http://schemas.microsoft.com/office/drawing/2010/main" w="9525">
+                <a14:hiddenLine xmlns:a14="http://schemas.microsoft.com/office/drawing/2010/main" xmlns:p14="http://schemas.microsoft.com/office/powerpoint/2010/main" xmlns:a16="http://schemas.microsoft.com/office/drawing/2014/main" xmlns="" w="9525">
                   <a:solidFill>
                     <a:srgbClr val="000000"/>
                   </a:solidFill>
@@ -15146,7 +15153,7 @@
             </a:ln>
             <a:extLst>
               <a:ext uri="{91240B29-F687-4f45-9708-019B960494DF}">
-                <a14:hiddenLine xmlns="" xmlns:a16="http://schemas.microsoft.com/office/drawing/2014/main" xmlns:p14="http://schemas.microsoft.com/office/powerpoint/2010/main" xmlns:a14="http://schemas.microsoft.com/office/drawing/2010/main" w="9525">
+                <a14:hiddenLine xmlns:a14="http://schemas.microsoft.com/office/drawing/2010/main" xmlns:p14="http://schemas.microsoft.com/office/powerpoint/2010/main" xmlns:a16="http://schemas.microsoft.com/office/drawing/2014/main" xmlns="" w="9525">
                   <a:solidFill>
                     <a:srgbClr val="000000"/>
                   </a:solidFill>
@@ -15258,7 +15265,7 @@
             </a:ln>
             <a:extLst>
               <a:ext uri="{91240B29-F687-4f45-9708-019B960494DF}">
-                <a14:hiddenLine xmlns="" xmlns:a16="http://schemas.microsoft.com/office/drawing/2014/main" xmlns:p14="http://schemas.microsoft.com/office/powerpoint/2010/main" xmlns:a14="http://schemas.microsoft.com/office/drawing/2010/main" w="9525">
+                <a14:hiddenLine xmlns:a14="http://schemas.microsoft.com/office/drawing/2010/main" xmlns:p14="http://schemas.microsoft.com/office/powerpoint/2010/main" xmlns:a16="http://schemas.microsoft.com/office/drawing/2014/main" xmlns="" w="9525">
                   <a:solidFill>
                     <a:srgbClr val="000000"/>
                   </a:solidFill>
@@ -15314,7 +15321,7 @@
             </a:ln>
             <a:extLst>
               <a:ext uri="{91240B29-F687-4f45-9708-019B960494DF}">
-                <a14:hiddenLine xmlns="" xmlns:a16="http://schemas.microsoft.com/office/drawing/2014/main" xmlns:p14="http://schemas.microsoft.com/office/powerpoint/2010/main" xmlns:a14="http://schemas.microsoft.com/office/drawing/2010/main" w="9525">
+                <a14:hiddenLine xmlns:a14="http://schemas.microsoft.com/office/drawing/2010/main" xmlns:p14="http://schemas.microsoft.com/office/powerpoint/2010/main" xmlns:a16="http://schemas.microsoft.com/office/drawing/2014/main" xmlns="" w="9525">
                   <a:solidFill>
                     <a:srgbClr val="000000"/>
                   </a:solidFill>
@@ -15426,7 +15433,7 @@
             </a:ln>
             <a:extLst>
               <a:ext uri="{91240B29-F687-4f45-9708-019B960494DF}">
-                <a14:hiddenLine xmlns="" xmlns:a16="http://schemas.microsoft.com/office/drawing/2014/main" xmlns:p14="http://schemas.microsoft.com/office/powerpoint/2010/main" xmlns:a14="http://schemas.microsoft.com/office/drawing/2010/main" w="9525">
+                <a14:hiddenLine xmlns:a14="http://schemas.microsoft.com/office/drawing/2010/main" xmlns:p14="http://schemas.microsoft.com/office/powerpoint/2010/main" xmlns:a16="http://schemas.microsoft.com/office/drawing/2014/main" xmlns="" w="9525">
                   <a:solidFill>
                     <a:srgbClr val="000000"/>
                   </a:solidFill>
@@ -15510,7 +15517,7 @@
             </a:ln>
             <a:extLst>
               <a:ext uri="{91240B29-F687-4f45-9708-019B960494DF}">
-                <a14:hiddenLine xmlns="" xmlns:a16="http://schemas.microsoft.com/office/drawing/2014/main" xmlns:p14="http://schemas.microsoft.com/office/powerpoint/2010/main" xmlns:a14="http://schemas.microsoft.com/office/drawing/2010/main" w="9525">
+                <a14:hiddenLine xmlns:a14="http://schemas.microsoft.com/office/drawing/2010/main" xmlns:p14="http://schemas.microsoft.com/office/powerpoint/2010/main" xmlns:a16="http://schemas.microsoft.com/office/drawing/2014/main" xmlns="" w="9525">
                   <a:solidFill>
                     <a:srgbClr val="000000"/>
                   </a:solidFill>
@@ -15594,7 +15601,7 @@
             </a:ln>
             <a:extLst>
               <a:ext uri="{91240B29-F687-4f45-9708-019B960494DF}">
-                <a14:hiddenLine xmlns="" xmlns:a16="http://schemas.microsoft.com/office/drawing/2014/main" xmlns:p14="http://schemas.microsoft.com/office/powerpoint/2010/main" xmlns:a14="http://schemas.microsoft.com/office/drawing/2010/main" w="9525">
+                <a14:hiddenLine xmlns:a14="http://schemas.microsoft.com/office/drawing/2010/main" xmlns:p14="http://schemas.microsoft.com/office/powerpoint/2010/main" xmlns:a16="http://schemas.microsoft.com/office/drawing/2014/main" xmlns="" w="9525">
                   <a:solidFill>
                     <a:srgbClr val="000000"/>
                   </a:solidFill>
@@ -15706,7 +15713,7 @@
             </a:ln>
             <a:extLst>
               <a:ext uri="{91240B29-F687-4f45-9708-019B960494DF}">
-                <a14:hiddenLine xmlns="" xmlns:a16="http://schemas.microsoft.com/office/drawing/2014/main" xmlns:p14="http://schemas.microsoft.com/office/powerpoint/2010/main" xmlns:a14="http://schemas.microsoft.com/office/drawing/2010/main" w="9525">
+                <a14:hiddenLine xmlns:a14="http://schemas.microsoft.com/office/drawing/2010/main" xmlns:p14="http://schemas.microsoft.com/office/powerpoint/2010/main" xmlns:a16="http://schemas.microsoft.com/office/drawing/2014/main" xmlns="" w="9525">
                   <a:solidFill>
                     <a:srgbClr val="000000"/>
                   </a:solidFill>
@@ -15796,7 +15803,7 @@
             </a:ln>
             <a:extLst>
               <a:ext uri="{91240B29-F687-4f45-9708-019B960494DF}">
-                <a14:hiddenLine xmlns="" xmlns:a16="http://schemas.microsoft.com/office/drawing/2014/main" xmlns:p14="http://schemas.microsoft.com/office/powerpoint/2010/main" xmlns:a14="http://schemas.microsoft.com/office/drawing/2010/main" w="9525">
+                <a14:hiddenLine xmlns:a14="http://schemas.microsoft.com/office/drawing/2010/main" xmlns:p14="http://schemas.microsoft.com/office/powerpoint/2010/main" xmlns:a16="http://schemas.microsoft.com/office/drawing/2014/main" xmlns="" w="9525">
                   <a:solidFill>
                     <a:srgbClr val="000000"/>
                   </a:solidFill>
@@ -15880,7 +15887,7 @@
             </a:ln>
             <a:extLst>
               <a:ext uri="{91240B29-F687-4f45-9708-019B960494DF}">
-                <a14:hiddenLine xmlns="" xmlns:a16="http://schemas.microsoft.com/office/drawing/2014/main" xmlns:p14="http://schemas.microsoft.com/office/powerpoint/2010/main" xmlns:a14="http://schemas.microsoft.com/office/drawing/2010/main" w="9525">
+                <a14:hiddenLine xmlns:a14="http://schemas.microsoft.com/office/drawing/2010/main" xmlns:p14="http://schemas.microsoft.com/office/powerpoint/2010/main" xmlns:a16="http://schemas.microsoft.com/office/drawing/2014/main" xmlns="" w="9525">
                   <a:solidFill>
                     <a:srgbClr val="000000"/>
                   </a:solidFill>
@@ -15992,7 +15999,7 @@
             </a:ln>
             <a:extLst>
               <a:ext uri="{91240B29-F687-4f45-9708-019B960494DF}">
-                <a14:hiddenLine xmlns="" xmlns:a16="http://schemas.microsoft.com/office/drawing/2014/main" xmlns:p14="http://schemas.microsoft.com/office/powerpoint/2010/main" xmlns:a14="http://schemas.microsoft.com/office/drawing/2010/main" w="9525">
+                <a14:hiddenLine xmlns:a14="http://schemas.microsoft.com/office/drawing/2010/main" xmlns:p14="http://schemas.microsoft.com/office/powerpoint/2010/main" xmlns:a16="http://schemas.microsoft.com/office/drawing/2014/main" xmlns="" w="9525">
                   <a:solidFill>
                     <a:srgbClr val="000000"/>
                   </a:solidFill>
@@ -16076,7 +16083,7 @@
             </a:ln>
             <a:extLst>
               <a:ext uri="{91240B29-F687-4f45-9708-019B960494DF}">
-                <a14:hiddenLine xmlns="" xmlns:a16="http://schemas.microsoft.com/office/drawing/2014/main" xmlns:p14="http://schemas.microsoft.com/office/powerpoint/2010/main" xmlns:a14="http://schemas.microsoft.com/office/drawing/2010/main" w="9525">
+                <a14:hiddenLine xmlns:a14="http://schemas.microsoft.com/office/drawing/2010/main" xmlns:p14="http://schemas.microsoft.com/office/powerpoint/2010/main" xmlns:a16="http://schemas.microsoft.com/office/drawing/2014/main" xmlns="" w="9525">
                   <a:solidFill>
                     <a:srgbClr val="000000"/>
                   </a:solidFill>
@@ -16188,7 +16195,7 @@
             </a:ln>
             <a:extLst>
               <a:ext uri="{91240B29-F687-4f45-9708-019B960494DF}">
-                <a14:hiddenLine xmlns="" xmlns:a16="http://schemas.microsoft.com/office/drawing/2014/main" xmlns:p14="http://schemas.microsoft.com/office/powerpoint/2010/main" xmlns:a14="http://schemas.microsoft.com/office/drawing/2010/main" w="9525">
+                <a14:hiddenLine xmlns:a14="http://schemas.microsoft.com/office/drawing/2010/main" xmlns:p14="http://schemas.microsoft.com/office/powerpoint/2010/main" xmlns:a16="http://schemas.microsoft.com/office/drawing/2014/main" xmlns="" w="9525">
                   <a:solidFill>
                     <a:srgbClr val="000000"/>
                   </a:solidFill>
@@ -16272,7 +16279,7 @@
             </a:ln>
             <a:extLst>
               <a:ext uri="{91240B29-F687-4f45-9708-019B960494DF}">
-                <a14:hiddenLine xmlns="" xmlns:a16="http://schemas.microsoft.com/office/drawing/2014/main" xmlns:p14="http://schemas.microsoft.com/office/powerpoint/2010/main" xmlns:a14="http://schemas.microsoft.com/office/drawing/2010/main" w="9525">
+                <a14:hiddenLine xmlns:a14="http://schemas.microsoft.com/office/drawing/2010/main" xmlns:p14="http://schemas.microsoft.com/office/powerpoint/2010/main" xmlns:a16="http://schemas.microsoft.com/office/drawing/2014/main" xmlns="" w="9525">
                   <a:solidFill>
                     <a:srgbClr val="000000"/>
                   </a:solidFill>
@@ -16384,7 +16391,7 @@
             </a:ln>
             <a:extLst>
               <a:ext uri="{91240B29-F687-4f45-9708-019B960494DF}">
-                <a14:hiddenLine xmlns="" xmlns:a16="http://schemas.microsoft.com/office/drawing/2014/main" xmlns:p14="http://schemas.microsoft.com/office/powerpoint/2010/main" xmlns:a14="http://schemas.microsoft.com/office/drawing/2010/main" w="9525">
+                <a14:hiddenLine xmlns:a14="http://schemas.microsoft.com/office/drawing/2010/main" xmlns:p14="http://schemas.microsoft.com/office/powerpoint/2010/main" xmlns:a16="http://schemas.microsoft.com/office/drawing/2014/main" xmlns="" w="9525">
                   <a:solidFill>
                     <a:srgbClr val="000000"/>
                   </a:solidFill>
@@ -16440,7 +16447,7 @@
             </a:ln>
             <a:extLst>
               <a:ext uri="{91240B29-F687-4f45-9708-019B960494DF}">
-                <a14:hiddenLine xmlns="" xmlns:a16="http://schemas.microsoft.com/office/drawing/2014/main" xmlns:p14="http://schemas.microsoft.com/office/powerpoint/2010/main" xmlns:a14="http://schemas.microsoft.com/office/drawing/2010/main" w="9525">
+                <a14:hiddenLine xmlns:a14="http://schemas.microsoft.com/office/drawing/2010/main" xmlns:p14="http://schemas.microsoft.com/office/powerpoint/2010/main" xmlns:a16="http://schemas.microsoft.com/office/drawing/2014/main" xmlns="" w="9525">
                   <a:solidFill>
                     <a:srgbClr val="000000"/>
                   </a:solidFill>
@@ -16527,7 +16534,7 @@
             </a:ln>
             <a:extLst>
               <a:ext uri="{91240B29-F687-4f45-9708-019B960494DF}">
-                <a14:hiddenLine xmlns="" xmlns:a16="http://schemas.microsoft.com/office/drawing/2014/main" xmlns:p14="http://schemas.microsoft.com/office/powerpoint/2010/main" xmlns:a14="http://schemas.microsoft.com/office/drawing/2010/main" w="9525">
+                <a14:hiddenLine xmlns:a14="http://schemas.microsoft.com/office/drawing/2010/main" xmlns:p14="http://schemas.microsoft.com/office/powerpoint/2010/main" xmlns:a16="http://schemas.microsoft.com/office/drawing/2014/main" xmlns="" w="9525">
                   <a:solidFill>
                     <a:srgbClr val="000000"/>
                   </a:solidFill>
@@ -16639,7 +16646,7 @@
             </a:ln>
             <a:extLst>
               <a:ext uri="{91240B29-F687-4f45-9708-019B960494DF}">
-                <a14:hiddenLine xmlns="" xmlns:a16="http://schemas.microsoft.com/office/drawing/2014/main" xmlns:p14="http://schemas.microsoft.com/office/powerpoint/2010/main" xmlns:a14="http://schemas.microsoft.com/office/drawing/2010/main" w="9525">
+                <a14:hiddenLine xmlns:a14="http://schemas.microsoft.com/office/drawing/2010/main" xmlns:p14="http://schemas.microsoft.com/office/powerpoint/2010/main" xmlns:a16="http://schemas.microsoft.com/office/drawing/2014/main" xmlns="" w="9525">
                   <a:solidFill>
                     <a:srgbClr val="000000"/>
                   </a:solidFill>
@@ -16723,7 +16730,7 @@
             </a:ln>
             <a:extLst>
               <a:ext uri="{91240B29-F687-4f45-9708-019B960494DF}">
-                <a14:hiddenLine xmlns="" xmlns:a16="http://schemas.microsoft.com/office/drawing/2014/main" xmlns:p14="http://schemas.microsoft.com/office/powerpoint/2010/main" xmlns:a14="http://schemas.microsoft.com/office/drawing/2010/main" w="9525">
+                <a14:hiddenLine xmlns:a14="http://schemas.microsoft.com/office/drawing/2010/main" xmlns:p14="http://schemas.microsoft.com/office/powerpoint/2010/main" xmlns:a16="http://schemas.microsoft.com/office/drawing/2014/main" xmlns="" w="9525">
                   <a:solidFill>
                     <a:srgbClr val="000000"/>
                   </a:solidFill>
@@ -16835,7 +16842,7 @@
             </a:ln>
             <a:extLst>
               <a:ext uri="{91240B29-F687-4f45-9708-019B960494DF}">
-                <a14:hiddenLine xmlns="" xmlns:a16="http://schemas.microsoft.com/office/drawing/2014/main" xmlns:p14="http://schemas.microsoft.com/office/powerpoint/2010/main" xmlns:a14="http://schemas.microsoft.com/office/drawing/2010/main" w="9525">
+                <a14:hiddenLine xmlns:a14="http://schemas.microsoft.com/office/drawing/2010/main" xmlns:p14="http://schemas.microsoft.com/office/powerpoint/2010/main" xmlns:a16="http://schemas.microsoft.com/office/drawing/2014/main" xmlns="" w="9525">
                   <a:solidFill>
                     <a:srgbClr val="000000"/>
                   </a:solidFill>
@@ -16947,7 +16954,7 @@
             </a:ln>
             <a:extLst>
               <a:ext uri="{91240B29-F687-4f45-9708-019B960494DF}">
-                <a14:hiddenLine xmlns="" xmlns:a16="http://schemas.microsoft.com/office/drawing/2014/main" xmlns:p14="http://schemas.microsoft.com/office/powerpoint/2010/main" xmlns:a14="http://schemas.microsoft.com/office/drawing/2010/main" w="9525">
+                <a14:hiddenLine xmlns:a14="http://schemas.microsoft.com/office/drawing/2010/main" xmlns:p14="http://schemas.microsoft.com/office/powerpoint/2010/main" xmlns:a16="http://schemas.microsoft.com/office/drawing/2014/main" xmlns="" w="9525">
                   <a:solidFill>
                     <a:srgbClr val="000000"/>
                   </a:solidFill>
@@ -17034,7 +17041,7 @@
             </a:ln>
             <a:extLst>
               <a:ext uri="{91240B29-F687-4f45-9708-019B960494DF}">
-                <a14:hiddenLine xmlns="" xmlns:a16="http://schemas.microsoft.com/office/drawing/2014/main" xmlns:p14="http://schemas.microsoft.com/office/powerpoint/2010/main" xmlns:a14="http://schemas.microsoft.com/office/drawing/2010/main" w="9525">
+                <a14:hiddenLine xmlns:a14="http://schemas.microsoft.com/office/drawing/2010/main" xmlns:p14="http://schemas.microsoft.com/office/powerpoint/2010/main" xmlns:a16="http://schemas.microsoft.com/office/drawing/2014/main" xmlns="" w="9525">
                   <a:solidFill>
                     <a:srgbClr val="000000"/>
                   </a:solidFill>
@@ -17118,7 +17125,7 @@
             </a:ln>
             <a:extLst>
               <a:ext uri="{91240B29-F687-4f45-9708-019B960494DF}">
-                <a14:hiddenLine xmlns="" xmlns:a16="http://schemas.microsoft.com/office/drawing/2014/main" xmlns:p14="http://schemas.microsoft.com/office/powerpoint/2010/main" xmlns:a14="http://schemas.microsoft.com/office/drawing/2010/main" w="9525">
+                <a14:hiddenLine xmlns:a14="http://schemas.microsoft.com/office/drawing/2010/main" xmlns:p14="http://schemas.microsoft.com/office/powerpoint/2010/main" xmlns:a16="http://schemas.microsoft.com/office/drawing/2014/main" xmlns="" w="9525">
                   <a:solidFill>
                     <a:srgbClr val="000000"/>
                   </a:solidFill>
@@ -17230,7 +17237,7 @@
             </a:ln>
             <a:extLst>
               <a:ext uri="{91240B29-F687-4f45-9708-019B960494DF}">
-                <a14:hiddenLine xmlns="" xmlns:a16="http://schemas.microsoft.com/office/drawing/2014/main" xmlns:p14="http://schemas.microsoft.com/office/powerpoint/2010/main" xmlns:a14="http://schemas.microsoft.com/office/drawing/2010/main" w="9525">
+                <a14:hiddenLine xmlns:a14="http://schemas.microsoft.com/office/drawing/2010/main" xmlns:p14="http://schemas.microsoft.com/office/powerpoint/2010/main" xmlns:a16="http://schemas.microsoft.com/office/drawing/2014/main" xmlns="" w="9525">
                   <a:solidFill>
                     <a:srgbClr val="000000"/>
                   </a:solidFill>
@@ -17342,7 +17349,7 @@
             </a:ln>
             <a:extLst>
               <a:ext uri="{91240B29-F687-4f45-9708-019B960494DF}">
-                <a14:hiddenLine xmlns="" xmlns:a16="http://schemas.microsoft.com/office/drawing/2014/main" xmlns:p14="http://schemas.microsoft.com/office/powerpoint/2010/main" xmlns:a14="http://schemas.microsoft.com/office/drawing/2010/main" w="9525">
+                <a14:hiddenLine xmlns:a14="http://schemas.microsoft.com/office/drawing/2010/main" xmlns:p14="http://schemas.microsoft.com/office/powerpoint/2010/main" xmlns:a16="http://schemas.microsoft.com/office/drawing/2014/main" xmlns="" w="9525">
                   <a:solidFill>
                     <a:srgbClr val="000000"/>
                   </a:solidFill>
@@ -17426,7 +17433,7 @@
             </a:ln>
             <a:extLst>
               <a:ext uri="{91240B29-F687-4f45-9708-019B960494DF}">
-                <a14:hiddenLine xmlns="" xmlns:a16="http://schemas.microsoft.com/office/drawing/2014/main" xmlns:p14="http://schemas.microsoft.com/office/powerpoint/2010/main" xmlns:a14="http://schemas.microsoft.com/office/drawing/2010/main" w="9525">
+                <a14:hiddenLine xmlns:a14="http://schemas.microsoft.com/office/drawing/2010/main" xmlns:p14="http://schemas.microsoft.com/office/powerpoint/2010/main" xmlns:a16="http://schemas.microsoft.com/office/drawing/2014/main" xmlns="" w="9525">
                   <a:solidFill>
                     <a:srgbClr val="000000"/>
                   </a:solidFill>
@@ -17568,7 +17575,7 @@
             </a:ln>
             <a:extLst>
               <a:ext uri="{91240B29-F687-4f45-9708-019B960494DF}">
-                <a14:hiddenLine xmlns="" xmlns:a16="http://schemas.microsoft.com/office/drawing/2014/main" xmlns:p14="http://schemas.microsoft.com/office/powerpoint/2010/main" xmlns:a14="http://schemas.microsoft.com/office/drawing/2010/main" w="9525">
+                <a14:hiddenLine xmlns:a14="http://schemas.microsoft.com/office/drawing/2010/main" xmlns:p14="http://schemas.microsoft.com/office/powerpoint/2010/main" xmlns:a16="http://schemas.microsoft.com/office/drawing/2014/main" xmlns="" w="9525">
                   <a:solidFill>
                     <a:srgbClr val="000000"/>
                   </a:solidFill>
@@ -17658,7 +17665,7 @@
             </a:ln>
             <a:extLst>
               <a:ext uri="{91240B29-F687-4f45-9708-019B960494DF}">
-                <a14:hiddenLine xmlns="" xmlns:a16="http://schemas.microsoft.com/office/drawing/2014/main" xmlns:p14="http://schemas.microsoft.com/office/powerpoint/2010/main" xmlns:a14="http://schemas.microsoft.com/office/drawing/2010/main" w="9525">
+                <a14:hiddenLine xmlns:a14="http://schemas.microsoft.com/office/drawing/2010/main" xmlns:p14="http://schemas.microsoft.com/office/powerpoint/2010/main" xmlns:a16="http://schemas.microsoft.com/office/drawing/2014/main" xmlns="" w="9525">
                   <a:solidFill>
                     <a:srgbClr val="000000"/>
                   </a:solidFill>
@@ -17770,7 +17777,7 @@
             </a:ln>
             <a:extLst>
               <a:ext uri="{91240B29-F687-4f45-9708-019B960494DF}">
-                <a14:hiddenLine xmlns="" xmlns:a16="http://schemas.microsoft.com/office/drawing/2014/main" xmlns:p14="http://schemas.microsoft.com/office/powerpoint/2010/main" xmlns:a14="http://schemas.microsoft.com/office/drawing/2010/main" w="9525">
+                <a14:hiddenLine xmlns:a14="http://schemas.microsoft.com/office/drawing/2010/main" xmlns:p14="http://schemas.microsoft.com/office/powerpoint/2010/main" xmlns:a16="http://schemas.microsoft.com/office/drawing/2014/main" xmlns="" w="9525">
                   <a:solidFill>
                     <a:srgbClr val="000000"/>
                   </a:solidFill>
@@ -17820,13 +17827,8 @@
           <a:p>
             <a:r>
               <a:rPr lang="en-US" sz="5400" dirty="0"/>
-              <a:t>CS443 Library Db </a:t>
+              <a:t>CS443 Library Db wEBSITE</a:t>
             </a:r>
-            <a:r>
-              <a:rPr lang="en-US" sz="5400" dirty="0" err="1"/>
-              <a:t>wEBSITE</a:t>
-            </a:r>
-            <a:endParaRPr lang="en-US" sz="5400" dirty="0"/>
           </a:p>
         </p:txBody>
       </p:sp>
@@ -17969,7 +17971,7 @@
             </a:ln>
             <a:extLst>
               <a:ext uri="{91240B29-F687-4f45-9708-019B960494DF}">
-                <a14:hiddenLine xmlns="" xmlns:a16="http://schemas.microsoft.com/office/drawing/2014/main" xmlns:p14="http://schemas.microsoft.com/office/powerpoint/2010/main" xmlns:a14="http://schemas.microsoft.com/office/drawing/2010/main" w="9525">
+                <a14:hiddenLine xmlns:a14="http://schemas.microsoft.com/office/drawing/2010/main" xmlns:p14="http://schemas.microsoft.com/office/powerpoint/2010/main" xmlns:a16="http://schemas.microsoft.com/office/drawing/2014/main" xmlns="" w="9525">
                   <a:solidFill>
                     <a:srgbClr val="000000"/>
                   </a:solidFill>
@@ -18106,7 +18108,7 @@
             </a:ln>
             <a:extLst>
               <a:ext uri="{91240B29-F687-4f45-9708-019B960494DF}">
-                <a14:hiddenLine xmlns="" xmlns:a16="http://schemas.microsoft.com/office/drawing/2014/main" xmlns:p14="http://schemas.microsoft.com/office/powerpoint/2010/main" xmlns:a14="http://schemas.microsoft.com/office/drawing/2010/main" w="9525">
+                <a14:hiddenLine xmlns:a14="http://schemas.microsoft.com/office/drawing/2010/main" xmlns:p14="http://schemas.microsoft.com/office/powerpoint/2010/main" xmlns:a16="http://schemas.microsoft.com/office/drawing/2014/main" xmlns="" w="9525">
                   <a:solidFill>
                     <a:srgbClr val="000000"/>
                   </a:solidFill>
@@ -18218,7 +18220,7 @@
             </a:ln>
             <a:extLst>
               <a:ext uri="{91240B29-F687-4f45-9708-019B960494DF}">
-                <a14:hiddenLine xmlns="" xmlns:a16="http://schemas.microsoft.com/office/drawing/2014/main" xmlns:p14="http://schemas.microsoft.com/office/powerpoint/2010/main" xmlns:a14="http://schemas.microsoft.com/office/drawing/2010/main" w="9525">
+                <a14:hiddenLine xmlns:a14="http://schemas.microsoft.com/office/drawing/2010/main" xmlns:p14="http://schemas.microsoft.com/office/powerpoint/2010/main" xmlns:a16="http://schemas.microsoft.com/office/drawing/2014/main" xmlns="" w="9525">
                   <a:solidFill>
                     <a:srgbClr val="000000"/>
                   </a:solidFill>
@@ -18305,7 +18307,7 @@
             </a:ln>
             <a:extLst>
               <a:ext uri="{91240B29-F687-4f45-9708-019B960494DF}">
-                <a14:hiddenLine xmlns="" xmlns:a16="http://schemas.microsoft.com/office/drawing/2014/main" xmlns:p14="http://schemas.microsoft.com/office/powerpoint/2010/main" xmlns:a14="http://schemas.microsoft.com/office/drawing/2010/main" w="9525">
+                <a14:hiddenLine xmlns:a14="http://schemas.microsoft.com/office/drawing/2010/main" xmlns:p14="http://schemas.microsoft.com/office/powerpoint/2010/main" xmlns:a16="http://schemas.microsoft.com/office/drawing/2014/main" xmlns="" w="9525">
                   <a:solidFill>
                     <a:srgbClr val="000000"/>
                   </a:solidFill>
@@ -18417,7 +18419,7 @@
             </a:ln>
             <a:extLst>
               <a:ext uri="{91240B29-F687-4f45-9708-019B960494DF}">
-                <a14:hiddenLine xmlns="" xmlns:a16="http://schemas.microsoft.com/office/drawing/2014/main" xmlns:p14="http://schemas.microsoft.com/office/powerpoint/2010/main" xmlns:a14="http://schemas.microsoft.com/office/drawing/2010/main" w="9525">
+                <a14:hiddenLine xmlns:a14="http://schemas.microsoft.com/office/drawing/2010/main" xmlns:p14="http://schemas.microsoft.com/office/powerpoint/2010/main" xmlns:a16="http://schemas.microsoft.com/office/drawing/2014/main" xmlns="" w="9525">
                   <a:solidFill>
                     <a:srgbClr val="000000"/>
                   </a:solidFill>
@@ -18507,7 +18509,7 @@
             </a:ln>
             <a:extLst>
               <a:ext uri="{91240B29-F687-4f45-9708-019B960494DF}">
-                <a14:hiddenLine xmlns="" xmlns:a16="http://schemas.microsoft.com/office/drawing/2014/main" xmlns:p14="http://schemas.microsoft.com/office/powerpoint/2010/main" xmlns:a14="http://schemas.microsoft.com/office/drawing/2010/main" w="9525">
+                <a14:hiddenLine xmlns:a14="http://schemas.microsoft.com/office/drawing/2010/main" xmlns:p14="http://schemas.microsoft.com/office/powerpoint/2010/main" xmlns:a16="http://schemas.microsoft.com/office/drawing/2014/main" xmlns="" w="9525">
                   <a:solidFill>
                     <a:srgbClr val="000000"/>
                   </a:solidFill>
@@ -18619,7 +18621,7 @@
             </a:ln>
             <a:extLst>
               <a:ext uri="{91240B29-F687-4f45-9708-019B960494DF}">
-                <a14:hiddenLine xmlns="" xmlns:a16="http://schemas.microsoft.com/office/drawing/2014/main" xmlns:p14="http://schemas.microsoft.com/office/powerpoint/2010/main" xmlns:a14="http://schemas.microsoft.com/office/drawing/2010/main" w="9525">
+                <a14:hiddenLine xmlns:a14="http://schemas.microsoft.com/office/drawing/2010/main" xmlns:p14="http://schemas.microsoft.com/office/powerpoint/2010/main" xmlns:a16="http://schemas.microsoft.com/office/drawing/2014/main" xmlns="" w="9525">
                   <a:solidFill>
                     <a:srgbClr val="000000"/>
                   </a:solidFill>
@@ -18709,7 +18711,7 @@
             </a:ln>
             <a:extLst>
               <a:ext uri="{91240B29-F687-4f45-9708-019B960494DF}">
-                <a14:hiddenLine xmlns="" xmlns:a16="http://schemas.microsoft.com/office/drawing/2014/main" xmlns:p14="http://schemas.microsoft.com/office/powerpoint/2010/main" xmlns:a14="http://schemas.microsoft.com/office/drawing/2010/main" w="9525">
+                <a14:hiddenLine xmlns:a14="http://schemas.microsoft.com/office/drawing/2010/main" xmlns:p14="http://schemas.microsoft.com/office/powerpoint/2010/main" xmlns:a16="http://schemas.microsoft.com/office/drawing/2014/main" xmlns="" w="9525">
                   <a:solidFill>
                     <a:srgbClr val="000000"/>
                   </a:solidFill>
@@ -18821,7 +18823,7 @@
             </a:ln>
             <a:extLst>
               <a:ext uri="{91240B29-F687-4f45-9708-019B960494DF}">
-                <a14:hiddenLine xmlns="" xmlns:a16="http://schemas.microsoft.com/office/drawing/2014/main" xmlns:p14="http://schemas.microsoft.com/office/powerpoint/2010/main" xmlns:a14="http://schemas.microsoft.com/office/drawing/2010/main" w="9525">
+                <a14:hiddenLine xmlns:a14="http://schemas.microsoft.com/office/drawing/2010/main" xmlns:p14="http://schemas.microsoft.com/office/powerpoint/2010/main" xmlns:a16="http://schemas.microsoft.com/office/drawing/2014/main" xmlns="" w="9525">
                   <a:solidFill>
                     <a:srgbClr val="000000"/>
                   </a:solidFill>
@@ -18877,7 +18879,7 @@
             </a:ln>
             <a:extLst>
               <a:ext uri="{91240B29-F687-4f45-9708-019B960494DF}">
-                <a14:hiddenLine xmlns="" xmlns:a16="http://schemas.microsoft.com/office/drawing/2014/main" xmlns:p14="http://schemas.microsoft.com/office/powerpoint/2010/main" xmlns:a14="http://schemas.microsoft.com/office/drawing/2010/main" w="9525">
+                <a14:hiddenLine xmlns:a14="http://schemas.microsoft.com/office/drawing/2010/main" xmlns:p14="http://schemas.microsoft.com/office/powerpoint/2010/main" xmlns:a16="http://schemas.microsoft.com/office/drawing/2014/main" xmlns="" w="9525">
                   <a:solidFill>
                     <a:srgbClr val="000000"/>
                   </a:solidFill>
@@ -19068,7 +19070,7 @@
             </a:ln>
             <a:extLst>
               <a:ext uri="{91240B29-F687-4f45-9708-019B960494DF}">
-                <a14:hiddenLine xmlns="" xmlns:a16="http://schemas.microsoft.com/office/drawing/2014/main" xmlns:p14="http://schemas.microsoft.com/office/powerpoint/2010/main" xmlns:a14="http://schemas.microsoft.com/office/drawing/2010/main" w="9525">
+                <a14:hiddenLine xmlns:a14="http://schemas.microsoft.com/office/drawing/2010/main" xmlns:p14="http://schemas.microsoft.com/office/powerpoint/2010/main" xmlns:a16="http://schemas.microsoft.com/office/drawing/2014/main" xmlns="" w="9525">
                   <a:solidFill>
                     <a:srgbClr val="000000"/>
                   </a:solidFill>
@@ -19180,7 +19182,7 @@
             </a:ln>
             <a:extLst>
               <a:ext uri="{91240B29-F687-4f45-9708-019B960494DF}">
-                <a14:hiddenLine xmlns="" xmlns:a16="http://schemas.microsoft.com/office/drawing/2014/main" xmlns:p14="http://schemas.microsoft.com/office/powerpoint/2010/main" xmlns:a14="http://schemas.microsoft.com/office/drawing/2010/main" w="9525">
+                <a14:hiddenLine xmlns:a14="http://schemas.microsoft.com/office/drawing/2010/main" xmlns:p14="http://schemas.microsoft.com/office/powerpoint/2010/main" xmlns:a16="http://schemas.microsoft.com/office/drawing/2014/main" xmlns="" w="9525">
                   <a:solidFill>
                     <a:srgbClr val="000000"/>
                   </a:solidFill>
@@ -19292,7 +19294,7 @@
             </a:ln>
             <a:extLst>
               <a:ext uri="{91240B29-F687-4f45-9708-019B960494DF}">
-                <a14:hiddenLine xmlns="" xmlns:a16="http://schemas.microsoft.com/office/drawing/2014/main" xmlns:p14="http://schemas.microsoft.com/office/powerpoint/2010/main" xmlns:a14="http://schemas.microsoft.com/office/drawing/2010/main" w="9525">
+                <a14:hiddenLine xmlns:a14="http://schemas.microsoft.com/office/drawing/2010/main" xmlns:p14="http://schemas.microsoft.com/office/powerpoint/2010/main" xmlns:a16="http://schemas.microsoft.com/office/drawing/2014/main" xmlns="" w="9525">
                   <a:solidFill>
                     <a:srgbClr val="000000"/>
                   </a:solidFill>
@@ -19376,7 +19378,7 @@
             </a:ln>
             <a:extLst>
               <a:ext uri="{91240B29-F687-4f45-9708-019B960494DF}">
-                <a14:hiddenLine xmlns="" xmlns:a16="http://schemas.microsoft.com/office/drawing/2014/main" xmlns:p14="http://schemas.microsoft.com/office/powerpoint/2010/main" xmlns:a14="http://schemas.microsoft.com/office/drawing/2010/main" w="9525">
+                <a14:hiddenLine xmlns:a14="http://schemas.microsoft.com/office/drawing/2010/main" xmlns:p14="http://schemas.microsoft.com/office/powerpoint/2010/main" xmlns:a16="http://schemas.microsoft.com/office/drawing/2014/main" xmlns="" w="9525">
                   <a:solidFill>
                     <a:srgbClr val="000000"/>
                   </a:solidFill>
@@ -19488,7 +19490,7 @@
             </a:ln>
             <a:extLst>
               <a:ext uri="{91240B29-F687-4f45-9708-019B960494DF}">
-                <a14:hiddenLine xmlns="" xmlns:a16="http://schemas.microsoft.com/office/drawing/2014/main" xmlns:p14="http://schemas.microsoft.com/office/powerpoint/2010/main" xmlns:a14="http://schemas.microsoft.com/office/drawing/2010/main" w="9525">
+                <a14:hiddenLine xmlns:a14="http://schemas.microsoft.com/office/drawing/2010/main" xmlns:p14="http://schemas.microsoft.com/office/powerpoint/2010/main" xmlns:a16="http://schemas.microsoft.com/office/drawing/2014/main" xmlns="" w="9525">
                   <a:solidFill>
                     <a:srgbClr val="000000"/>
                   </a:solidFill>
@@ -19572,7 +19574,7 @@
             </a:ln>
             <a:extLst>
               <a:ext uri="{91240B29-F687-4f45-9708-019B960494DF}">
-                <a14:hiddenLine xmlns="" xmlns:a16="http://schemas.microsoft.com/office/drawing/2014/main" xmlns:p14="http://schemas.microsoft.com/office/powerpoint/2010/main" xmlns:a14="http://schemas.microsoft.com/office/drawing/2010/main" w="9525">
+                <a14:hiddenLine xmlns:a14="http://schemas.microsoft.com/office/drawing/2010/main" xmlns:p14="http://schemas.microsoft.com/office/powerpoint/2010/main" xmlns:a16="http://schemas.microsoft.com/office/drawing/2014/main" xmlns="" w="9525">
                   <a:solidFill>
                     <a:srgbClr val="000000"/>
                   </a:solidFill>
@@ -19656,7 +19658,7 @@
             </a:ln>
             <a:extLst>
               <a:ext uri="{91240B29-F687-4f45-9708-019B960494DF}">
-                <a14:hiddenLine xmlns="" xmlns:a16="http://schemas.microsoft.com/office/drawing/2014/main" xmlns:p14="http://schemas.microsoft.com/office/powerpoint/2010/main" xmlns:a14="http://schemas.microsoft.com/office/drawing/2010/main" w="9525">
+                <a14:hiddenLine xmlns:a14="http://schemas.microsoft.com/office/drawing/2010/main" xmlns:p14="http://schemas.microsoft.com/office/powerpoint/2010/main" xmlns:a16="http://schemas.microsoft.com/office/drawing/2014/main" xmlns="" w="9525">
                   <a:solidFill>
                     <a:srgbClr val="000000"/>
                   </a:solidFill>
@@ -19768,7 +19770,7 @@
             </a:ln>
             <a:extLst>
               <a:ext uri="{91240B29-F687-4f45-9708-019B960494DF}">
-                <a14:hiddenLine xmlns="" xmlns:a16="http://schemas.microsoft.com/office/drawing/2014/main" xmlns:p14="http://schemas.microsoft.com/office/powerpoint/2010/main" xmlns:a14="http://schemas.microsoft.com/office/drawing/2010/main" w="9525">
+                <a14:hiddenLine xmlns:a14="http://schemas.microsoft.com/office/drawing/2010/main" xmlns:p14="http://schemas.microsoft.com/office/powerpoint/2010/main" xmlns:a16="http://schemas.microsoft.com/office/drawing/2014/main" xmlns="" w="9525">
                   <a:solidFill>
                     <a:srgbClr val="000000"/>
                   </a:solidFill>
@@ -19880,7 +19882,7 @@
             </a:ln>
             <a:extLst>
               <a:ext uri="{91240B29-F687-4f45-9708-019B960494DF}">
-                <a14:hiddenLine xmlns="" xmlns:a16="http://schemas.microsoft.com/office/drawing/2014/main" xmlns:p14="http://schemas.microsoft.com/office/powerpoint/2010/main" xmlns:a14="http://schemas.microsoft.com/office/drawing/2010/main" w="9525">
+                <a14:hiddenLine xmlns:a14="http://schemas.microsoft.com/office/drawing/2010/main" xmlns:p14="http://schemas.microsoft.com/office/powerpoint/2010/main" xmlns:a16="http://schemas.microsoft.com/office/drawing/2014/main" xmlns="" w="9525">
                   <a:solidFill>
                     <a:srgbClr val="000000"/>
                   </a:solidFill>
@@ -19964,7 +19966,7 @@
             </a:ln>
             <a:extLst>
               <a:ext uri="{91240B29-F687-4f45-9708-019B960494DF}">
-                <a14:hiddenLine xmlns="" xmlns:a16="http://schemas.microsoft.com/office/drawing/2014/main" xmlns:p14="http://schemas.microsoft.com/office/powerpoint/2010/main" xmlns:a14="http://schemas.microsoft.com/office/drawing/2010/main" w="9525">
+                <a14:hiddenLine xmlns:a14="http://schemas.microsoft.com/office/drawing/2010/main" xmlns:p14="http://schemas.microsoft.com/office/powerpoint/2010/main" xmlns:a16="http://schemas.microsoft.com/office/drawing/2014/main" xmlns="" w="9525">
                   <a:solidFill>
                     <a:srgbClr val="000000"/>
                   </a:solidFill>
@@ -20096,7 +20098,7 @@
             </a:ln>
             <a:extLst>
               <a:ext uri="{91240B29-F687-4f45-9708-019B960494DF}">
-                <a14:hiddenLine xmlns="" xmlns:a16="http://schemas.microsoft.com/office/drawing/2014/main" xmlns:p14="http://schemas.microsoft.com/office/powerpoint/2010/main" xmlns:a14="http://schemas.microsoft.com/office/drawing/2010/main" w="9525">
+                <a14:hiddenLine xmlns:a14="http://schemas.microsoft.com/office/drawing/2010/main" xmlns:p14="http://schemas.microsoft.com/office/powerpoint/2010/main" xmlns:a16="http://schemas.microsoft.com/office/drawing/2014/main" xmlns="" w="9525">
                   <a:solidFill>
                     <a:srgbClr val="000000"/>
                   </a:solidFill>
@@ -20224,7 +20226,7 @@
             </a:ln>
             <a:extLst>
               <a:ext uri="{91240B29-F687-4f45-9708-019B960494DF}">
-                <a14:hiddenLine xmlns="" xmlns:a16="http://schemas.microsoft.com/office/drawing/2014/main" xmlns:p14="http://schemas.microsoft.com/office/powerpoint/2010/main" xmlns:a14="http://schemas.microsoft.com/office/drawing/2010/main" w="9525">
+                <a14:hiddenLine xmlns:a14="http://schemas.microsoft.com/office/drawing/2010/main" xmlns:p14="http://schemas.microsoft.com/office/powerpoint/2010/main" xmlns:a16="http://schemas.microsoft.com/office/drawing/2014/main" xmlns="" w="9525">
                   <a:solidFill>
                     <a:srgbClr val="000000"/>
                   </a:solidFill>
@@ -20308,7 +20310,7 @@
             </a:ln>
             <a:extLst>
               <a:ext uri="{91240B29-F687-4f45-9708-019B960494DF}">
-                <a14:hiddenLine xmlns="" xmlns:a16="http://schemas.microsoft.com/office/drawing/2014/main" xmlns:p14="http://schemas.microsoft.com/office/powerpoint/2010/main" xmlns:a14="http://schemas.microsoft.com/office/drawing/2010/main" w="9525">
+                <a14:hiddenLine xmlns:a14="http://schemas.microsoft.com/office/drawing/2010/main" xmlns:p14="http://schemas.microsoft.com/office/powerpoint/2010/main" xmlns:a16="http://schemas.microsoft.com/office/drawing/2014/main" xmlns="" w="9525">
                   <a:solidFill>
                     <a:srgbClr val="000000"/>
                   </a:solidFill>
@@ -20392,7 +20394,7 @@
             </a:ln>
             <a:extLst>
               <a:ext uri="{91240B29-F687-4f45-9708-019B960494DF}">
-                <a14:hiddenLine xmlns="" xmlns:a16="http://schemas.microsoft.com/office/drawing/2014/main" xmlns:p14="http://schemas.microsoft.com/office/powerpoint/2010/main" xmlns:a14="http://schemas.microsoft.com/office/drawing/2010/main" w="9525">
+                <a14:hiddenLine xmlns:a14="http://schemas.microsoft.com/office/drawing/2010/main" xmlns:p14="http://schemas.microsoft.com/office/powerpoint/2010/main" xmlns:a16="http://schemas.microsoft.com/office/drawing/2014/main" xmlns="" w="9525">
                   <a:solidFill>
                     <a:srgbClr val="000000"/>
                   </a:solidFill>
@@ -20504,7 +20506,7 @@
             </a:ln>
             <a:extLst>
               <a:ext uri="{91240B29-F687-4f45-9708-019B960494DF}">
-                <a14:hiddenLine xmlns="" xmlns:a16="http://schemas.microsoft.com/office/drawing/2014/main" xmlns:p14="http://schemas.microsoft.com/office/powerpoint/2010/main" xmlns:a14="http://schemas.microsoft.com/office/drawing/2010/main" w="9525">
+                <a14:hiddenLine xmlns:a14="http://schemas.microsoft.com/office/drawing/2010/main" xmlns:p14="http://schemas.microsoft.com/office/powerpoint/2010/main" xmlns:a16="http://schemas.microsoft.com/office/drawing/2014/main" xmlns="" w="9525">
                   <a:solidFill>
                     <a:srgbClr val="000000"/>
                   </a:solidFill>
@@ -20560,7 +20562,7 @@
             </a:ln>
             <a:extLst>
               <a:ext uri="{91240B29-F687-4f45-9708-019B960494DF}">
-                <a14:hiddenLine xmlns="" xmlns:a16="http://schemas.microsoft.com/office/drawing/2014/main" xmlns:p14="http://schemas.microsoft.com/office/powerpoint/2010/main" xmlns:a14="http://schemas.microsoft.com/office/drawing/2010/main" w="9525">
+                <a14:hiddenLine xmlns:a14="http://schemas.microsoft.com/office/drawing/2010/main" xmlns:p14="http://schemas.microsoft.com/office/powerpoint/2010/main" xmlns:a16="http://schemas.microsoft.com/office/drawing/2014/main" xmlns="" w="9525">
                   <a:solidFill>
                     <a:srgbClr val="000000"/>
                   </a:solidFill>
@@ -20647,7 +20649,7 @@
             </a:ln>
             <a:extLst>
               <a:ext uri="{91240B29-F687-4f45-9708-019B960494DF}">
-                <a14:hiddenLine xmlns="" xmlns:a16="http://schemas.microsoft.com/office/drawing/2014/main" xmlns:p14="http://schemas.microsoft.com/office/powerpoint/2010/main" xmlns:a14="http://schemas.microsoft.com/office/drawing/2010/main" w="9525">
+                <a14:hiddenLine xmlns:a14="http://schemas.microsoft.com/office/drawing/2010/main" xmlns:p14="http://schemas.microsoft.com/office/powerpoint/2010/main" xmlns:a16="http://schemas.microsoft.com/office/drawing/2014/main" xmlns="" w="9525">
                   <a:solidFill>
                     <a:srgbClr val="000000"/>
                   </a:solidFill>
@@ -20759,7 +20761,7 @@
             </a:ln>
             <a:extLst>
               <a:ext uri="{91240B29-F687-4f45-9708-019B960494DF}">
-                <a14:hiddenLine xmlns="" xmlns:a16="http://schemas.microsoft.com/office/drawing/2014/main" xmlns:p14="http://schemas.microsoft.com/office/powerpoint/2010/main" xmlns:a14="http://schemas.microsoft.com/office/drawing/2010/main" w="9525">
+                <a14:hiddenLine xmlns:a14="http://schemas.microsoft.com/office/drawing/2010/main" xmlns:p14="http://schemas.microsoft.com/office/powerpoint/2010/main" xmlns:a16="http://schemas.microsoft.com/office/drawing/2014/main" xmlns="" w="9525">
                   <a:solidFill>
                     <a:srgbClr val="000000"/>
                   </a:solidFill>
@@ -20843,7 +20845,7 @@
             </a:ln>
             <a:extLst>
               <a:ext uri="{91240B29-F687-4f45-9708-019B960494DF}">
-                <a14:hiddenLine xmlns="" xmlns:a16="http://schemas.microsoft.com/office/drawing/2014/main" xmlns:p14="http://schemas.microsoft.com/office/powerpoint/2010/main" xmlns:a14="http://schemas.microsoft.com/office/drawing/2010/main" w="9525">
+                <a14:hiddenLine xmlns:a14="http://schemas.microsoft.com/office/drawing/2010/main" xmlns:p14="http://schemas.microsoft.com/office/powerpoint/2010/main" xmlns:a16="http://schemas.microsoft.com/office/drawing/2014/main" xmlns="" w="9525">
                   <a:solidFill>
                     <a:srgbClr val="000000"/>
                   </a:solidFill>
@@ -20955,7 +20957,7 @@
             </a:ln>
             <a:extLst>
               <a:ext uri="{91240B29-F687-4f45-9708-019B960494DF}">
-                <a14:hiddenLine xmlns="" xmlns:a16="http://schemas.microsoft.com/office/drawing/2014/main" xmlns:p14="http://schemas.microsoft.com/office/powerpoint/2010/main" xmlns:a14="http://schemas.microsoft.com/office/drawing/2010/main" w="9525">
+                <a14:hiddenLine xmlns:a14="http://schemas.microsoft.com/office/drawing/2010/main" xmlns:p14="http://schemas.microsoft.com/office/powerpoint/2010/main" xmlns:a16="http://schemas.microsoft.com/office/drawing/2014/main" xmlns="" w="9525">
                   <a:solidFill>
                     <a:srgbClr val="000000"/>
                   </a:solidFill>
@@ -21042,7 +21044,7 @@
             </a:ln>
             <a:extLst>
               <a:ext uri="{91240B29-F687-4f45-9708-019B960494DF}">
-                <a14:hiddenLine xmlns="" xmlns:a16="http://schemas.microsoft.com/office/drawing/2014/main" xmlns:p14="http://schemas.microsoft.com/office/powerpoint/2010/main" xmlns:a14="http://schemas.microsoft.com/office/drawing/2010/main" w="9525">
+                <a14:hiddenLine xmlns:a14="http://schemas.microsoft.com/office/drawing/2010/main" xmlns:p14="http://schemas.microsoft.com/office/powerpoint/2010/main" xmlns:a16="http://schemas.microsoft.com/office/drawing/2014/main" xmlns="" w="9525">
                   <a:solidFill>
                     <a:srgbClr val="000000"/>
                   </a:solidFill>
@@ -21126,7 +21128,7 @@
             </a:ln>
             <a:extLst>
               <a:ext uri="{91240B29-F687-4f45-9708-019B960494DF}">
-                <a14:hiddenLine xmlns="" xmlns:a16="http://schemas.microsoft.com/office/drawing/2014/main" xmlns:p14="http://schemas.microsoft.com/office/powerpoint/2010/main" xmlns:a14="http://schemas.microsoft.com/office/drawing/2010/main" w="9525">
+                <a14:hiddenLine xmlns:a14="http://schemas.microsoft.com/office/drawing/2010/main" xmlns:p14="http://schemas.microsoft.com/office/powerpoint/2010/main" xmlns:a16="http://schemas.microsoft.com/office/drawing/2014/main" xmlns="" w="9525">
                   <a:solidFill>
                     <a:srgbClr val="000000"/>
                   </a:solidFill>
@@ -21238,7 +21240,7 @@
             </a:ln>
             <a:extLst>
               <a:ext uri="{91240B29-F687-4f45-9708-019B960494DF}">
-                <a14:hiddenLine xmlns="" xmlns:a16="http://schemas.microsoft.com/office/drawing/2014/main" xmlns:p14="http://schemas.microsoft.com/office/powerpoint/2010/main" xmlns:a14="http://schemas.microsoft.com/office/drawing/2010/main" w="9525">
+                <a14:hiddenLine xmlns:a14="http://schemas.microsoft.com/office/drawing/2010/main" xmlns:p14="http://schemas.microsoft.com/office/powerpoint/2010/main" xmlns:a16="http://schemas.microsoft.com/office/drawing/2014/main" xmlns="" w="9525">
                   <a:solidFill>
                     <a:srgbClr val="000000"/>
                   </a:solidFill>
@@ -21350,7 +21352,7 @@
             </a:ln>
             <a:extLst>
               <a:ext uri="{91240B29-F687-4f45-9708-019B960494DF}">
-                <a14:hiddenLine xmlns="" xmlns:a16="http://schemas.microsoft.com/office/drawing/2014/main" xmlns:p14="http://schemas.microsoft.com/office/powerpoint/2010/main" xmlns:a14="http://schemas.microsoft.com/office/drawing/2010/main" w="9525">
+                <a14:hiddenLine xmlns:a14="http://schemas.microsoft.com/office/drawing/2010/main" xmlns:p14="http://schemas.microsoft.com/office/powerpoint/2010/main" xmlns:a16="http://schemas.microsoft.com/office/drawing/2014/main" xmlns="" w="9525">
                   <a:solidFill>
                     <a:srgbClr val="000000"/>
                   </a:solidFill>
@@ -21437,7 +21439,7 @@
             </a:ln>
             <a:extLst>
               <a:ext uri="{91240B29-F687-4f45-9708-019B960494DF}">
-                <a14:hiddenLine xmlns="" xmlns:a16="http://schemas.microsoft.com/office/drawing/2014/main" xmlns:p14="http://schemas.microsoft.com/office/powerpoint/2010/main" xmlns:a14="http://schemas.microsoft.com/office/drawing/2010/main" w="9525">
+                <a14:hiddenLine xmlns:a14="http://schemas.microsoft.com/office/drawing/2010/main" xmlns:p14="http://schemas.microsoft.com/office/powerpoint/2010/main" xmlns:a16="http://schemas.microsoft.com/office/drawing/2014/main" xmlns="" w="9525">
                   <a:solidFill>
                     <a:srgbClr val="000000"/>
                   </a:solidFill>
@@ -21579,7 +21581,7 @@
             </a:ln>
             <a:extLst>
               <a:ext uri="{91240B29-F687-4f45-9708-019B960494DF}">
-                <a14:hiddenLine xmlns="" xmlns:a16="http://schemas.microsoft.com/office/drawing/2014/main" xmlns:p14="http://schemas.microsoft.com/office/powerpoint/2010/main" xmlns:a14="http://schemas.microsoft.com/office/drawing/2010/main" w="9525">
+                <a14:hiddenLine xmlns:a14="http://schemas.microsoft.com/office/drawing/2010/main" xmlns:p14="http://schemas.microsoft.com/office/powerpoint/2010/main" xmlns:a16="http://schemas.microsoft.com/office/drawing/2014/main" xmlns="" w="9525">
                   <a:solidFill>
                     <a:srgbClr val="000000"/>
                   </a:solidFill>
@@ -21813,7 +21815,7 @@
             </a:ln>
             <a:extLst>
               <a:ext uri="{91240B29-F687-4f45-9708-019B960494DF}">
-                <a14:hiddenLine xmlns="" xmlns:a16="http://schemas.microsoft.com/office/drawing/2014/main" xmlns:p14="http://schemas.microsoft.com/office/powerpoint/2010/main" xmlns:a14="http://schemas.microsoft.com/office/drawing/2010/main" w="9525">
+                <a14:hiddenLine xmlns:a14="http://schemas.microsoft.com/office/drawing/2010/main" xmlns:p14="http://schemas.microsoft.com/office/powerpoint/2010/main" xmlns:a16="http://schemas.microsoft.com/office/drawing/2014/main" xmlns="" w="9525">
                   <a:solidFill>
                     <a:srgbClr val="000000"/>
                   </a:solidFill>
@@ -21950,7 +21952,7 @@
             </a:ln>
             <a:extLst>
               <a:ext uri="{91240B29-F687-4f45-9708-019B960494DF}">
-                <a14:hiddenLine xmlns="" xmlns:a16="http://schemas.microsoft.com/office/drawing/2014/main" xmlns:p14="http://schemas.microsoft.com/office/powerpoint/2010/main" xmlns:a14="http://schemas.microsoft.com/office/drawing/2010/main" w="9525">
+                <a14:hiddenLine xmlns:a14="http://schemas.microsoft.com/office/drawing/2010/main" xmlns:p14="http://schemas.microsoft.com/office/powerpoint/2010/main" xmlns:a16="http://schemas.microsoft.com/office/drawing/2014/main" xmlns="" w="9525">
                   <a:solidFill>
                     <a:srgbClr val="000000"/>
                   </a:solidFill>
@@ -22062,7 +22064,7 @@
             </a:ln>
             <a:extLst>
               <a:ext uri="{91240B29-F687-4f45-9708-019B960494DF}">
-                <a14:hiddenLine xmlns="" xmlns:a16="http://schemas.microsoft.com/office/drawing/2014/main" xmlns:p14="http://schemas.microsoft.com/office/powerpoint/2010/main" xmlns:a14="http://schemas.microsoft.com/office/drawing/2010/main" w="9525">
+                <a14:hiddenLine xmlns:a14="http://schemas.microsoft.com/office/drawing/2010/main" xmlns:p14="http://schemas.microsoft.com/office/powerpoint/2010/main" xmlns:a16="http://schemas.microsoft.com/office/drawing/2014/main" xmlns="" w="9525">
                   <a:solidFill>
                     <a:srgbClr val="000000"/>
                   </a:solidFill>
@@ -22149,7 +22151,7 @@
             </a:ln>
             <a:extLst>
               <a:ext uri="{91240B29-F687-4f45-9708-019B960494DF}">
-                <a14:hiddenLine xmlns="" xmlns:a16="http://schemas.microsoft.com/office/drawing/2014/main" xmlns:p14="http://schemas.microsoft.com/office/powerpoint/2010/main" xmlns:a14="http://schemas.microsoft.com/office/drawing/2010/main" w="9525">
+                <a14:hiddenLine xmlns:a14="http://schemas.microsoft.com/office/drawing/2010/main" xmlns:p14="http://schemas.microsoft.com/office/powerpoint/2010/main" xmlns:a16="http://schemas.microsoft.com/office/drawing/2014/main" xmlns="" w="9525">
                   <a:solidFill>
                     <a:srgbClr val="000000"/>
                   </a:solidFill>
@@ -22261,7 +22263,7 @@
             </a:ln>
             <a:extLst>
               <a:ext uri="{91240B29-F687-4f45-9708-019B960494DF}">
-                <a14:hiddenLine xmlns="" xmlns:a16="http://schemas.microsoft.com/office/drawing/2014/main" xmlns:p14="http://schemas.microsoft.com/office/powerpoint/2010/main" xmlns:a14="http://schemas.microsoft.com/office/drawing/2010/main" w="9525">
+                <a14:hiddenLine xmlns:a14="http://schemas.microsoft.com/office/drawing/2010/main" xmlns:p14="http://schemas.microsoft.com/office/powerpoint/2010/main" xmlns:a16="http://schemas.microsoft.com/office/drawing/2014/main" xmlns="" w="9525">
                   <a:solidFill>
                     <a:srgbClr val="000000"/>
                   </a:solidFill>
@@ -22351,7 +22353,7 @@
             </a:ln>
             <a:extLst>
               <a:ext uri="{91240B29-F687-4f45-9708-019B960494DF}">
-                <a14:hiddenLine xmlns="" xmlns:a16="http://schemas.microsoft.com/office/drawing/2014/main" xmlns:p14="http://schemas.microsoft.com/office/powerpoint/2010/main" xmlns:a14="http://schemas.microsoft.com/office/drawing/2010/main" w="9525">
+                <a14:hiddenLine xmlns:a14="http://schemas.microsoft.com/office/drawing/2010/main" xmlns:p14="http://schemas.microsoft.com/office/powerpoint/2010/main" xmlns:a16="http://schemas.microsoft.com/office/drawing/2014/main" xmlns="" w="9525">
                   <a:solidFill>
                     <a:srgbClr val="000000"/>
                   </a:solidFill>
@@ -22463,7 +22465,7 @@
             </a:ln>
             <a:extLst>
               <a:ext uri="{91240B29-F687-4f45-9708-019B960494DF}">
-                <a14:hiddenLine xmlns="" xmlns:a16="http://schemas.microsoft.com/office/drawing/2014/main" xmlns:p14="http://schemas.microsoft.com/office/powerpoint/2010/main" xmlns:a14="http://schemas.microsoft.com/office/drawing/2010/main" w="9525">
+                <a14:hiddenLine xmlns:a14="http://schemas.microsoft.com/office/drawing/2010/main" xmlns:p14="http://schemas.microsoft.com/office/powerpoint/2010/main" xmlns:a16="http://schemas.microsoft.com/office/drawing/2014/main" xmlns="" w="9525">
                   <a:solidFill>
                     <a:srgbClr val="000000"/>
                   </a:solidFill>
@@ -22553,7 +22555,7 @@
             </a:ln>
             <a:extLst>
               <a:ext uri="{91240B29-F687-4f45-9708-019B960494DF}">
-                <a14:hiddenLine xmlns="" xmlns:a16="http://schemas.microsoft.com/office/drawing/2014/main" xmlns:p14="http://schemas.microsoft.com/office/powerpoint/2010/main" xmlns:a14="http://schemas.microsoft.com/office/drawing/2010/main" w="9525">
+                <a14:hiddenLine xmlns:a14="http://schemas.microsoft.com/office/drawing/2010/main" xmlns:p14="http://schemas.microsoft.com/office/powerpoint/2010/main" xmlns:a16="http://schemas.microsoft.com/office/drawing/2014/main" xmlns="" w="9525">
                   <a:solidFill>
                     <a:srgbClr val="000000"/>
                   </a:solidFill>
@@ -22665,7 +22667,7 @@
             </a:ln>
             <a:extLst>
               <a:ext uri="{91240B29-F687-4f45-9708-019B960494DF}">
-                <a14:hiddenLine xmlns="" xmlns:a16="http://schemas.microsoft.com/office/drawing/2014/main" xmlns:p14="http://schemas.microsoft.com/office/powerpoint/2010/main" xmlns:a14="http://schemas.microsoft.com/office/drawing/2010/main" w="9525">
+                <a14:hiddenLine xmlns:a14="http://schemas.microsoft.com/office/drawing/2010/main" xmlns:p14="http://schemas.microsoft.com/office/powerpoint/2010/main" xmlns:a16="http://schemas.microsoft.com/office/drawing/2014/main" xmlns="" w="9525">
                   <a:solidFill>
                     <a:srgbClr val="000000"/>
                   </a:solidFill>
@@ -22721,7 +22723,7 @@
             </a:ln>
             <a:extLst>
               <a:ext uri="{91240B29-F687-4f45-9708-019B960494DF}">
-                <a14:hiddenLine xmlns="" xmlns:a16="http://schemas.microsoft.com/office/drawing/2014/main" xmlns:p14="http://schemas.microsoft.com/office/powerpoint/2010/main" xmlns:a14="http://schemas.microsoft.com/office/drawing/2010/main" w="9525">
+                <a14:hiddenLine xmlns:a14="http://schemas.microsoft.com/office/drawing/2010/main" xmlns:p14="http://schemas.microsoft.com/office/powerpoint/2010/main" xmlns:a16="http://schemas.microsoft.com/office/drawing/2014/main" xmlns="" w="9525">
                   <a:solidFill>
                     <a:srgbClr val="000000"/>
                   </a:solidFill>
@@ -22965,7 +22967,7 @@
             </a:ln>
             <a:extLst>
               <a:ext uri="{91240B29-F687-4f45-9708-019B960494DF}">
-                <a14:hiddenLine xmlns:a14="http://schemas.microsoft.com/office/drawing/2010/main" xmlns:p14="http://schemas.microsoft.com/office/powerpoint/2010/main" xmlns:a16="http://schemas.microsoft.com/office/drawing/2014/main" xmlns="" w="9525">
+                <a14:hiddenLine xmlns="" xmlns:a16="http://schemas.microsoft.com/office/drawing/2014/main" xmlns:p14="http://schemas.microsoft.com/office/powerpoint/2010/main" xmlns:a14="http://schemas.microsoft.com/office/drawing/2010/main" w="9525">
                   <a:solidFill>
                     <a:srgbClr val="000000"/>
                   </a:solidFill>
@@ -23077,7 +23079,7 @@
             </a:ln>
             <a:extLst>
               <a:ext uri="{91240B29-F687-4f45-9708-019B960494DF}">
-                <a14:hiddenLine xmlns:a14="http://schemas.microsoft.com/office/drawing/2010/main" xmlns:p14="http://schemas.microsoft.com/office/powerpoint/2010/main" xmlns:a16="http://schemas.microsoft.com/office/drawing/2014/main" xmlns="" w="9525">
+                <a14:hiddenLine xmlns="" xmlns:a16="http://schemas.microsoft.com/office/drawing/2014/main" xmlns:p14="http://schemas.microsoft.com/office/powerpoint/2010/main" xmlns:a14="http://schemas.microsoft.com/office/drawing/2010/main" w="9525">
                   <a:solidFill>
                     <a:srgbClr val="000000"/>
                   </a:solidFill>
@@ -23189,7 +23191,7 @@
             </a:ln>
             <a:extLst>
               <a:ext uri="{91240B29-F687-4f45-9708-019B960494DF}">
-                <a14:hiddenLine xmlns:a14="http://schemas.microsoft.com/office/drawing/2010/main" xmlns:p14="http://schemas.microsoft.com/office/powerpoint/2010/main" xmlns:a16="http://schemas.microsoft.com/office/drawing/2014/main" xmlns="" w="9525">
+                <a14:hiddenLine xmlns="" xmlns:a16="http://schemas.microsoft.com/office/drawing/2014/main" xmlns:p14="http://schemas.microsoft.com/office/powerpoint/2010/main" xmlns:a14="http://schemas.microsoft.com/office/drawing/2010/main" w="9525">
                   <a:solidFill>
                     <a:srgbClr val="000000"/>
                   </a:solidFill>
@@ -23273,7 +23275,7 @@
             </a:ln>
             <a:extLst>
               <a:ext uri="{91240B29-F687-4f45-9708-019B960494DF}">
-                <a14:hiddenLine xmlns:a14="http://schemas.microsoft.com/office/drawing/2010/main" xmlns:p14="http://schemas.microsoft.com/office/powerpoint/2010/main" xmlns:a16="http://schemas.microsoft.com/office/drawing/2014/main" xmlns="" w="9525">
+                <a14:hiddenLine xmlns="" xmlns:a16="http://schemas.microsoft.com/office/drawing/2014/main" xmlns:p14="http://schemas.microsoft.com/office/powerpoint/2010/main" xmlns:a14="http://schemas.microsoft.com/office/drawing/2010/main" w="9525">
                   <a:solidFill>
                     <a:srgbClr val="000000"/>
                   </a:solidFill>
@@ -23385,7 +23387,7 @@
             </a:ln>
             <a:extLst>
               <a:ext uri="{91240B29-F687-4f45-9708-019B960494DF}">
-                <a14:hiddenLine xmlns:a14="http://schemas.microsoft.com/office/drawing/2010/main" xmlns:p14="http://schemas.microsoft.com/office/powerpoint/2010/main" xmlns:a16="http://schemas.microsoft.com/office/drawing/2014/main" xmlns="" w="9525">
+                <a14:hiddenLine xmlns="" xmlns:a16="http://schemas.microsoft.com/office/drawing/2014/main" xmlns:p14="http://schemas.microsoft.com/office/powerpoint/2010/main" xmlns:a14="http://schemas.microsoft.com/office/drawing/2010/main" w="9525">
                   <a:solidFill>
                     <a:srgbClr val="000000"/>
                   </a:solidFill>
@@ -23469,7 +23471,7 @@
             </a:ln>
             <a:extLst>
               <a:ext uri="{91240B29-F687-4f45-9708-019B960494DF}">
-                <a14:hiddenLine xmlns:a14="http://schemas.microsoft.com/office/drawing/2010/main" xmlns:p14="http://schemas.microsoft.com/office/powerpoint/2010/main" xmlns:a16="http://schemas.microsoft.com/office/drawing/2014/main" xmlns="" w="9525">
+                <a14:hiddenLine xmlns="" xmlns:a16="http://schemas.microsoft.com/office/drawing/2014/main" xmlns:p14="http://schemas.microsoft.com/office/powerpoint/2010/main" xmlns:a14="http://schemas.microsoft.com/office/drawing/2010/main" w="9525">
                   <a:solidFill>
                     <a:srgbClr val="000000"/>
                   </a:solidFill>
@@ -23553,7 +23555,7 @@
             </a:ln>
             <a:extLst>
               <a:ext uri="{91240B29-F687-4f45-9708-019B960494DF}">
-                <a14:hiddenLine xmlns:a14="http://schemas.microsoft.com/office/drawing/2010/main" xmlns:p14="http://schemas.microsoft.com/office/powerpoint/2010/main" xmlns:a16="http://schemas.microsoft.com/office/drawing/2014/main" xmlns="" w="9525">
+                <a14:hiddenLine xmlns="" xmlns:a16="http://schemas.microsoft.com/office/drawing/2014/main" xmlns:p14="http://schemas.microsoft.com/office/powerpoint/2010/main" xmlns:a14="http://schemas.microsoft.com/office/drawing/2010/main" w="9525">
                   <a:solidFill>
                     <a:srgbClr val="000000"/>
                   </a:solidFill>
@@ -23665,7 +23667,7 @@
             </a:ln>
             <a:extLst>
               <a:ext uri="{91240B29-F687-4f45-9708-019B960494DF}">
-                <a14:hiddenLine xmlns:a14="http://schemas.microsoft.com/office/drawing/2010/main" xmlns:p14="http://schemas.microsoft.com/office/powerpoint/2010/main" xmlns:a16="http://schemas.microsoft.com/office/drawing/2014/main" xmlns="" w="9525">
+                <a14:hiddenLine xmlns="" xmlns:a16="http://schemas.microsoft.com/office/drawing/2014/main" xmlns:p14="http://schemas.microsoft.com/office/powerpoint/2010/main" xmlns:a14="http://schemas.microsoft.com/office/drawing/2010/main" w="9525">
                   <a:solidFill>
                     <a:srgbClr val="000000"/>
                   </a:solidFill>
@@ -23777,7 +23779,7 @@
             </a:ln>
             <a:extLst>
               <a:ext uri="{91240B29-F687-4f45-9708-019B960494DF}">
-                <a14:hiddenLine xmlns:a14="http://schemas.microsoft.com/office/drawing/2010/main" xmlns:p14="http://schemas.microsoft.com/office/powerpoint/2010/main" xmlns:a16="http://schemas.microsoft.com/office/drawing/2014/main" xmlns="" w="9525">
+                <a14:hiddenLine xmlns="" xmlns:a16="http://schemas.microsoft.com/office/drawing/2014/main" xmlns:p14="http://schemas.microsoft.com/office/powerpoint/2010/main" xmlns:a14="http://schemas.microsoft.com/office/drawing/2010/main" w="9525">
                   <a:solidFill>
                     <a:srgbClr val="000000"/>
                   </a:solidFill>
@@ -23861,7 +23863,7 @@
             </a:ln>
             <a:extLst>
               <a:ext uri="{91240B29-F687-4f45-9708-019B960494DF}">
-                <a14:hiddenLine xmlns:a14="http://schemas.microsoft.com/office/drawing/2010/main" xmlns:p14="http://schemas.microsoft.com/office/powerpoint/2010/main" xmlns:a16="http://schemas.microsoft.com/office/drawing/2014/main" xmlns="" w="9525">
+                <a14:hiddenLine xmlns="" xmlns:a16="http://schemas.microsoft.com/office/drawing/2014/main" xmlns:p14="http://schemas.microsoft.com/office/powerpoint/2010/main" xmlns:a14="http://schemas.microsoft.com/office/drawing/2010/main" w="9525">
                   <a:solidFill>
                     <a:srgbClr val="000000"/>
                   </a:solidFill>
@@ -23993,7 +23995,7 @@
             </a:ln>
             <a:extLst>
               <a:ext uri="{91240B29-F687-4f45-9708-019B960494DF}">
-                <a14:hiddenLine xmlns:a14="http://schemas.microsoft.com/office/drawing/2010/main" xmlns:p14="http://schemas.microsoft.com/office/powerpoint/2010/main" xmlns:a16="http://schemas.microsoft.com/office/drawing/2014/main" xmlns="" w="9525">
+                <a14:hiddenLine xmlns="" xmlns:a16="http://schemas.microsoft.com/office/drawing/2014/main" xmlns:p14="http://schemas.microsoft.com/office/powerpoint/2010/main" xmlns:a14="http://schemas.microsoft.com/office/drawing/2010/main" w="9525">
                   <a:solidFill>
                     <a:srgbClr val="000000"/>
                   </a:solidFill>
@@ -24121,7 +24123,7 @@
             </a:ln>
             <a:extLst>
               <a:ext uri="{91240B29-F687-4f45-9708-019B960494DF}">
-                <a14:hiddenLine xmlns:a14="http://schemas.microsoft.com/office/drawing/2010/main" xmlns:p14="http://schemas.microsoft.com/office/powerpoint/2010/main" xmlns:a16="http://schemas.microsoft.com/office/drawing/2014/main" xmlns="" w="9525">
+                <a14:hiddenLine xmlns="" xmlns:a16="http://schemas.microsoft.com/office/drawing/2014/main" xmlns:p14="http://schemas.microsoft.com/office/powerpoint/2010/main" xmlns:a14="http://schemas.microsoft.com/office/drawing/2010/main" w="9525">
                   <a:solidFill>
                     <a:srgbClr val="000000"/>
                   </a:solidFill>
@@ -24205,7 +24207,7 @@
             </a:ln>
             <a:extLst>
               <a:ext uri="{91240B29-F687-4f45-9708-019B960494DF}">
-                <a14:hiddenLine xmlns:a14="http://schemas.microsoft.com/office/drawing/2010/main" xmlns:p14="http://schemas.microsoft.com/office/powerpoint/2010/main" xmlns:a16="http://schemas.microsoft.com/office/drawing/2014/main" xmlns="" w="9525">
+                <a14:hiddenLine xmlns="" xmlns:a16="http://schemas.microsoft.com/office/drawing/2014/main" xmlns:p14="http://schemas.microsoft.com/office/powerpoint/2010/main" xmlns:a14="http://schemas.microsoft.com/office/drawing/2010/main" w="9525">
                   <a:solidFill>
                     <a:srgbClr val="000000"/>
                   </a:solidFill>
@@ -24289,7 +24291,7 @@
             </a:ln>
             <a:extLst>
               <a:ext uri="{91240B29-F687-4f45-9708-019B960494DF}">
-                <a14:hiddenLine xmlns:a14="http://schemas.microsoft.com/office/drawing/2010/main" xmlns:p14="http://schemas.microsoft.com/office/powerpoint/2010/main" xmlns:a16="http://schemas.microsoft.com/office/drawing/2014/main" xmlns="" w="9525">
+                <a14:hiddenLine xmlns="" xmlns:a16="http://schemas.microsoft.com/office/drawing/2014/main" xmlns:p14="http://schemas.microsoft.com/office/powerpoint/2010/main" xmlns:a14="http://schemas.microsoft.com/office/drawing/2010/main" w="9525">
                   <a:solidFill>
                     <a:srgbClr val="000000"/>
                   </a:solidFill>
@@ -24401,7 +24403,7 @@
             </a:ln>
             <a:extLst>
               <a:ext uri="{91240B29-F687-4f45-9708-019B960494DF}">
-                <a14:hiddenLine xmlns:a14="http://schemas.microsoft.com/office/drawing/2010/main" xmlns:p14="http://schemas.microsoft.com/office/powerpoint/2010/main" xmlns:a16="http://schemas.microsoft.com/office/drawing/2014/main" xmlns="" w="9525">
+                <a14:hiddenLine xmlns="" xmlns:a16="http://schemas.microsoft.com/office/drawing/2014/main" xmlns:p14="http://schemas.microsoft.com/office/powerpoint/2010/main" xmlns:a14="http://schemas.microsoft.com/office/drawing/2010/main" w="9525">
                   <a:solidFill>
                     <a:srgbClr val="000000"/>
                   </a:solidFill>
@@ -24457,7 +24459,7 @@
             </a:ln>
             <a:extLst>
               <a:ext uri="{91240B29-F687-4f45-9708-019B960494DF}">
-                <a14:hiddenLine xmlns:a14="http://schemas.microsoft.com/office/drawing/2010/main" xmlns:p14="http://schemas.microsoft.com/office/powerpoint/2010/main" xmlns:a16="http://schemas.microsoft.com/office/drawing/2014/main" xmlns="" w="9525">
+                <a14:hiddenLine xmlns="" xmlns:a16="http://schemas.microsoft.com/office/drawing/2014/main" xmlns:p14="http://schemas.microsoft.com/office/powerpoint/2010/main" xmlns:a14="http://schemas.microsoft.com/office/drawing/2010/main" w="9525">
                   <a:solidFill>
                     <a:srgbClr val="000000"/>
                   </a:solidFill>
@@ -24544,7 +24546,7 @@
             </a:ln>
             <a:extLst>
               <a:ext uri="{91240B29-F687-4f45-9708-019B960494DF}">
-                <a14:hiddenLine xmlns:a14="http://schemas.microsoft.com/office/drawing/2010/main" xmlns:p14="http://schemas.microsoft.com/office/powerpoint/2010/main" xmlns:a16="http://schemas.microsoft.com/office/drawing/2014/main" xmlns="" w="9525">
+                <a14:hiddenLine xmlns="" xmlns:a16="http://schemas.microsoft.com/office/drawing/2014/main" xmlns:p14="http://schemas.microsoft.com/office/powerpoint/2010/main" xmlns:a14="http://schemas.microsoft.com/office/drawing/2010/main" w="9525">
                   <a:solidFill>
                     <a:srgbClr val="000000"/>
                   </a:solidFill>
@@ -24656,7 +24658,7 @@
             </a:ln>
             <a:extLst>
               <a:ext uri="{91240B29-F687-4f45-9708-019B960494DF}">
-                <a14:hiddenLine xmlns:a14="http://schemas.microsoft.com/office/drawing/2010/main" xmlns:p14="http://schemas.microsoft.com/office/powerpoint/2010/main" xmlns:a16="http://schemas.microsoft.com/office/drawing/2014/main" xmlns="" w="9525">
+                <a14:hiddenLine xmlns="" xmlns:a16="http://schemas.microsoft.com/office/drawing/2014/main" xmlns:p14="http://schemas.microsoft.com/office/powerpoint/2010/main" xmlns:a14="http://schemas.microsoft.com/office/drawing/2010/main" w="9525">
                   <a:solidFill>
                     <a:srgbClr val="000000"/>
                   </a:solidFill>
@@ -24740,7 +24742,7 @@
             </a:ln>
             <a:extLst>
               <a:ext uri="{91240B29-F687-4f45-9708-019B960494DF}">
-                <a14:hiddenLine xmlns:a14="http://schemas.microsoft.com/office/drawing/2010/main" xmlns:p14="http://schemas.microsoft.com/office/powerpoint/2010/main" xmlns:a16="http://schemas.microsoft.com/office/drawing/2014/main" xmlns="" w="9525">
+                <a14:hiddenLine xmlns="" xmlns:a16="http://schemas.microsoft.com/office/drawing/2014/main" xmlns:p14="http://schemas.microsoft.com/office/powerpoint/2010/main" xmlns:a14="http://schemas.microsoft.com/office/drawing/2010/main" w="9525">
                   <a:solidFill>
                     <a:srgbClr val="000000"/>
                   </a:solidFill>
@@ -24852,7 +24854,7 @@
             </a:ln>
             <a:extLst>
               <a:ext uri="{91240B29-F687-4f45-9708-019B960494DF}">
-                <a14:hiddenLine xmlns:a14="http://schemas.microsoft.com/office/drawing/2010/main" xmlns:p14="http://schemas.microsoft.com/office/powerpoint/2010/main" xmlns:a16="http://schemas.microsoft.com/office/drawing/2014/main" xmlns="" w="9525">
+                <a14:hiddenLine xmlns="" xmlns:a16="http://schemas.microsoft.com/office/drawing/2014/main" xmlns:p14="http://schemas.microsoft.com/office/powerpoint/2010/main" xmlns:a14="http://schemas.microsoft.com/office/drawing/2010/main" w="9525">
                   <a:solidFill>
                     <a:srgbClr val="000000"/>
                   </a:solidFill>
@@ -24939,7 +24941,7 @@
             </a:ln>
             <a:extLst>
               <a:ext uri="{91240B29-F687-4f45-9708-019B960494DF}">
-                <a14:hiddenLine xmlns:a14="http://schemas.microsoft.com/office/drawing/2010/main" xmlns:p14="http://schemas.microsoft.com/office/powerpoint/2010/main" xmlns:a16="http://schemas.microsoft.com/office/drawing/2014/main" xmlns="" w="9525">
+                <a14:hiddenLine xmlns="" xmlns:a16="http://schemas.microsoft.com/office/drawing/2014/main" xmlns:p14="http://schemas.microsoft.com/office/powerpoint/2010/main" xmlns:a14="http://schemas.microsoft.com/office/drawing/2010/main" w="9525">
                   <a:solidFill>
                     <a:srgbClr val="000000"/>
                   </a:solidFill>
@@ -25023,7 +25025,7 @@
             </a:ln>
             <a:extLst>
               <a:ext uri="{91240B29-F687-4f45-9708-019B960494DF}">
-                <a14:hiddenLine xmlns:a14="http://schemas.microsoft.com/office/drawing/2010/main" xmlns:p14="http://schemas.microsoft.com/office/powerpoint/2010/main" xmlns:a16="http://schemas.microsoft.com/office/drawing/2014/main" xmlns="" w="9525">
+                <a14:hiddenLine xmlns="" xmlns:a16="http://schemas.microsoft.com/office/drawing/2014/main" xmlns:p14="http://schemas.microsoft.com/office/powerpoint/2010/main" xmlns:a14="http://schemas.microsoft.com/office/drawing/2010/main" w="9525">
                   <a:solidFill>
                     <a:srgbClr val="000000"/>
                   </a:solidFill>
@@ -25135,7 +25137,7 @@
             </a:ln>
             <a:extLst>
               <a:ext uri="{91240B29-F687-4f45-9708-019B960494DF}">
-                <a14:hiddenLine xmlns:a14="http://schemas.microsoft.com/office/drawing/2010/main" xmlns:p14="http://schemas.microsoft.com/office/powerpoint/2010/main" xmlns:a16="http://schemas.microsoft.com/office/drawing/2014/main" xmlns="" w="9525">
+                <a14:hiddenLine xmlns="" xmlns:a16="http://schemas.microsoft.com/office/drawing/2014/main" xmlns:p14="http://schemas.microsoft.com/office/powerpoint/2010/main" xmlns:a14="http://schemas.microsoft.com/office/drawing/2010/main" w="9525">
                   <a:solidFill>
                     <a:srgbClr val="000000"/>
                   </a:solidFill>
@@ -25247,7 +25249,7 @@
             </a:ln>
             <a:extLst>
               <a:ext uri="{91240B29-F687-4f45-9708-019B960494DF}">
-                <a14:hiddenLine xmlns:a14="http://schemas.microsoft.com/office/drawing/2010/main" xmlns:p14="http://schemas.microsoft.com/office/powerpoint/2010/main" xmlns:a16="http://schemas.microsoft.com/office/drawing/2014/main" xmlns="" w="9525">
+                <a14:hiddenLine xmlns="" xmlns:a16="http://schemas.microsoft.com/office/drawing/2014/main" xmlns:p14="http://schemas.microsoft.com/office/powerpoint/2010/main" xmlns:a14="http://schemas.microsoft.com/office/drawing/2010/main" w="9525">
                   <a:solidFill>
                     <a:srgbClr val="000000"/>
                   </a:solidFill>
@@ -25334,7 +25336,7 @@
             </a:ln>
             <a:extLst>
               <a:ext uri="{91240B29-F687-4f45-9708-019B960494DF}">
-                <a14:hiddenLine xmlns:a14="http://schemas.microsoft.com/office/drawing/2010/main" xmlns:p14="http://schemas.microsoft.com/office/powerpoint/2010/main" xmlns:a16="http://schemas.microsoft.com/office/drawing/2014/main" xmlns="" w="9525">
+                <a14:hiddenLine xmlns="" xmlns:a16="http://schemas.microsoft.com/office/drawing/2014/main" xmlns:p14="http://schemas.microsoft.com/office/powerpoint/2010/main" xmlns:a14="http://schemas.microsoft.com/office/drawing/2010/main" w="9525">
                   <a:solidFill>
                     <a:srgbClr val="000000"/>
                   </a:solidFill>
@@ -25476,7 +25478,7 @@
             </a:ln>
             <a:extLst>
               <a:ext uri="{91240B29-F687-4f45-9708-019B960494DF}">
-                <a14:hiddenLine xmlns:a14="http://schemas.microsoft.com/office/drawing/2010/main" xmlns:p14="http://schemas.microsoft.com/office/powerpoint/2010/main" xmlns:a16="http://schemas.microsoft.com/office/drawing/2014/main" xmlns="" w="9525">
+                <a14:hiddenLine xmlns="" xmlns:a16="http://schemas.microsoft.com/office/drawing/2014/main" xmlns:p14="http://schemas.microsoft.com/office/powerpoint/2010/main" xmlns:a14="http://schemas.microsoft.com/office/drawing/2010/main" w="9525">
                   <a:solidFill>
                     <a:srgbClr val="000000"/>
                   </a:solidFill>
@@ -25716,7 +25718,7 @@
             </a:ln>
             <a:extLst>
               <a:ext uri="{91240B29-F687-4f45-9708-019B960494DF}">
-                <a14:hiddenLine xmlns:a14="http://schemas.microsoft.com/office/drawing/2010/main" xmlns:p14="http://schemas.microsoft.com/office/powerpoint/2010/main" xmlns:a16="http://schemas.microsoft.com/office/drawing/2014/main" xmlns="" w="9525">
+                <a14:hiddenLine xmlns="" xmlns:a16="http://schemas.microsoft.com/office/drawing/2014/main" xmlns:p14="http://schemas.microsoft.com/office/powerpoint/2010/main" xmlns:a14="http://schemas.microsoft.com/office/drawing/2010/main" w="9525">
                   <a:solidFill>
                     <a:srgbClr val="000000"/>
                   </a:solidFill>
@@ -25853,7 +25855,7 @@
             </a:ln>
             <a:extLst>
               <a:ext uri="{91240B29-F687-4f45-9708-019B960494DF}">
-                <a14:hiddenLine xmlns:a14="http://schemas.microsoft.com/office/drawing/2010/main" xmlns:p14="http://schemas.microsoft.com/office/powerpoint/2010/main" xmlns:a16="http://schemas.microsoft.com/office/drawing/2014/main" xmlns="" w="9525">
+                <a14:hiddenLine xmlns="" xmlns:a16="http://schemas.microsoft.com/office/drawing/2014/main" xmlns:p14="http://schemas.microsoft.com/office/powerpoint/2010/main" xmlns:a14="http://schemas.microsoft.com/office/drawing/2010/main" w="9525">
                   <a:solidFill>
                     <a:srgbClr val="000000"/>
                   </a:solidFill>
@@ -25965,7 +25967,7 @@
             </a:ln>
             <a:extLst>
               <a:ext uri="{91240B29-F687-4f45-9708-019B960494DF}">
-                <a14:hiddenLine xmlns:a14="http://schemas.microsoft.com/office/drawing/2010/main" xmlns:p14="http://schemas.microsoft.com/office/powerpoint/2010/main" xmlns:a16="http://schemas.microsoft.com/office/drawing/2014/main" xmlns="" w="9525">
+                <a14:hiddenLine xmlns="" xmlns:a16="http://schemas.microsoft.com/office/drawing/2014/main" xmlns:p14="http://schemas.microsoft.com/office/powerpoint/2010/main" xmlns:a14="http://schemas.microsoft.com/office/drawing/2010/main" w="9525">
                   <a:solidFill>
                     <a:srgbClr val="000000"/>
                   </a:solidFill>
@@ -26052,7 +26054,7 @@
             </a:ln>
             <a:extLst>
               <a:ext uri="{91240B29-F687-4f45-9708-019B960494DF}">
-                <a14:hiddenLine xmlns:a14="http://schemas.microsoft.com/office/drawing/2010/main" xmlns:p14="http://schemas.microsoft.com/office/powerpoint/2010/main" xmlns:a16="http://schemas.microsoft.com/office/drawing/2014/main" xmlns="" w="9525">
+                <a14:hiddenLine xmlns="" xmlns:a16="http://schemas.microsoft.com/office/drawing/2014/main" xmlns:p14="http://schemas.microsoft.com/office/powerpoint/2010/main" xmlns:a14="http://schemas.microsoft.com/office/drawing/2010/main" w="9525">
                   <a:solidFill>
                     <a:srgbClr val="000000"/>
                   </a:solidFill>
@@ -26164,7 +26166,7 @@
             </a:ln>
             <a:extLst>
               <a:ext uri="{91240B29-F687-4f45-9708-019B960494DF}">
-                <a14:hiddenLine xmlns:a14="http://schemas.microsoft.com/office/drawing/2010/main" xmlns:p14="http://schemas.microsoft.com/office/powerpoint/2010/main" xmlns:a16="http://schemas.microsoft.com/office/drawing/2014/main" xmlns="" w="9525">
+                <a14:hiddenLine xmlns="" xmlns:a16="http://schemas.microsoft.com/office/drawing/2014/main" xmlns:p14="http://schemas.microsoft.com/office/powerpoint/2010/main" xmlns:a14="http://schemas.microsoft.com/office/drawing/2010/main" w="9525">
                   <a:solidFill>
                     <a:srgbClr val="000000"/>
                   </a:solidFill>
@@ -26254,7 +26256,7 @@
             </a:ln>
             <a:extLst>
               <a:ext uri="{91240B29-F687-4f45-9708-019B960494DF}">
-                <a14:hiddenLine xmlns:a14="http://schemas.microsoft.com/office/drawing/2010/main" xmlns:p14="http://schemas.microsoft.com/office/powerpoint/2010/main" xmlns:a16="http://schemas.microsoft.com/office/drawing/2014/main" xmlns="" w="9525">
+                <a14:hiddenLine xmlns="" xmlns:a16="http://schemas.microsoft.com/office/drawing/2014/main" xmlns:p14="http://schemas.microsoft.com/office/powerpoint/2010/main" xmlns:a14="http://schemas.microsoft.com/office/drawing/2010/main" w="9525">
                   <a:solidFill>
                     <a:srgbClr val="000000"/>
                   </a:solidFill>
@@ -26366,7 +26368,7 @@
             </a:ln>
             <a:extLst>
               <a:ext uri="{91240B29-F687-4f45-9708-019B960494DF}">
-                <a14:hiddenLine xmlns:a14="http://schemas.microsoft.com/office/drawing/2010/main" xmlns:p14="http://schemas.microsoft.com/office/powerpoint/2010/main" xmlns:a16="http://schemas.microsoft.com/office/drawing/2014/main" xmlns="" w="9525">
+                <a14:hiddenLine xmlns="" xmlns:a16="http://schemas.microsoft.com/office/drawing/2014/main" xmlns:p14="http://schemas.microsoft.com/office/powerpoint/2010/main" xmlns:a14="http://schemas.microsoft.com/office/drawing/2010/main" w="9525">
                   <a:solidFill>
                     <a:srgbClr val="000000"/>
                   </a:solidFill>
@@ -26456,7 +26458,7 @@
             </a:ln>
             <a:extLst>
               <a:ext uri="{91240B29-F687-4f45-9708-019B960494DF}">
-                <a14:hiddenLine xmlns:a14="http://schemas.microsoft.com/office/drawing/2010/main" xmlns:p14="http://schemas.microsoft.com/office/powerpoint/2010/main" xmlns:a16="http://schemas.microsoft.com/office/drawing/2014/main" xmlns="" w="9525">
+                <a14:hiddenLine xmlns="" xmlns:a16="http://schemas.microsoft.com/office/drawing/2014/main" xmlns:p14="http://schemas.microsoft.com/office/powerpoint/2010/main" xmlns:a14="http://schemas.microsoft.com/office/drawing/2010/main" w="9525">
                   <a:solidFill>
                     <a:srgbClr val="000000"/>
                   </a:solidFill>
@@ -26568,7 +26570,7 @@
             </a:ln>
             <a:extLst>
               <a:ext uri="{91240B29-F687-4f45-9708-019B960494DF}">
-                <a14:hiddenLine xmlns:a14="http://schemas.microsoft.com/office/drawing/2010/main" xmlns:p14="http://schemas.microsoft.com/office/powerpoint/2010/main" xmlns:a16="http://schemas.microsoft.com/office/drawing/2014/main" xmlns="" w="9525">
+                <a14:hiddenLine xmlns="" xmlns:a16="http://schemas.microsoft.com/office/drawing/2014/main" xmlns:p14="http://schemas.microsoft.com/office/powerpoint/2010/main" xmlns:a14="http://schemas.microsoft.com/office/drawing/2010/main" w="9525">
                   <a:solidFill>
                     <a:srgbClr val="000000"/>
                   </a:solidFill>
@@ -26624,7 +26626,7 @@
             </a:ln>
             <a:extLst>
               <a:ext uri="{91240B29-F687-4f45-9708-019B960494DF}">
-                <a14:hiddenLine xmlns:a14="http://schemas.microsoft.com/office/drawing/2010/main" xmlns:p14="http://schemas.microsoft.com/office/powerpoint/2010/main" xmlns:a16="http://schemas.microsoft.com/office/drawing/2014/main" xmlns="" w="9525">
+                <a14:hiddenLine xmlns="" xmlns:a16="http://schemas.microsoft.com/office/drawing/2014/main" xmlns:p14="http://schemas.microsoft.com/office/powerpoint/2010/main" xmlns:a14="http://schemas.microsoft.com/office/drawing/2010/main" w="9525">
                   <a:solidFill>
                     <a:srgbClr val="000000"/>
                   </a:solidFill>
@@ -26915,7 +26917,7 @@
             </a:ln>
             <a:extLst>
               <a:ext uri="{91240B29-F687-4f45-9708-019B960494DF}">
-                <a14:hiddenLine xmlns:a14="http://schemas.microsoft.com/office/drawing/2010/main" xmlns:p14="http://schemas.microsoft.com/office/powerpoint/2010/main" xmlns:a16="http://schemas.microsoft.com/office/drawing/2014/main" xmlns="" w="9525">
+                <a14:hiddenLine xmlns="" xmlns:a16="http://schemas.microsoft.com/office/drawing/2014/main" xmlns:p14="http://schemas.microsoft.com/office/powerpoint/2010/main" xmlns:a14="http://schemas.microsoft.com/office/drawing/2010/main" w="9525">
                   <a:solidFill>
                     <a:srgbClr val="000000"/>
                   </a:solidFill>
@@ -27027,7 +27029,7 @@
             </a:ln>
             <a:extLst>
               <a:ext uri="{91240B29-F687-4f45-9708-019B960494DF}">
-                <a14:hiddenLine xmlns:a14="http://schemas.microsoft.com/office/drawing/2010/main" xmlns:p14="http://schemas.microsoft.com/office/powerpoint/2010/main" xmlns:a16="http://schemas.microsoft.com/office/drawing/2014/main" xmlns="" w="9525">
+                <a14:hiddenLine xmlns="" xmlns:a16="http://schemas.microsoft.com/office/drawing/2014/main" xmlns:p14="http://schemas.microsoft.com/office/powerpoint/2010/main" xmlns:a14="http://schemas.microsoft.com/office/drawing/2010/main" w="9525">
                   <a:solidFill>
                     <a:srgbClr val="000000"/>
                   </a:solidFill>
@@ -27139,7 +27141,7 @@
             </a:ln>
             <a:extLst>
               <a:ext uri="{91240B29-F687-4f45-9708-019B960494DF}">
-                <a14:hiddenLine xmlns:a14="http://schemas.microsoft.com/office/drawing/2010/main" xmlns:p14="http://schemas.microsoft.com/office/powerpoint/2010/main" xmlns:a16="http://schemas.microsoft.com/office/drawing/2014/main" xmlns="" w="9525">
+                <a14:hiddenLine xmlns="" xmlns:a16="http://schemas.microsoft.com/office/drawing/2014/main" xmlns:p14="http://schemas.microsoft.com/office/powerpoint/2010/main" xmlns:a14="http://schemas.microsoft.com/office/drawing/2010/main" w="9525">
                   <a:solidFill>
                     <a:srgbClr val="000000"/>
                   </a:solidFill>
@@ -27223,7 +27225,7 @@
             </a:ln>
             <a:extLst>
               <a:ext uri="{91240B29-F687-4f45-9708-019B960494DF}">
-                <a14:hiddenLine xmlns:a14="http://schemas.microsoft.com/office/drawing/2010/main" xmlns:p14="http://schemas.microsoft.com/office/powerpoint/2010/main" xmlns:a16="http://schemas.microsoft.com/office/drawing/2014/main" xmlns="" w="9525">
+                <a14:hiddenLine xmlns="" xmlns:a16="http://schemas.microsoft.com/office/drawing/2014/main" xmlns:p14="http://schemas.microsoft.com/office/powerpoint/2010/main" xmlns:a14="http://schemas.microsoft.com/office/drawing/2010/main" w="9525">
                   <a:solidFill>
                     <a:srgbClr val="000000"/>
                   </a:solidFill>
@@ -27335,7 +27337,7 @@
             </a:ln>
             <a:extLst>
               <a:ext uri="{91240B29-F687-4f45-9708-019B960494DF}">
-                <a14:hiddenLine xmlns:a14="http://schemas.microsoft.com/office/drawing/2010/main" xmlns:p14="http://schemas.microsoft.com/office/powerpoint/2010/main" xmlns:a16="http://schemas.microsoft.com/office/drawing/2014/main" xmlns="" w="9525">
+                <a14:hiddenLine xmlns="" xmlns:a16="http://schemas.microsoft.com/office/drawing/2014/main" xmlns:p14="http://schemas.microsoft.com/office/powerpoint/2010/main" xmlns:a14="http://schemas.microsoft.com/office/drawing/2010/main" w="9525">
                   <a:solidFill>
                     <a:srgbClr val="000000"/>
                   </a:solidFill>
@@ -27419,7 +27421,7 @@
             </a:ln>
             <a:extLst>
               <a:ext uri="{91240B29-F687-4f45-9708-019B960494DF}">
-                <a14:hiddenLine xmlns:a14="http://schemas.microsoft.com/office/drawing/2010/main" xmlns:p14="http://schemas.microsoft.com/office/powerpoint/2010/main" xmlns:a16="http://schemas.microsoft.com/office/drawing/2014/main" xmlns="" w="9525">
+                <a14:hiddenLine xmlns="" xmlns:a16="http://schemas.microsoft.com/office/drawing/2014/main" xmlns:p14="http://schemas.microsoft.com/office/powerpoint/2010/main" xmlns:a14="http://schemas.microsoft.com/office/drawing/2010/main" w="9525">
                   <a:solidFill>
                     <a:srgbClr val="000000"/>
                   </a:solidFill>
@@ -27503,7 +27505,7 @@
             </a:ln>
             <a:extLst>
               <a:ext uri="{91240B29-F687-4f45-9708-019B960494DF}">
-                <a14:hiddenLine xmlns:a14="http://schemas.microsoft.com/office/drawing/2010/main" xmlns:p14="http://schemas.microsoft.com/office/powerpoint/2010/main" xmlns:a16="http://schemas.microsoft.com/office/drawing/2014/main" xmlns="" w="9525">
+                <a14:hiddenLine xmlns="" xmlns:a16="http://schemas.microsoft.com/office/drawing/2014/main" xmlns:p14="http://schemas.microsoft.com/office/powerpoint/2010/main" xmlns:a14="http://schemas.microsoft.com/office/drawing/2010/main" w="9525">
                   <a:solidFill>
                     <a:srgbClr val="000000"/>
                   </a:solidFill>
@@ -27615,7 +27617,7 @@
             </a:ln>
             <a:extLst>
               <a:ext uri="{91240B29-F687-4f45-9708-019B960494DF}">
-                <a14:hiddenLine xmlns:a14="http://schemas.microsoft.com/office/drawing/2010/main" xmlns:p14="http://schemas.microsoft.com/office/powerpoint/2010/main" xmlns:a16="http://schemas.microsoft.com/office/drawing/2014/main" xmlns="" w="9525">
+                <a14:hiddenLine xmlns="" xmlns:a16="http://schemas.microsoft.com/office/drawing/2014/main" xmlns:p14="http://schemas.microsoft.com/office/powerpoint/2010/main" xmlns:a14="http://schemas.microsoft.com/office/drawing/2010/main" w="9525">
                   <a:solidFill>
                     <a:srgbClr val="000000"/>
                   </a:solidFill>
@@ -27727,7 +27729,7 @@
             </a:ln>
             <a:extLst>
               <a:ext uri="{91240B29-F687-4f45-9708-019B960494DF}">
-                <a14:hiddenLine xmlns:a14="http://schemas.microsoft.com/office/drawing/2010/main" xmlns:p14="http://schemas.microsoft.com/office/powerpoint/2010/main" xmlns:a16="http://schemas.microsoft.com/office/drawing/2014/main" xmlns="" w="9525">
+                <a14:hiddenLine xmlns="" xmlns:a16="http://schemas.microsoft.com/office/drawing/2014/main" xmlns:p14="http://schemas.microsoft.com/office/powerpoint/2010/main" xmlns:a14="http://schemas.microsoft.com/office/drawing/2010/main" w="9525">
                   <a:solidFill>
                     <a:srgbClr val="000000"/>
                   </a:solidFill>
@@ -27811,7 +27813,7 @@
             </a:ln>
             <a:extLst>
               <a:ext uri="{91240B29-F687-4f45-9708-019B960494DF}">
-                <a14:hiddenLine xmlns:a14="http://schemas.microsoft.com/office/drawing/2010/main" xmlns:p14="http://schemas.microsoft.com/office/powerpoint/2010/main" xmlns:a16="http://schemas.microsoft.com/office/drawing/2014/main" xmlns="" w="9525">
+                <a14:hiddenLine xmlns="" xmlns:a16="http://schemas.microsoft.com/office/drawing/2014/main" xmlns:p14="http://schemas.microsoft.com/office/powerpoint/2010/main" xmlns:a14="http://schemas.microsoft.com/office/drawing/2010/main" w="9525">
                   <a:solidFill>
                     <a:srgbClr val="000000"/>
                   </a:solidFill>
@@ -27943,7 +27945,7 @@
             </a:ln>
             <a:extLst>
               <a:ext uri="{91240B29-F687-4f45-9708-019B960494DF}">
-                <a14:hiddenLine xmlns:a14="http://schemas.microsoft.com/office/drawing/2010/main" xmlns:p14="http://schemas.microsoft.com/office/powerpoint/2010/main" xmlns:a16="http://schemas.microsoft.com/office/drawing/2014/main" xmlns="" w="9525">
+                <a14:hiddenLine xmlns="" xmlns:a16="http://schemas.microsoft.com/office/drawing/2014/main" xmlns:p14="http://schemas.microsoft.com/office/powerpoint/2010/main" xmlns:a14="http://schemas.microsoft.com/office/drawing/2010/main" w="9525">
                   <a:solidFill>
                     <a:srgbClr val="000000"/>
                   </a:solidFill>
@@ -28071,7 +28073,7 @@
             </a:ln>
             <a:extLst>
               <a:ext uri="{91240B29-F687-4f45-9708-019B960494DF}">
-                <a14:hiddenLine xmlns:a14="http://schemas.microsoft.com/office/drawing/2010/main" xmlns:p14="http://schemas.microsoft.com/office/powerpoint/2010/main" xmlns:a16="http://schemas.microsoft.com/office/drawing/2014/main" xmlns="" w="9525">
+                <a14:hiddenLine xmlns="" xmlns:a16="http://schemas.microsoft.com/office/drawing/2014/main" xmlns:p14="http://schemas.microsoft.com/office/powerpoint/2010/main" xmlns:a14="http://schemas.microsoft.com/office/drawing/2010/main" w="9525">
                   <a:solidFill>
                     <a:srgbClr val="000000"/>
                   </a:solidFill>
@@ -28155,7 +28157,7 @@
             </a:ln>
             <a:extLst>
               <a:ext uri="{91240B29-F687-4f45-9708-019B960494DF}">
-                <a14:hiddenLine xmlns:a14="http://schemas.microsoft.com/office/drawing/2010/main" xmlns:p14="http://schemas.microsoft.com/office/powerpoint/2010/main" xmlns:a16="http://schemas.microsoft.com/office/drawing/2014/main" xmlns="" w="9525">
+                <a14:hiddenLine xmlns="" xmlns:a16="http://schemas.microsoft.com/office/drawing/2014/main" xmlns:p14="http://schemas.microsoft.com/office/powerpoint/2010/main" xmlns:a14="http://schemas.microsoft.com/office/drawing/2010/main" w="9525">
                   <a:solidFill>
                     <a:srgbClr val="000000"/>
                   </a:solidFill>
@@ -28239,7 +28241,7 @@
             </a:ln>
             <a:extLst>
               <a:ext uri="{91240B29-F687-4f45-9708-019B960494DF}">
-                <a14:hiddenLine xmlns:a14="http://schemas.microsoft.com/office/drawing/2010/main" xmlns:p14="http://schemas.microsoft.com/office/powerpoint/2010/main" xmlns:a16="http://schemas.microsoft.com/office/drawing/2014/main" xmlns="" w="9525">
+                <a14:hiddenLine xmlns="" xmlns:a16="http://schemas.microsoft.com/office/drawing/2014/main" xmlns:p14="http://schemas.microsoft.com/office/powerpoint/2010/main" xmlns:a14="http://schemas.microsoft.com/office/drawing/2010/main" w="9525">
                   <a:solidFill>
                     <a:srgbClr val="000000"/>
                   </a:solidFill>
@@ -28351,7 +28353,7 @@
             </a:ln>
             <a:extLst>
               <a:ext uri="{91240B29-F687-4f45-9708-019B960494DF}">
-                <a14:hiddenLine xmlns:a14="http://schemas.microsoft.com/office/drawing/2010/main" xmlns:p14="http://schemas.microsoft.com/office/powerpoint/2010/main" xmlns:a16="http://schemas.microsoft.com/office/drawing/2014/main" xmlns="" w="9525">
+                <a14:hiddenLine xmlns="" xmlns:a16="http://schemas.microsoft.com/office/drawing/2014/main" xmlns:p14="http://schemas.microsoft.com/office/powerpoint/2010/main" xmlns:a14="http://schemas.microsoft.com/office/drawing/2010/main" w="9525">
                   <a:solidFill>
                     <a:srgbClr val="000000"/>
                   </a:solidFill>
@@ -28407,7 +28409,7 @@
             </a:ln>
             <a:extLst>
               <a:ext uri="{91240B29-F687-4f45-9708-019B960494DF}">
-                <a14:hiddenLine xmlns:a14="http://schemas.microsoft.com/office/drawing/2010/main" xmlns:p14="http://schemas.microsoft.com/office/powerpoint/2010/main" xmlns:a16="http://schemas.microsoft.com/office/drawing/2014/main" xmlns="" w="9525">
+                <a14:hiddenLine xmlns="" xmlns:a16="http://schemas.microsoft.com/office/drawing/2014/main" xmlns:p14="http://schemas.microsoft.com/office/powerpoint/2010/main" xmlns:a14="http://schemas.microsoft.com/office/drawing/2010/main" w="9525">
                   <a:solidFill>
                     <a:srgbClr val="000000"/>
                   </a:solidFill>
@@ -28494,7 +28496,7 @@
             </a:ln>
             <a:extLst>
               <a:ext uri="{91240B29-F687-4f45-9708-019B960494DF}">
-                <a14:hiddenLine xmlns:a14="http://schemas.microsoft.com/office/drawing/2010/main" xmlns:p14="http://schemas.microsoft.com/office/powerpoint/2010/main" xmlns:a16="http://schemas.microsoft.com/office/drawing/2014/main" xmlns="" w="9525">
+                <a14:hiddenLine xmlns="" xmlns:a16="http://schemas.microsoft.com/office/drawing/2014/main" xmlns:p14="http://schemas.microsoft.com/office/powerpoint/2010/main" xmlns:a14="http://schemas.microsoft.com/office/drawing/2010/main" w="9525">
                   <a:solidFill>
                     <a:srgbClr val="000000"/>
                   </a:solidFill>
@@ -28606,7 +28608,7 @@
             </a:ln>
             <a:extLst>
               <a:ext uri="{91240B29-F687-4f45-9708-019B960494DF}">
-                <a14:hiddenLine xmlns:a14="http://schemas.microsoft.com/office/drawing/2010/main" xmlns:p14="http://schemas.microsoft.com/office/powerpoint/2010/main" xmlns:a16="http://schemas.microsoft.com/office/drawing/2014/main" xmlns="" w="9525">
+                <a14:hiddenLine xmlns="" xmlns:a16="http://schemas.microsoft.com/office/drawing/2014/main" xmlns:p14="http://schemas.microsoft.com/office/powerpoint/2010/main" xmlns:a14="http://schemas.microsoft.com/office/drawing/2010/main" w="9525">
                   <a:solidFill>
                     <a:srgbClr val="000000"/>
                   </a:solidFill>
@@ -28690,7 +28692,7 @@
             </a:ln>
             <a:extLst>
               <a:ext uri="{91240B29-F687-4f45-9708-019B960494DF}">
-                <a14:hiddenLine xmlns:a14="http://schemas.microsoft.com/office/drawing/2010/main" xmlns:p14="http://schemas.microsoft.com/office/powerpoint/2010/main" xmlns:a16="http://schemas.microsoft.com/office/drawing/2014/main" xmlns="" w="9525">
+                <a14:hiddenLine xmlns="" xmlns:a16="http://schemas.microsoft.com/office/drawing/2014/main" xmlns:p14="http://schemas.microsoft.com/office/powerpoint/2010/main" xmlns:a14="http://schemas.microsoft.com/office/drawing/2010/main" w="9525">
                   <a:solidFill>
                     <a:srgbClr val="000000"/>
                   </a:solidFill>
@@ -28802,7 +28804,7 @@
             </a:ln>
             <a:extLst>
               <a:ext uri="{91240B29-F687-4f45-9708-019B960494DF}">
-                <a14:hiddenLine xmlns:a14="http://schemas.microsoft.com/office/drawing/2010/main" xmlns:p14="http://schemas.microsoft.com/office/powerpoint/2010/main" xmlns:a16="http://schemas.microsoft.com/office/drawing/2014/main" xmlns="" w="9525">
+                <a14:hiddenLine xmlns="" xmlns:a16="http://schemas.microsoft.com/office/drawing/2014/main" xmlns:p14="http://schemas.microsoft.com/office/powerpoint/2010/main" xmlns:a14="http://schemas.microsoft.com/office/drawing/2010/main" w="9525">
                   <a:solidFill>
                     <a:srgbClr val="000000"/>
                   </a:solidFill>
@@ -28889,7 +28891,7 @@
             </a:ln>
             <a:extLst>
               <a:ext uri="{91240B29-F687-4f45-9708-019B960494DF}">
-                <a14:hiddenLine xmlns:a14="http://schemas.microsoft.com/office/drawing/2010/main" xmlns:p14="http://schemas.microsoft.com/office/powerpoint/2010/main" xmlns:a16="http://schemas.microsoft.com/office/drawing/2014/main" xmlns="" w="9525">
+                <a14:hiddenLine xmlns="" xmlns:a16="http://schemas.microsoft.com/office/drawing/2014/main" xmlns:p14="http://schemas.microsoft.com/office/powerpoint/2010/main" xmlns:a14="http://schemas.microsoft.com/office/drawing/2010/main" w="9525">
                   <a:solidFill>
                     <a:srgbClr val="000000"/>
                   </a:solidFill>
@@ -28973,7 +28975,7 @@
             </a:ln>
             <a:extLst>
               <a:ext uri="{91240B29-F687-4f45-9708-019B960494DF}">
-                <a14:hiddenLine xmlns:a14="http://schemas.microsoft.com/office/drawing/2010/main" xmlns:p14="http://schemas.microsoft.com/office/powerpoint/2010/main" xmlns:a16="http://schemas.microsoft.com/office/drawing/2014/main" xmlns="" w="9525">
+                <a14:hiddenLine xmlns="" xmlns:a16="http://schemas.microsoft.com/office/drawing/2014/main" xmlns:p14="http://schemas.microsoft.com/office/powerpoint/2010/main" xmlns:a14="http://schemas.microsoft.com/office/drawing/2010/main" w="9525">
                   <a:solidFill>
                     <a:srgbClr val="000000"/>
                   </a:solidFill>
@@ -29085,7 +29087,7 @@
             </a:ln>
             <a:extLst>
               <a:ext uri="{91240B29-F687-4f45-9708-019B960494DF}">
-                <a14:hiddenLine xmlns:a14="http://schemas.microsoft.com/office/drawing/2010/main" xmlns:p14="http://schemas.microsoft.com/office/powerpoint/2010/main" xmlns:a16="http://schemas.microsoft.com/office/drawing/2014/main" xmlns="" w="9525">
+                <a14:hiddenLine xmlns="" xmlns:a16="http://schemas.microsoft.com/office/drawing/2014/main" xmlns:p14="http://schemas.microsoft.com/office/powerpoint/2010/main" xmlns:a14="http://schemas.microsoft.com/office/drawing/2010/main" w="9525">
                   <a:solidFill>
                     <a:srgbClr val="000000"/>
                   </a:solidFill>
@@ -29197,7 +29199,7 @@
             </a:ln>
             <a:extLst>
               <a:ext uri="{91240B29-F687-4f45-9708-019B960494DF}">
-                <a14:hiddenLine xmlns:a14="http://schemas.microsoft.com/office/drawing/2010/main" xmlns:p14="http://schemas.microsoft.com/office/powerpoint/2010/main" xmlns:a16="http://schemas.microsoft.com/office/drawing/2014/main" xmlns="" w="9525">
+                <a14:hiddenLine xmlns="" xmlns:a16="http://schemas.microsoft.com/office/drawing/2014/main" xmlns:p14="http://schemas.microsoft.com/office/powerpoint/2010/main" xmlns:a14="http://schemas.microsoft.com/office/drawing/2010/main" w="9525">
                   <a:solidFill>
                     <a:srgbClr val="000000"/>
                   </a:solidFill>
@@ -29284,7 +29286,7 @@
             </a:ln>
             <a:extLst>
               <a:ext uri="{91240B29-F687-4f45-9708-019B960494DF}">
-                <a14:hiddenLine xmlns:a14="http://schemas.microsoft.com/office/drawing/2010/main" xmlns:p14="http://schemas.microsoft.com/office/powerpoint/2010/main" xmlns:a16="http://schemas.microsoft.com/office/drawing/2014/main" xmlns="" w="9525">
+                <a14:hiddenLine xmlns="" xmlns:a16="http://schemas.microsoft.com/office/drawing/2014/main" xmlns:p14="http://schemas.microsoft.com/office/powerpoint/2010/main" xmlns:a14="http://schemas.microsoft.com/office/drawing/2010/main" w="9525">
                   <a:solidFill>
                     <a:srgbClr val="000000"/>
                   </a:solidFill>
@@ -29426,7 +29428,7 @@
             </a:ln>
             <a:extLst>
               <a:ext uri="{91240B29-F687-4f45-9708-019B960494DF}">
-                <a14:hiddenLine xmlns:a14="http://schemas.microsoft.com/office/drawing/2010/main" xmlns:p14="http://schemas.microsoft.com/office/powerpoint/2010/main" xmlns:a16="http://schemas.microsoft.com/office/drawing/2014/main" xmlns="" w="9525">
+                <a14:hiddenLine xmlns="" xmlns:a16="http://schemas.microsoft.com/office/drawing/2014/main" xmlns:p14="http://schemas.microsoft.com/office/powerpoint/2010/main" xmlns:a14="http://schemas.microsoft.com/office/drawing/2010/main" w="9525">
                   <a:solidFill>
                     <a:srgbClr val="000000"/>
                   </a:solidFill>
@@ -29481,38 +29483,41 @@
           </a:p>
         </p:txBody>
       </p:sp>
-      <p:sp>
-        <p:nvSpPr>
-          <p:cNvPr id="3" name="Content Placeholder 2">
+      <p:pic>
+        <p:nvPicPr>
+          <p:cNvPr id="5" name="Content Placeholder 4" descr="A diagram of a borrow records&#10;&#10;Description automatically generated">
             <a:extLst>
               <a:ext uri="{FF2B5EF4-FFF2-40B4-BE49-F238E27FC236}">
-                <a16:creationId xmlns:a16="http://schemas.microsoft.com/office/drawing/2014/main" id="{7D76AC7F-C33F-6089-DE02-4478CE037FA3}"/>
+                <a16:creationId xmlns:a16="http://schemas.microsoft.com/office/drawing/2014/main" id="{FEE1A9A0-2855-784F-B7FA-1F682018A01D}"/>
               </a:ext>
             </a:extLst>
           </p:cNvPr>
-          <p:cNvSpPr>
-            <a:spLocks noGrp="1"/>
-          </p:cNvSpPr>
+          <p:cNvPicPr>
+            <a:picLocks noGrp="1" noChangeAspect="1"/>
+          </p:cNvPicPr>
           <p:nvPr>
             <p:ph idx="1"/>
           </p:nvPr>
-        </p:nvSpPr>
+        </p:nvPicPr>
+        <p:blipFill>
+          <a:blip r:embed="rId2">
+            <a:extLst>
+              <a:ext uri="{28A0092B-C50C-407E-A947-70E740481C1C}">
+                <a14:useLocalDpi xmlns:a14="http://schemas.microsoft.com/office/drawing/2010/main" val="0"/>
+              </a:ext>
+            </a:extLst>
+          </a:blip>
+          <a:stretch>
+            <a:fillRect/>
+          </a:stretch>
+        </p:blipFill>
         <p:spPr>
           <a:xfrm>
-            <a:off x="1141412" y="2249487"/>
-            <a:ext cx="7631927" cy="3705226"/>
+            <a:off x="457069" y="1788967"/>
+            <a:ext cx="11282623" cy="4127789"/>
           </a:xfrm>
         </p:spPr>
-        <p:txBody>
-          <a:bodyPr anchor="t">
-            <a:normAutofit/>
-          </a:bodyPr>
-          <a:lstStyle/>
-          <a:p>
-            <a:endParaRPr lang="en-US" sz="1600" dirty="0"/>
-          </a:p>
-        </p:txBody>
-      </p:sp>
+      </p:pic>
       <p:grpSp>
         <p:nvGrpSpPr>
           <p:cNvPr id="39" name="Group 38">
@@ -29617,7 +29622,7 @@
             </a:ln>
             <a:extLst>
               <a:ext uri="{91240B29-F687-4f45-9708-019B960494DF}">
-                <a14:hiddenLine xmlns:a14="http://schemas.microsoft.com/office/drawing/2010/main" xmlns:p14="http://schemas.microsoft.com/office/powerpoint/2010/main" xmlns:a16="http://schemas.microsoft.com/office/drawing/2014/main" xmlns="" w="9525">
+                <a14:hiddenLine xmlns="" xmlns:a16="http://schemas.microsoft.com/office/drawing/2014/main" xmlns:p14="http://schemas.microsoft.com/office/powerpoint/2010/main" xmlns:a14="http://schemas.microsoft.com/office/drawing/2010/main" w="9525">
                   <a:solidFill>
                     <a:srgbClr val="000000"/>
                   </a:solidFill>
@@ -29754,7 +29759,7 @@
             </a:ln>
             <a:extLst>
               <a:ext uri="{91240B29-F687-4f45-9708-019B960494DF}">
-                <a14:hiddenLine xmlns:a14="http://schemas.microsoft.com/office/drawing/2010/main" xmlns:p14="http://schemas.microsoft.com/office/powerpoint/2010/main" xmlns:a16="http://schemas.microsoft.com/office/drawing/2014/main" xmlns="" w="9525">
+                <a14:hiddenLine xmlns="" xmlns:a16="http://schemas.microsoft.com/office/drawing/2014/main" xmlns:p14="http://schemas.microsoft.com/office/powerpoint/2010/main" xmlns:a14="http://schemas.microsoft.com/office/drawing/2010/main" w="9525">
                   <a:solidFill>
                     <a:srgbClr val="000000"/>
                   </a:solidFill>
@@ -29866,7 +29871,7 @@
             </a:ln>
             <a:extLst>
               <a:ext uri="{91240B29-F687-4f45-9708-019B960494DF}">
-                <a14:hiddenLine xmlns:a14="http://schemas.microsoft.com/office/drawing/2010/main" xmlns:p14="http://schemas.microsoft.com/office/powerpoint/2010/main" xmlns:a16="http://schemas.microsoft.com/office/drawing/2014/main" xmlns="" w="9525">
+                <a14:hiddenLine xmlns="" xmlns:a16="http://schemas.microsoft.com/office/drawing/2014/main" xmlns:p14="http://schemas.microsoft.com/office/powerpoint/2010/main" xmlns:a14="http://schemas.microsoft.com/office/drawing/2010/main" w="9525">
                   <a:solidFill>
                     <a:srgbClr val="000000"/>
                   </a:solidFill>
@@ -29953,7 +29958,7 @@
             </a:ln>
             <a:extLst>
               <a:ext uri="{91240B29-F687-4f45-9708-019B960494DF}">
-                <a14:hiddenLine xmlns:a14="http://schemas.microsoft.com/office/drawing/2010/main" xmlns:p14="http://schemas.microsoft.com/office/powerpoint/2010/main" xmlns:a16="http://schemas.microsoft.com/office/drawing/2014/main" xmlns="" w="9525">
+                <a14:hiddenLine xmlns="" xmlns:a16="http://schemas.microsoft.com/office/drawing/2014/main" xmlns:p14="http://schemas.microsoft.com/office/powerpoint/2010/main" xmlns:a14="http://schemas.microsoft.com/office/drawing/2010/main" w="9525">
                   <a:solidFill>
                     <a:srgbClr val="000000"/>
                   </a:solidFill>
@@ -30065,7 +30070,7 @@
             </a:ln>
             <a:extLst>
               <a:ext uri="{91240B29-F687-4f45-9708-019B960494DF}">
-                <a14:hiddenLine xmlns:a14="http://schemas.microsoft.com/office/drawing/2010/main" xmlns:p14="http://schemas.microsoft.com/office/powerpoint/2010/main" xmlns:a16="http://schemas.microsoft.com/office/drawing/2014/main" xmlns="" w="9525">
+                <a14:hiddenLine xmlns="" xmlns:a16="http://schemas.microsoft.com/office/drawing/2014/main" xmlns:p14="http://schemas.microsoft.com/office/powerpoint/2010/main" xmlns:a14="http://schemas.microsoft.com/office/drawing/2010/main" w="9525">
                   <a:solidFill>
                     <a:srgbClr val="000000"/>
                   </a:solidFill>
@@ -30155,7 +30160,7 @@
             </a:ln>
             <a:extLst>
               <a:ext uri="{91240B29-F687-4f45-9708-019B960494DF}">
-                <a14:hiddenLine xmlns:a14="http://schemas.microsoft.com/office/drawing/2010/main" xmlns:p14="http://schemas.microsoft.com/office/powerpoint/2010/main" xmlns:a16="http://schemas.microsoft.com/office/drawing/2014/main" xmlns="" w="9525">
+                <a14:hiddenLine xmlns="" xmlns:a16="http://schemas.microsoft.com/office/drawing/2014/main" xmlns:p14="http://schemas.microsoft.com/office/powerpoint/2010/main" xmlns:a14="http://schemas.microsoft.com/office/drawing/2010/main" w="9525">
                   <a:solidFill>
                     <a:srgbClr val="000000"/>
                   </a:solidFill>
@@ -30267,7 +30272,7 @@
             </a:ln>
             <a:extLst>
               <a:ext uri="{91240B29-F687-4f45-9708-019B960494DF}">
-                <a14:hiddenLine xmlns:a14="http://schemas.microsoft.com/office/drawing/2010/main" xmlns:p14="http://schemas.microsoft.com/office/powerpoint/2010/main" xmlns:a16="http://schemas.microsoft.com/office/drawing/2014/main" xmlns="" w="9525">
+                <a14:hiddenLine xmlns="" xmlns:a16="http://schemas.microsoft.com/office/drawing/2014/main" xmlns:p14="http://schemas.microsoft.com/office/powerpoint/2010/main" xmlns:a14="http://schemas.microsoft.com/office/drawing/2010/main" w="9525">
                   <a:solidFill>
                     <a:srgbClr val="000000"/>
                   </a:solidFill>
@@ -30357,7 +30362,7 @@
             </a:ln>
             <a:extLst>
               <a:ext uri="{91240B29-F687-4f45-9708-019B960494DF}">
-                <a14:hiddenLine xmlns:a14="http://schemas.microsoft.com/office/drawing/2010/main" xmlns:p14="http://schemas.microsoft.com/office/powerpoint/2010/main" xmlns:a16="http://schemas.microsoft.com/office/drawing/2014/main" xmlns="" w="9525">
+                <a14:hiddenLine xmlns="" xmlns:a16="http://schemas.microsoft.com/office/drawing/2014/main" xmlns:p14="http://schemas.microsoft.com/office/powerpoint/2010/main" xmlns:a14="http://schemas.microsoft.com/office/drawing/2010/main" w="9525">
                   <a:solidFill>
                     <a:srgbClr val="000000"/>
                   </a:solidFill>
@@ -30469,7 +30474,7 @@
             </a:ln>
             <a:extLst>
               <a:ext uri="{91240B29-F687-4f45-9708-019B960494DF}">
-                <a14:hiddenLine xmlns:a14="http://schemas.microsoft.com/office/drawing/2010/main" xmlns:p14="http://schemas.microsoft.com/office/powerpoint/2010/main" xmlns:a16="http://schemas.microsoft.com/office/drawing/2014/main" xmlns="" w="9525">
+                <a14:hiddenLine xmlns="" xmlns:a16="http://schemas.microsoft.com/office/drawing/2014/main" xmlns:p14="http://schemas.microsoft.com/office/powerpoint/2010/main" xmlns:a14="http://schemas.microsoft.com/office/drawing/2010/main" w="9525">
                   <a:solidFill>
                     <a:srgbClr val="000000"/>
                   </a:solidFill>
@@ -30525,7 +30530,7 @@
             </a:ln>
             <a:extLst>
               <a:ext uri="{91240B29-F687-4f45-9708-019B960494DF}">
-                <a14:hiddenLine xmlns:a14="http://schemas.microsoft.com/office/drawing/2010/main" xmlns:p14="http://schemas.microsoft.com/office/powerpoint/2010/main" xmlns:a16="http://schemas.microsoft.com/office/drawing/2014/main" xmlns="" w="9525">
+                <a14:hiddenLine xmlns="" xmlns:a16="http://schemas.microsoft.com/office/drawing/2014/main" xmlns:p14="http://schemas.microsoft.com/office/powerpoint/2010/main" xmlns:a14="http://schemas.microsoft.com/office/drawing/2010/main" w="9525">
                   <a:solidFill>
                     <a:srgbClr val="000000"/>
                   </a:solidFill>
@@ -30722,7 +30727,7 @@
             </a:ln>
             <a:extLst>
               <a:ext uri="{91240B29-F687-4f45-9708-019B960494DF}">
-                <a14:hiddenLine xmlns="" xmlns:a16="http://schemas.microsoft.com/office/drawing/2014/main" xmlns:p14="http://schemas.microsoft.com/office/powerpoint/2010/main" xmlns:a14="http://schemas.microsoft.com/office/drawing/2010/main" w="9525">
+                <a14:hiddenLine xmlns:a14="http://schemas.microsoft.com/office/drawing/2010/main" xmlns:p14="http://schemas.microsoft.com/office/powerpoint/2010/main" xmlns:a16="http://schemas.microsoft.com/office/drawing/2014/main" xmlns="" w="9525">
                   <a:solidFill>
                     <a:srgbClr val="000000"/>
                   </a:solidFill>
@@ -30834,7 +30839,7 @@
             </a:ln>
             <a:extLst>
               <a:ext uri="{91240B29-F687-4f45-9708-019B960494DF}">
-                <a14:hiddenLine xmlns="" xmlns:a16="http://schemas.microsoft.com/office/drawing/2014/main" xmlns:p14="http://schemas.microsoft.com/office/powerpoint/2010/main" xmlns:a14="http://schemas.microsoft.com/office/drawing/2010/main" w="9525">
+                <a14:hiddenLine xmlns:a14="http://schemas.microsoft.com/office/drawing/2010/main" xmlns:p14="http://schemas.microsoft.com/office/powerpoint/2010/main" xmlns:a16="http://schemas.microsoft.com/office/drawing/2014/main" xmlns="" w="9525">
                   <a:solidFill>
                     <a:srgbClr val="000000"/>
                   </a:solidFill>
@@ -30946,7 +30951,7 @@
             </a:ln>
             <a:extLst>
               <a:ext uri="{91240B29-F687-4f45-9708-019B960494DF}">
-                <a14:hiddenLine xmlns="" xmlns:a16="http://schemas.microsoft.com/office/drawing/2014/main" xmlns:p14="http://schemas.microsoft.com/office/powerpoint/2010/main" xmlns:a14="http://schemas.microsoft.com/office/drawing/2010/main" w="9525">
+                <a14:hiddenLine xmlns:a14="http://schemas.microsoft.com/office/drawing/2010/main" xmlns:p14="http://schemas.microsoft.com/office/powerpoint/2010/main" xmlns:a16="http://schemas.microsoft.com/office/drawing/2014/main" xmlns="" w="9525">
                   <a:solidFill>
                     <a:srgbClr val="000000"/>
                   </a:solidFill>
@@ -31030,7 +31035,7 @@
             </a:ln>
             <a:extLst>
               <a:ext uri="{91240B29-F687-4f45-9708-019B960494DF}">
-                <a14:hiddenLine xmlns="" xmlns:a16="http://schemas.microsoft.com/office/drawing/2014/main" xmlns:p14="http://schemas.microsoft.com/office/powerpoint/2010/main" xmlns:a14="http://schemas.microsoft.com/office/drawing/2010/main" w="9525">
+                <a14:hiddenLine xmlns:a14="http://schemas.microsoft.com/office/drawing/2010/main" xmlns:p14="http://schemas.microsoft.com/office/powerpoint/2010/main" xmlns:a16="http://schemas.microsoft.com/office/drawing/2014/main" xmlns="" w="9525">
                   <a:solidFill>
                     <a:srgbClr val="000000"/>
                   </a:solidFill>
@@ -31142,7 +31147,7 @@
             </a:ln>
             <a:extLst>
               <a:ext uri="{91240B29-F687-4f45-9708-019B960494DF}">
-                <a14:hiddenLine xmlns="" xmlns:a16="http://schemas.microsoft.com/office/drawing/2014/main" xmlns:p14="http://schemas.microsoft.com/office/powerpoint/2010/main" xmlns:a14="http://schemas.microsoft.com/office/drawing/2010/main" w="9525">
+                <a14:hiddenLine xmlns:a14="http://schemas.microsoft.com/office/drawing/2010/main" xmlns:p14="http://schemas.microsoft.com/office/powerpoint/2010/main" xmlns:a16="http://schemas.microsoft.com/office/drawing/2014/main" xmlns="" w="9525">
                   <a:solidFill>
                     <a:srgbClr val="000000"/>
                   </a:solidFill>
@@ -31226,7 +31231,7 @@
             </a:ln>
             <a:extLst>
               <a:ext uri="{91240B29-F687-4f45-9708-019B960494DF}">
-                <a14:hiddenLine xmlns="" xmlns:a16="http://schemas.microsoft.com/office/drawing/2014/main" xmlns:p14="http://schemas.microsoft.com/office/powerpoint/2010/main" xmlns:a14="http://schemas.microsoft.com/office/drawing/2010/main" w="9525">
+                <a14:hiddenLine xmlns:a14="http://schemas.microsoft.com/office/drawing/2010/main" xmlns:p14="http://schemas.microsoft.com/office/powerpoint/2010/main" xmlns:a16="http://schemas.microsoft.com/office/drawing/2014/main" xmlns="" w="9525">
                   <a:solidFill>
                     <a:srgbClr val="000000"/>
                   </a:solidFill>
@@ -31310,7 +31315,7 @@
             </a:ln>
             <a:extLst>
               <a:ext uri="{91240B29-F687-4f45-9708-019B960494DF}">
-                <a14:hiddenLine xmlns="" xmlns:a16="http://schemas.microsoft.com/office/drawing/2014/main" xmlns:p14="http://schemas.microsoft.com/office/powerpoint/2010/main" xmlns:a14="http://schemas.microsoft.com/office/drawing/2010/main" w="9525">
+                <a14:hiddenLine xmlns:a14="http://schemas.microsoft.com/office/drawing/2010/main" xmlns:p14="http://schemas.microsoft.com/office/powerpoint/2010/main" xmlns:a16="http://schemas.microsoft.com/office/drawing/2014/main" xmlns="" w="9525">
                   <a:solidFill>
                     <a:srgbClr val="000000"/>
                   </a:solidFill>
@@ -31422,7 +31427,7 @@
             </a:ln>
             <a:extLst>
               <a:ext uri="{91240B29-F687-4f45-9708-019B960494DF}">
-                <a14:hiddenLine xmlns="" xmlns:a16="http://schemas.microsoft.com/office/drawing/2014/main" xmlns:p14="http://schemas.microsoft.com/office/powerpoint/2010/main" xmlns:a14="http://schemas.microsoft.com/office/drawing/2010/main" w="9525">
+                <a14:hiddenLine xmlns:a14="http://schemas.microsoft.com/office/drawing/2010/main" xmlns:p14="http://schemas.microsoft.com/office/powerpoint/2010/main" xmlns:a16="http://schemas.microsoft.com/office/drawing/2014/main" xmlns="" w="9525">
                   <a:solidFill>
                     <a:srgbClr val="000000"/>
                   </a:solidFill>
@@ -31534,7 +31539,7 @@
             </a:ln>
             <a:extLst>
               <a:ext uri="{91240B29-F687-4f45-9708-019B960494DF}">
-                <a14:hiddenLine xmlns="" xmlns:a16="http://schemas.microsoft.com/office/drawing/2014/main" xmlns:p14="http://schemas.microsoft.com/office/powerpoint/2010/main" xmlns:a14="http://schemas.microsoft.com/office/drawing/2010/main" w="9525">
+                <a14:hiddenLine xmlns:a14="http://schemas.microsoft.com/office/drawing/2010/main" xmlns:p14="http://schemas.microsoft.com/office/powerpoint/2010/main" xmlns:a16="http://schemas.microsoft.com/office/drawing/2014/main" xmlns="" w="9525">
                   <a:solidFill>
                     <a:srgbClr val="000000"/>
                   </a:solidFill>
@@ -31618,7 +31623,7 @@
             </a:ln>
             <a:extLst>
               <a:ext uri="{91240B29-F687-4f45-9708-019B960494DF}">
-                <a14:hiddenLine xmlns="" xmlns:a16="http://schemas.microsoft.com/office/drawing/2014/main" xmlns:p14="http://schemas.microsoft.com/office/powerpoint/2010/main" xmlns:a14="http://schemas.microsoft.com/office/drawing/2010/main" w="9525">
+                <a14:hiddenLine xmlns:a14="http://schemas.microsoft.com/office/drawing/2010/main" xmlns:p14="http://schemas.microsoft.com/office/powerpoint/2010/main" xmlns:a16="http://schemas.microsoft.com/office/drawing/2014/main" xmlns="" w="9525">
                   <a:solidFill>
                     <a:srgbClr val="000000"/>
                   </a:solidFill>
@@ -31750,7 +31755,7 @@
             </a:ln>
             <a:extLst>
               <a:ext uri="{91240B29-F687-4f45-9708-019B960494DF}">
-                <a14:hiddenLine xmlns="" xmlns:a16="http://schemas.microsoft.com/office/drawing/2014/main" xmlns:p14="http://schemas.microsoft.com/office/powerpoint/2010/main" xmlns:a14="http://schemas.microsoft.com/office/drawing/2010/main" w="9525">
+                <a14:hiddenLine xmlns:a14="http://schemas.microsoft.com/office/drawing/2010/main" xmlns:p14="http://schemas.microsoft.com/office/powerpoint/2010/main" xmlns:a16="http://schemas.microsoft.com/office/drawing/2014/main" xmlns="" w="9525">
                   <a:solidFill>
                     <a:srgbClr val="000000"/>
                   </a:solidFill>
@@ -31878,7 +31883,7 @@
             </a:ln>
             <a:extLst>
               <a:ext uri="{91240B29-F687-4f45-9708-019B960494DF}">
-                <a14:hiddenLine xmlns="" xmlns:a16="http://schemas.microsoft.com/office/drawing/2014/main" xmlns:p14="http://schemas.microsoft.com/office/powerpoint/2010/main" xmlns:a14="http://schemas.microsoft.com/office/drawing/2010/main" w="9525">
+                <a14:hiddenLine xmlns:a14="http://schemas.microsoft.com/office/drawing/2010/main" xmlns:p14="http://schemas.microsoft.com/office/powerpoint/2010/main" xmlns:a16="http://schemas.microsoft.com/office/drawing/2014/main" xmlns="" w="9525">
                   <a:solidFill>
                     <a:srgbClr val="000000"/>
                   </a:solidFill>
@@ -31962,7 +31967,7 @@
             </a:ln>
             <a:extLst>
               <a:ext uri="{91240B29-F687-4f45-9708-019B960494DF}">
-                <a14:hiddenLine xmlns="" xmlns:a16="http://schemas.microsoft.com/office/drawing/2014/main" xmlns:p14="http://schemas.microsoft.com/office/powerpoint/2010/main" xmlns:a14="http://schemas.microsoft.com/office/drawing/2010/main" w="9525">
+                <a14:hiddenLine xmlns:a14="http://schemas.microsoft.com/office/drawing/2010/main" xmlns:p14="http://schemas.microsoft.com/office/powerpoint/2010/main" xmlns:a16="http://schemas.microsoft.com/office/drawing/2014/main" xmlns="" w="9525">
                   <a:solidFill>
                     <a:srgbClr val="000000"/>
                   </a:solidFill>
@@ -32046,7 +32051,7 @@
             </a:ln>
             <a:extLst>
               <a:ext uri="{91240B29-F687-4f45-9708-019B960494DF}">
-                <a14:hiddenLine xmlns="" xmlns:a16="http://schemas.microsoft.com/office/drawing/2014/main" xmlns:p14="http://schemas.microsoft.com/office/powerpoint/2010/main" xmlns:a14="http://schemas.microsoft.com/office/drawing/2010/main" w="9525">
+                <a14:hiddenLine xmlns:a14="http://schemas.microsoft.com/office/drawing/2010/main" xmlns:p14="http://schemas.microsoft.com/office/powerpoint/2010/main" xmlns:a16="http://schemas.microsoft.com/office/drawing/2014/main" xmlns="" w="9525">
                   <a:solidFill>
                     <a:srgbClr val="000000"/>
                   </a:solidFill>
@@ -32158,7 +32163,7 @@
             </a:ln>
             <a:extLst>
               <a:ext uri="{91240B29-F687-4f45-9708-019B960494DF}">
-                <a14:hiddenLine xmlns="" xmlns:a16="http://schemas.microsoft.com/office/drawing/2014/main" xmlns:p14="http://schemas.microsoft.com/office/powerpoint/2010/main" xmlns:a14="http://schemas.microsoft.com/office/drawing/2010/main" w="9525">
+                <a14:hiddenLine xmlns:a14="http://schemas.microsoft.com/office/drawing/2010/main" xmlns:p14="http://schemas.microsoft.com/office/powerpoint/2010/main" xmlns:a16="http://schemas.microsoft.com/office/drawing/2014/main" xmlns="" w="9525">
                   <a:solidFill>
                     <a:srgbClr val="000000"/>
                   </a:solidFill>
@@ -32214,7 +32219,7 @@
             </a:ln>
             <a:extLst>
               <a:ext uri="{91240B29-F687-4f45-9708-019B960494DF}">
-                <a14:hiddenLine xmlns="" xmlns:a16="http://schemas.microsoft.com/office/drawing/2014/main" xmlns:p14="http://schemas.microsoft.com/office/powerpoint/2010/main" xmlns:a14="http://schemas.microsoft.com/office/drawing/2010/main" w="9525">
+                <a14:hiddenLine xmlns:a14="http://schemas.microsoft.com/office/drawing/2010/main" xmlns:p14="http://schemas.microsoft.com/office/powerpoint/2010/main" xmlns:a16="http://schemas.microsoft.com/office/drawing/2014/main" xmlns="" w="9525">
                   <a:solidFill>
                     <a:srgbClr val="000000"/>
                   </a:solidFill>
@@ -32301,7 +32306,7 @@
             </a:ln>
             <a:extLst>
               <a:ext uri="{91240B29-F687-4f45-9708-019B960494DF}">
-                <a14:hiddenLine xmlns="" xmlns:a16="http://schemas.microsoft.com/office/drawing/2014/main" xmlns:p14="http://schemas.microsoft.com/office/powerpoint/2010/main" xmlns:a14="http://schemas.microsoft.com/office/drawing/2010/main" w="9525">
+                <a14:hiddenLine xmlns:a14="http://schemas.microsoft.com/office/drawing/2010/main" xmlns:p14="http://schemas.microsoft.com/office/powerpoint/2010/main" xmlns:a16="http://schemas.microsoft.com/office/drawing/2014/main" xmlns="" w="9525">
                   <a:solidFill>
                     <a:srgbClr val="000000"/>
                   </a:solidFill>
@@ -32413,7 +32418,7 @@
             </a:ln>
             <a:extLst>
               <a:ext uri="{91240B29-F687-4f45-9708-019B960494DF}">
-                <a14:hiddenLine xmlns="" xmlns:a16="http://schemas.microsoft.com/office/drawing/2014/main" xmlns:p14="http://schemas.microsoft.com/office/powerpoint/2010/main" xmlns:a14="http://schemas.microsoft.com/office/drawing/2010/main" w="9525">
+                <a14:hiddenLine xmlns:a14="http://schemas.microsoft.com/office/drawing/2010/main" xmlns:p14="http://schemas.microsoft.com/office/powerpoint/2010/main" xmlns:a16="http://schemas.microsoft.com/office/drawing/2014/main" xmlns="" w="9525">
                   <a:solidFill>
                     <a:srgbClr val="000000"/>
                   </a:solidFill>
@@ -32497,7 +32502,7 @@
             </a:ln>
             <a:extLst>
               <a:ext uri="{91240B29-F687-4f45-9708-019B960494DF}">
-                <a14:hiddenLine xmlns="" xmlns:a16="http://schemas.microsoft.com/office/drawing/2014/main" xmlns:p14="http://schemas.microsoft.com/office/powerpoint/2010/main" xmlns:a14="http://schemas.microsoft.com/office/drawing/2010/main" w="9525">
+                <a14:hiddenLine xmlns:a14="http://schemas.microsoft.com/office/drawing/2010/main" xmlns:p14="http://schemas.microsoft.com/office/powerpoint/2010/main" xmlns:a16="http://schemas.microsoft.com/office/drawing/2014/main" xmlns="" w="9525">
                   <a:solidFill>
                     <a:srgbClr val="000000"/>
                   </a:solidFill>
@@ -32609,7 +32614,7 @@
             </a:ln>
             <a:extLst>
               <a:ext uri="{91240B29-F687-4f45-9708-019B960494DF}">
-                <a14:hiddenLine xmlns="" xmlns:a16="http://schemas.microsoft.com/office/drawing/2014/main" xmlns:p14="http://schemas.microsoft.com/office/powerpoint/2010/main" xmlns:a14="http://schemas.microsoft.com/office/drawing/2010/main" w="9525">
+                <a14:hiddenLine xmlns:a14="http://schemas.microsoft.com/office/drawing/2010/main" xmlns:p14="http://schemas.microsoft.com/office/powerpoint/2010/main" xmlns:a16="http://schemas.microsoft.com/office/drawing/2014/main" xmlns="" w="9525">
                   <a:solidFill>
                     <a:srgbClr val="000000"/>
                   </a:solidFill>
@@ -32696,7 +32701,7 @@
             </a:ln>
             <a:extLst>
               <a:ext uri="{91240B29-F687-4f45-9708-019B960494DF}">
-                <a14:hiddenLine xmlns="" xmlns:a16="http://schemas.microsoft.com/office/drawing/2014/main" xmlns:p14="http://schemas.microsoft.com/office/powerpoint/2010/main" xmlns:a14="http://schemas.microsoft.com/office/drawing/2010/main" w="9525">
+                <a14:hiddenLine xmlns:a14="http://schemas.microsoft.com/office/drawing/2010/main" xmlns:p14="http://schemas.microsoft.com/office/powerpoint/2010/main" xmlns:a16="http://schemas.microsoft.com/office/drawing/2014/main" xmlns="" w="9525">
                   <a:solidFill>
                     <a:srgbClr val="000000"/>
                   </a:solidFill>
@@ -32780,7 +32785,7 @@
             </a:ln>
             <a:extLst>
               <a:ext uri="{91240B29-F687-4f45-9708-019B960494DF}">
-                <a14:hiddenLine xmlns="" xmlns:a16="http://schemas.microsoft.com/office/drawing/2014/main" xmlns:p14="http://schemas.microsoft.com/office/powerpoint/2010/main" xmlns:a14="http://schemas.microsoft.com/office/drawing/2010/main" w="9525">
+                <a14:hiddenLine xmlns:a14="http://schemas.microsoft.com/office/drawing/2010/main" xmlns:p14="http://schemas.microsoft.com/office/powerpoint/2010/main" xmlns:a16="http://schemas.microsoft.com/office/drawing/2014/main" xmlns="" w="9525">
                   <a:solidFill>
                     <a:srgbClr val="000000"/>
                   </a:solidFill>
@@ -32892,7 +32897,7 @@
             </a:ln>
             <a:extLst>
               <a:ext uri="{91240B29-F687-4f45-9708-019B960494DF}">
-                <a14:hiddenLine xmlns="" xmlns:a16="http://schemas.microsoft.com/office/drawing/2014/main" xmlns:p14="http://schemas.microsoft.com/office/powerpoint/2010/main" xmlns:a14="http://schemas.microsoft.com/office/drawing/2010/main" w="9525">
+                <a14:hiddenLine xmlns:a14="http://schemas.microsoft.com/office/drawing/2010/main" xmlns:p14="http://schemas.microsoft.com/office/powerpoint/2010/main" xmlns:a16="http://schemas.microsoft.com/office/drawing/2014/main" xmlns="" w="9525">
                   <a:solidFill>
                     <a:srgbClr val="000000"/>
                   </a:solidFill>
@@ -33004,7 +33009,7 @@
             </a:ln>
             <a:extLst>
               <a:ext uri="{91240B29-F687-4f45-9708-019B960494DF}">
-                <a14:hiddenLine xmlns="" xmlns:a16="http://schemas.microsoft.com/office/drawing/2014/main" xmlns:p14="http://schemas.microsoft.com/office/powerpoint/2010/main" xmlns:a14="http://schemas.microsoft.com/office/drawing/2010/main" w="9525">
+                <a14:hiddenLine xmlns:a14="http://schemas.microsoft.com/office/drawing/2010/main" xmlns:p14="http://schemas.microsoft.com/office/powerpoint/2010/main" xmlns:a16="http://schemas.microsoft.com/office/drawing/2014/main" xmlns="" w="9525">
                   <a:solidFill>
                     <a:srgbClr val="000000"/>
                   </a:solidFill>
@@ -33091,7 +33096,7 @@
             </a:ln>
             <a:extLst>
               <a:ext uri="{91240B29-F687-4f45-9708-019B960494DF}">
-                <a14:hiddenLine xmlns="" xmlns:a16="http://schemas.microsoft.com/office/drawing/2014/main" xmlns:p14="http://schemas.microsoft.com/office/powerpoint/2010/main" xmlns:a14="http://schemas.microsoft.com/office/drawing/2010/main" w="9525">
+                <a14:hiddenLine xmlns:a14="http://schemas.microsoft.com/office/drawing/2010/main" xmlns:p14="http://schemas.microsoft.com/office/powerpoint/2010/main" xmlns:a16="http://schemas.microsoft.com/office/drawing/2014/main" xmlns="" w="9525">
                   <a:solidFill>
                     <a:srgbClr val="000000"/>
                   </a:solidFill>
@@ -33233,7 +33238,7 @@
             </a:ln>
             <a:extLst>
               <a:ext uri="{91240B29-F687-4f45-9708-019B960494DF}">
-                <a14:hiddenLine xmlns="" xmlns:a16="http://schemas.microsoft.com/office/drawing/2014/main" xmlns:p14="http://schemas.microsoft.com/office/powerpoint/2010/main" xmlns:a14="http://schemas.microsoft.com/office/drawing/2010/main" w="9525">
+                <a14:hiddenLine xmlns:a14="http://schemas.microsoft.com/office/drawing/2010/main" xmlns:p14="http://schemas.microsoft.com/office/powerpoint/2010/main" xmlns:a16="http://schemas.microsoft.com/office/drawing/2014/main" xmlns="" w="9525">
                   <a:solidFill>
                     <a:srgbClr val="000000"/>
                   </a:solidFill>
@@ -33271,7 +33276,7 @@
         </p:nvSpPr>
         <p:spPr>
           <a:xfrm>
-            <a:off x="1141413" y="618518"/>
+            <a:off x="2280037" y="414380"/>
             <a:ext cx="7631926" cy="1478570"/>
           </a:xfrm>
         </p:spPr>
@@ -33281,42 +33286,11 @@
           </a:bodyPr>
           <a:lstStyle/>
           <a:p>
+            <a:pPr algn="ctr"/>
             <a:r>
               <a:rPr lang="en-US" sz="3200" dirty="0"/>
               <a:t>Project Relational Database Schema</a:t>
             </a:r>
-          </a:p>
-        </p:txBody>
-      </p:sp>
-      <p:sp>
-        <p:nvSpPr>
-          <p:cNvPr id="3" name="Content Placeholder 2">
-            <a:extLst>
-              <a:ext uri="{FF2B5EF4-FFF2-40B4-BE49-F238E27FC236}">
-                <a16:creationId xmlns:a16="http://schemas.microsoft.com/office/drawing/2014/main" id="{87D14319-26B7-393D-ED02-20D27CF07CAA}"/>
-              </a:ext>
-            </a:extLst>
-          </p:cNvPr>
-          <p:cNvSpPr>
-            <a:spLocks noGrp="1"/>
-          </p:cNvSpPr>
-          <p:nvPr>
-            <p:ph idx="1"/>
-          </p:nvPr>
-        </p:nvSpPr>
-        <p:spPr>
-          <a:xfrm>
-            <a:off x="1141412" y="2249487"/>
-            <a:ext cx="7631927" cy="3705226"/>
-          </a:xfrm>
-        </p:spPr>
-        <p:txBody>
-          <a:bodyPr anchor="t">
-            <a:normAutofit/>
-          </a:bodyPr>
-          <a:lstStyle/>
-          <a:p>
-            <a:endParaRPr lang="en-US" sz="1600" dirty="0"/>
           </a:p>
         </p:txBody>
       </p:sp>
@@ -33424,7 +33398,7 @@
             </a:ln>
             <a:extLst>
               <a:ext uri="{91240B29-F687-4f45-9708-019B960494DF}">
-                <a14:hiddenLine xmlns="" xmlns:a16="http://schemas.microsoft.com/office/drawing/2014/main" xmlns:p14="http://schemas.microsoft.com/office/powerpoint/2010/main" xmlns:a14="http://schemas.microsoft.com/office/drawing/2010/main" w="9525">
+                <a14:hiddenLine xmlns:a14="http://schemas.microsoft.com/office/drawing/2010/main" xmlns:p14="http://schemas.microsoft.com/office/powerpoint/2010/main" xmlns:a16="http://schemas.microsoft.com/office/drawing/2014/main" xmlns="" w="9525">
                   <a:solidFill>
                     <a:srgbClr val="000000"/>
                   </a:solidFill>
@@ -33561,7 +33535,7 @@
             </a:ln>
             <a:extLst>
               <a:ext uri="{91240B29-F687-4f45-9708-019B960494DF}">
-                <a14:hiddenLine xmlns="" xmlns:a16="http://schemas.microsoft.com/office/drawing/2014/main" xmlns:p14="http://schemas.microsoft.com/office/powerpoint/2010/main" xmlns:a14="http://schemas.microsoft.com/office/drawing/2010/main" w="9525">
+                <a14:hiddenLine xmlns:a14="http://schemas.microsoft.com/office/drawing/2010/main" xmlns:p14="http://schemas.microsoft.com/office/powerpoint/2010/main" xmlns:a16="http://schemas.microsoft.com/office/drawing/2014/main" xmlns="" w="9525">
                   <a:solidFill>
                     <a:srgbClr val="000000"/>
                   </a:solidFill>
@@ -33673,7 +33647,7 @@
             </a:ln>
             <a:extLst>
               <a:ext uri="{91240B29-F687-4f45-9708-019B960494DF}">
-                <a14:hiddenLine xmlns="" xmlns:a16="http://schemas.microsoft.com/office/drawing/2014/main" xmlns:p14="http://schemas.microsoft.com/office/powerpoint/2010/main" xmlns:a14="http://schemas.microsoft.com/office/drawing/2010/main" w="9525">
+                <a14:hiddenLine xmlns:a14="http://schemas.microsoft.com/office/drawing/2010/main" xmlns:p14="http://schemas.microsoft.com/office/powerpoint/2010/main" xmlns:a16="http://schemas.microsoft.com/office/drawing/2014/main" xmlns="" w="9525">
                   <a:solidFill>
                     <a:srgbClr val="000000"/>
                   </a:solidFill>
@@ -33760,7 +33734,7 @@
             </a:ln>
             <a:extLst>
               <a:ext uri="{91240B29-F687-4f45-9708-019B960494DF}">
-                <a14:hiddenLine xmlns="" xmlns:a16="http://schemas.microsoft.com/office/drawing/2014/main" xmlns:p14="http://schemas.microsoft.com/office/powerpoint/2010/main" xmlns:a14="http://schemas.microsoft.com/office/drawing/2010/main" w="9525">
+                <a14:hiddenLine xmlns:a14="http://schemas.microsoft.com/office/drawing/2010/main" xmlns:p14="http://schemas.microsoft.com/office/powerpoint/2010/main" xmlns:a16="http://schemas.microsoft.com/office/drawing/2014/main" xmlns="" w="9525">
                   <a:solidFill>
                     <a:srgbClr val="000000"/>
                   </a:solidFill>
@@ -33872,7 +33846,7 @@
             </a:ln>
             <a:extLst>
               <a:ext uri="{91240B29-F687-4f45-9708-019B960494DF}">
-                <a14:hiddenLine xmlns="" xmlns:a16="http://schemas.microsoft.com/office/drawing/2014/main" xmlns:p14="http://schemas.microsoft.com/office/powerpoint/2010/main" xmlns:a14="http://schemas.microsoft.com/office/drawing/2010/main" w="9525">
+                <a14:hiddenLine xmlns:a14="http://schemas.microsoft.com/office/drawing/2010/main" xmlns:p14="http://schemas.microsoft.com/office/powerpoint/2010/main" xmlns:a16="http://schemas.microsoft.com/office/drawing/2014/main" xmlns="" w="9525">
                   <a:solidFill>
                     <a:srgbClr val="000000"/>
                   </a:solidFill>
@@ -33962,7 +33936,7 @@
             </a:ln>
             <a:extLst>
               <a:ext uri="{91240B29-F687-4f45-9708-019B960494DF}">
-                <a14:hiddenLine xmlns="" xmlns:a16="http://schemas.microsoft.com/office/drawing/2014/main" xmlns:p14="http://schemas.microsoft.com/office/powerpoint/2010/main" xmlns:a14="http://schemas.microsoft.com/office/drawing/2010/main" w="9525">
+                <a14:hiddenLine xmlns:a14="http://schemas.microsoft.com/office/drawing/2010/main" xmlns:p14="http://schemas.microsoft.com/office/powerpoint/2010/main" xmlns:a16="http://schemas.microsoft.com/office/drawing/2014/main" xmlns="" w="9525">
                   <a:solidFill>
                     <a:srgbClr val="000000"/>
                   </a:solidFill>
@@ -34074,7 +34048,7 @@
             </a:ln>
             <a:extLst>
               <a:ext uri="{91240B29-F687-4f45-9708-019B960494DF}">
-                <a14:hiddenLine xmlns="" xmlns:a16="http://schemas.microsoft.com/office/drawing/2014/main" xmlns:p14="http://schemas.microsoft.com/office/powerpoint/2010/main" xmlns:a14="http://schemas.microsoft.com/office/drawing/2010/main" w="9525">
+                <a14:hiddenLine xmlns:a14="http://schemas.microsoft.com/office/drawing/2010/main" xmlns:p14="http://schemas.microsoft.com/office/powerpoint/2010/main" xmlns:a16="http://schemas.microsoft.com/office/drawing/2014/main" xmlns="" w="9525">
                   <a:solidFill>
                     <a:srgbClr val="000000"/>
                   </a:solidFill>
@@ -34164,7 +34138,7 @@
             </a:ln>
             <a:extLst>
               <a:ext uri="{91240B29-F687-4f45-9708-019B960494DF}">
-                <a14:hiddenLine xmlns="" xmlns:a16="http://schemas.microsoft.com/office/drawing/2014/main" xmlns:p14="http://schemas.microsoft.com/office/powerpoint/2010/main" xmlns:a14="http://schemas.microsoft.com/office/drawing/2010/main" w="9525">
+                <a14:hiddenLine xmlns:a14="http://schemas.microsoft.com/office/drawing/2010/main" xmlns:p14="http://schemas.microsoft.com/office/powerpoint/2010/main" xmlns:a16="http://schemas.microsoft.com/office/drawing/2014/main" xmlns="" w="9525">
                   <a:solidFill>
                     <a:srgbClr val="000000"/>
                   </a:solidFill>
@@ -34276,7 +34250,7 @@
             </a:ln>
             <a:extLst>
               <a:ext uri="{91240B29-F687-4f45-9708-019B960494DF}">
-                <a14:hiddenLine xmlns="" xmlns:a16="http://schemas.microsoft.com/office/drawing/2014/main" xmlns:p14="http://schemas.microsoft.com/office/powerpoint/2010/main" xmlns:a14="http://schemas.microsoft.com/office/drawing/2010/main" w="9525">
+                <a14:hiddenLine xmlns:a14="http://schemas.microsoft.com/office/drawing/2010/main" xmlns:p14="http://schemas.microsoft.com/office/powerpoint/2010/main" xmlns:a16="http://schemas.microsoft.com/office/drawing/2014/main" xmlns="" w="9525">
                   <a:solidFill>
                     <a:srgbClr val="000000"/>
                   </a:solidFill>
@@ -34332,7 +34306,7 @@
             </a:ln>
             <a:extLst>
               <a:ext uri="{91240B29-F687-4f45-9708-019B960494DF}">
-                <a14:hiddenLine xmlns="" xmlns:a16="http://schemas.microsoft.com/office/drawing/2014/main" xmlns:p14="http://schemas.microsoft.com/office/powerpoint/2010/main" xmlns:a14="http://schemas.microsoft.com/office/drawing/2010/main" w="9525">
+                <a14:hiddenLine xmlns:a14="http://schemas.microsoft.com/office/drawing/2010/main" xmlns:p14="http://schemas.microsoft.com/office/powerpoint/2010/main" xmlns:a16="http://schemas.microsoft.com/office/drawing/2014/main" xmlns="" w="9525">
                   <a:solidFill>
                     <a:srgbClr val="000000"/>
                   </a:solidFill>
@@ -34374,7 +34348,7 @@
         </p:blipFill>
         <p:spPr>
           <a:xfrm>
-            <a:off x="3086873" y="1741003"/>
+            <a:off x="2930694" y="1751630"/>
             <a:ext cx="6335373" cy="4579320"/>
           </a:xfrm>
           <a:prstGeom prst="rect">
@@ -34396,6 +34370,214 @@
 </file>
 
 <file path=ppt/slides/slide6.xml><?xml version="1.0" encoding="utf-8"?>
+<p:sld xmlns:a="http://schemas.openxmlformats.org/drawingml/2006/main" xmlns:r="http://schemas.openxmlformats.org/officeDocument/2006/relationships" xmlns:p="http://schemas.openxmlformats.org/presentationml/2006/main">
+  <p:cSld>
+    <p:spTree>
+      <p:nvGrpSpPr>
+        <p:cNvPr id="1" name=""/>
+        <p:cNvGrpSpPr/>
+        <p:nvPr/>
+      </p:nvGrpSpPr>
+      <p:grpSpPr>
+        <a:xfrm>
+          <a:off x="0" y="0"/>
+          <a:ext cx="0" cy="0"/>
+          <a:chOff x="0" y="0"/>
+          <a:chExt cx="0" cy="0"/>
+        </a:xfrm>
+      </p:grpSpPr>
+      <p:sp>
+        <p:nvSpPr>
+          <p:cNvPr id="2" name="Title 1">
+            <a:extLst>
+              <a:ext uri="{FF2B5EF4-FFF2-40B4-BE49-F238E27FC236}">
+                <a16:creationId xmlns:a16="http://schemas.microsoft.com/office/drawing/2014/main" id="{AE25354B-DB9D-C040-2540-D24AECD52928}"/>
+              </a:ext>
+            </a:extLst>
+          </p:cNvPr>
+          <p:cNvSpPr>
+            <a:spLocks noGrp="1"/>
+          </p:cNvSpPr>
+          <p:nvPr>
+            <p:ph type="title"/>
+          </p:nvPr>
+        </p:nvSpPr>
+        <p:spPr/>
+        <p:txBody>
+          <a:bodyPr/>
+          <a:lstStyle/>
+          <a:p>
+            <a:r>
+              <a:rPr lang="en-US" dirty="0"/>
+              <a:t>Key interfaces</a:t>
+            </a:r>
+          </a:p>
+        </p:txBody>
+      </p:sp>
+      <p:sp>
+        <p:nvSpPr>
+          <p:cNvPr id="3" name="Content Placeholder 2">
+            <a:extLst>
+              <a:ext uri="{FF2B5EF4-FFF2-40B4-BE49-F238E27FC236}">
+                <a16:creationId xmlns:a16="http://schemas.microsoft.com/office/drawing/2014/main" id="{ACF0443D-63FE-5EDC-61A0-10E3750B979C}"/>
+              </a:ext>
+            </a:extLst>
+          </p:cNvPr>
+          <p:cNvSpPr>
+            <a:spLocks noGrp="1"/>
+          </p:cNvSpPr>
+          <p:nvPr>
+            <p:ph idx="1"/>
+          </p:nvPr>
+        </p:nvSpPr>
+        <p:spPr/>
+        <p:txBody>
+          <a:bodyPr/>
+          <a:lstStyle/>
+          <a:p>
+            <a:r>
+              <a:rPr lang="en-US" dirty="0"/>
+              <a:t>Insert: Books into the database</a:t>
+            </a:r>
+          </a:p>
+          <a:p>
+            <a:r>
+              <a:rPr lang="en-US" dirty="0"/>
+              <a:t>Delete: Books from the database</a:t>
+            </a:r>
+          </a:p>
+          <a:p>
+            <a:r>
+              <a:rPr lang="en-US" dirty="0"/>
+              <a:t>Update: Books and Users already in the database</a:t>
+            </a:r>
+          </a:p>
+          <a:p>
+            <a:r>
+              <a:rPr lang="en-US" dirty="0"/>
+              <a:t>Query: Search for books in the database</a:t>
+            </a:r>
+          </a:p>
+        </p:txBody>
+      </p:sp>
+    </p:spTree>
+    <p:extLst>
+      <p:ext uri="{BB962C8B-B14F-4D97-AF65-F5344CB8AC3E}">
+        <p14:creationId xmlns:p14="http://schemas.microsoft.com/office/powerpoint/2010/main" val="1470371530"/>
+      </p:ext>
+    </p:extLst>
+  </p:cSld>
+  <p:clrMapOvr>
+    <a:masterClrMapping/>
+  </p:clrMapOvr>
+</p:sld>
+</file>
+
+<file path=ppt/slides/slide7.xml><?xml version="1.0" encoding="utf-8"?>
+<p:sld xmlns:a="http://schemas.openxmlformats.org/drawingml/2006/main" xmlns:r="http://schemas.openxmlformats.org/officeDocument/2006/relationships" xmlns:p="http://schemas.openxmlformats.org/presentationml/2006/main">
+  <p:cSld>
+    <p:spTree>
+      <p:nvGrpSpPr>
+        <p:cNvPr id="1" name=""/>
+        <p:cNvGrpSpPr/>
+        <p:nvPr/>
+      </p:nvGrpSpPr>
+      <p:grpSpPr>
+        <a:xfrm>
+          <a:off x="0" y="0"/>
+          <a:ext cx="0" cy="0"/>
+          <a:chOff x="0" y="0"/>
+          <a:chExt cx="0" cy="0"/>
+        </a:xfrm>
+      </p:grpSpPr>
+      <p:sp>
+        <p:nvSpPr>
+          <p:cNvPr id="2" name="Title 1">
+            <a:extLst>
+              <a:ext uri="{FF2B5EF4-FFF2-40B4-BE49-F238E27FC236}">
+                <a16:creationId xmlns:a16="http://schemas.microsoft.com/office/drawing/2014/main" id="{0D789986-E668-F95A-3C68-CD584147AD31}"/>
+              </a:ext>
+            </a:extLst>
+          </p:cNvPr>
+          <p:cNvSpPr>
+            <a:spLocks noGrp="1"/>
+          </p:cNvSpPr>
+          <p:nvPr>
+            <p:ph type="title"/>
+          </p:nvPr>
+        </p:nvSpPr>
+        <p:spPr/>
+        <p:txBody>
+          <a:bodyPr/>
+          <a:lstStyle/>
+          <a:p>
+            <a:r>
+              <a:rPr lang="en-US" dirty="0"/>
+              <a:t>Challenges</a:t>
+            </a:r>
+          </a:p>
+        </p:txBody>
+      </p:sp>
+      <p:sp>
+        <p:nvSpPr>
+          <p:cNvPr id="3" name="Content Placeholder 2">
+            <a:extLst>
+              <a:ext uri="{FF2B5EF4-FFF2-40B4-BE49-F238E27FC236}">
+                <a16:creationId xmlns:a16="http://schemas.microsoft.com/office/drawing/2014/main" id="{048BCFC7-81AB-A47C-C0A7-0AB91D071CBE}"/>
+              </a:ext>
+            </a:extLst>
+          </p:cNvPr>
+          <p:cNvSpPr>
+            <a:spLocks noGrp="1"/>
+          </p:cNvSpPr>
+          <p:nvPr>
+            <p:ph idx="1"/>
+          </p:nvPr>
+        </p:nvSpPr>
+        <p:spPr/>
+        <p:txBody>
+          <a:bodyPr/>
+          <a:lstStyle/>
+          <a:p>
+            <a:r>
+              <a:rPr lang="en-US" dirty="0"/>
+              <a:t>Getting the database in 3</a:t>
+            </a:r>
+            <a:r>
+              <a:rPr lang="en-US" baseline="30000" dirty="0"/>
+              <a:t>rd</a:t>
+            </a:r>
+            <a:r>
+              <a:rPr lang="en-US" dirty="0"/>
+              <a:t> normal form</a:t>
+            </a:r>
+          </a:p>
+          <a:p>
+            <a:r>
+              <a:rPr lang="en-US" dirty="0"/>
+              <a:t>Correct implementation </a:t>
+            </a:r>
+            <a:r>
+              <a:rPr lang="en-US"/>
+              <a:t>of schema to website</a:t>
+            </a:r>
+          </a:p>
+        </p:txBody>
+      </p:sp>
+    </p:spTree>
+    <p:extLst>
+      <p:ext uri="{BB962C8B-B14F-4D97-AF65-F5344CB8AC3E}">
+        <p14:creationId xmlns:p14="http://schemas.microsoft.com/office/powerpoint/2010/main" val="1865017265"/>
+      </p:ext>
+    </p:extLst>
+  </p:cSld>
+  <p:clrMapOvr>
+    <a:masterClrMapping/>
+  </p:clrMapOvr>
+</p:sld>
+</file>
+
+<file path=ppt/slides/slide8.xml><?xml version="1.0" encoding="utf-8"?>
 <p:sld xmlns:a="http://schemas.openxmlformats.org/drawingml/2006/main" xmlns:r="http://schemas.openxmlformats.org/officeDocument/2006/relationships" xmlns:p="http://schemas.openxmlformats.org/presentationml/2006/main">
   <p:cSld>
     <p:bg>
@@ -34559,7 +34741,7 @@
             </a:ln>
             <a:extLst>
               <a:ext uri="{91240B29-F687-4f45-9708-019B960494DF}">
-                <a14:hiddenLine xmlns:a14="http://schemas.microsoft.com/office/drawing/2010/main" xmlns:p14="http://schemas.microsoft.com/office/powerpoint/2010/main" xmlns:a16="http://schemas.microsoft.com/office/drawing/2014/main" xmlns="" w="9525">
+                <a14:hiddenLine xmlns="" xmlns:a16="http://schemas.microsoft.com/office/drawing/2014/main" xmlns:p14="http://schemas.microsoft.com/office/powerpoint/2010/main" xmlns:a14="http://schemas.microsoft.com/office/drawing/2010/main" w="9525">
                   <a:solidFill>
                     <a:srgbClr val="000000"/>
                   </a:solidFill>
@@ -34671,7 +34853,7 @@
             </a:ln>
             <a:extLst>
               <a:ext uri="{91240B29-F687-4f45-9708-019B960494DF}">
-                <a14:hiddenLine xmlns:a14="http://schemas.microsoft.com/office/drawing/2010/main" xmlns:p14="http://schemas.microsoft.com/office/powerpoint/2010/main" xmlns:a16="http://schemas.microsoft.com/office/drawing/2014/main" xmlns="" w="9525">
+                <a14:hiddenLine xmlns="" xmlns:a16="http://schemas.microsoft.com/office/drawing/2014/main" xmlns:p14="http://schemas.microsoft.com/office/powerpoint/2010/main" xmlns:a14="http://schemas.microsoft.com/office/drawing/2010/main" w="9525">
                   <a:solidFill>
                     <a:srgbClr val="000000"/>
                   </a:solidFill>
@@ -34783,7 +34965,7 @@
             </a:ln>
             <a:extLst>
               <a:ext uri="{91240B29-F687-4f45-9708-019B960494DF}">
-                <a14:hiddenLine xmlns:a14="http://schemas.microsoft.com/office/drawing/2010/main" xmlns:p14="http://schemas.microsoft.com/office/powerpoint/2010/main" xmlns:a16="http://schemas.microsoft.com/office/drawing/2014/main" xmlns="" w="9525">
+                <a14:hiddenLine xmlns="" xmlns:a16="http://schemas.microsoft.com/office/drawing/2014/main" xmlns:p14="http://schemas.microsoft.com/office/powerpoint/2010/main" xmlns:a14="http://schemas.microsoft.com/office/drawing/2010/main" w="9525">
                   <a:solidFill>
                     <a:srgbClr val="000000"/>
                   </a:solidFill>
@@ -34867,7 +35049,7 @@
             </a:ln>
             <a:extLst>
               <a:ext uri="{91240B29-F687-4f45-9708-019B960494DF}">
-                <a14:hiddenLine xmlns:a14="http://schemas.microsoft.com/office/drawing/2010/main" xmlns:p14="http://schemas.microsoft.com/office/powerpoint/2010/main" xmlns:a16="http://schemas.microsoft.com/office/drawing/2014/main" xmlns="" w="9525">
+                <a14:hiddenLine xmlns="" xmlns:a16="http://schemas.microsoft.com/office/drawing/2014/main" xmlns:p14="http://schemas.microsoft.com/office/powerpoint/2010/main" xmlns:a14="http://schemas.microsoft.com/office/drawing/2010/main" w="9525">
                   <a:solidFill>
                     <a:srgbClr val="000000"/>
                   </a:solidFill>
@@ -34979,7 +35161,7 @@
             </a:ln>
             <a:extLst>
               <a:ext uri="{91240B29-F687-4f45-9708-019B960494DF}">
-                <a14:hiddenLine xmlns:a14="http://schemas.microsoft.com/office/drawing/2010/main" xmlns:p14="http://schemas.microsoft.com/office/powerpoint/2010/main" xmlns:a16="http://schemas.microsoft.com/office/drawing/2014/main" xmlns="" w="9525">
+                <a14:hiddenLine xmlns="" xmlns:a16="http://schemas.microsoft.com/office/drawing/2014/main" xmlns:p14="http://schemas.microsoft.com/office/powerpoint/2010/main" xmlns:a14="http://schemas.microsoft.com/office/drawing/2010/main" w="9525">
                   <a:solidFill>
                     <a:srgbClr val="000000"/>
                   </a:solidFill>
@@ -35063,7 +35245,7 @@
             </a:ln>
             <a:extLst>
               <a:ext uri="{91240B29-F687-4f45-9708-019B960494DF}">
-                <a14:hiddenLine xmlns:a14="http://schemas.microsoft.com/office/drawing/2010/main" xmlns:p14="http://schemas.microsoft.com/office/powerpoint/2010/main" xmlns:a16="http://schemas.microsoft.com/office/drawing/2014/main" xmlns="" w="9525">
+                <a14:hiddenLine xmlns="" xmlns:a16="http://schemas.microsoft.com/office/drawing/2014/main" xmlns:p14="http://schemas.microsoft.com/office/powerpoint/2010/main" xmlns:a14="http://schemas.microsoft.com/office/drawing/2010/main" w="9525">
                   <a:solidFill>
                     <a:srgbClr val="000000"/>
                   </a:solidFill>
@@ -35147,7 +35329,7 @@
             </a:ln>
             <a:extLst>
               <a:ext uri="{91240B29-F687-4f45-9708-019B960494DF}">
-                <a14:hiddenLine xmlns:a14="http://schemas.microsoft.com/office/drawing/2010/main" xmlns:p14="http://schemas.microsoft.com/office/powerpoint/2010/main" xmlns:a16="http://schemas.microsoft.com/office/drawing/2014/main" xmlns="" w="9525">
+                <a14:hiddenLine xmlns="" xmlns:a16="http://schemas.microsoft.com/office/drawing/2014/main" xmlns:p14="http://schemas.microsoft.com/office/powerpoint/2010/main" xmlns:a14="http://schemas.microsoft.com/office/drawing/2010/main" w="9525">
                   <a:solidFill>
                     <a:srgbClr val="000000"/>
                   </a:solidFill>
@@ -35259,7 +35441,7 @@
             </a:ln>
             <a:extLst>
               <a:ext uri="{91240B29-F687-4f45-9708-019B960494DF}">
-                <a14:hiddenLine xmlns:a14="http://schemas.microsoft.com/office/drawing/2010/main" xmlns:p14="http://schemas.microsoft.com/office/powerpoint/2010/main" xmlns:a16="http://schemas.microsoft.com/office/drawing/2014/main" xmlns="" w="9525">
+                <a14:hiddenLine xmlns="" xmlns:a16="http://schemas.microsoft.com/office/drawing/2014/main" xmlns:p14="http://schemas.microsoft.com/office/powerpoint/2010/main" xmlns:a14="http://schemas.microsoft.com/office/drawing/2010/main" w="9525">
                   <a:solidFill>
                     <a:srgbClr val="000000"/>
                   </a:solidFill>
@@ -35371,7 +35553,7 @@
             </a:ln>
             <a:extLst>
               <a:ext uri="{91240B29-F687-4f45-9708-019B960494DF}">
-                <a14:hiddenLine xmlns:a14="http://schemas.microsoft.com/office/drawing/2010/main" xmlns:p14="http://schemas.microsoft.com/office/powerpoint/2010/main" xmlns:a16="http://schemas.microsoft.com/office/drawing/2014/main" xmlns="" w="9525">
+                <a14:hiddenLine xmlns="" xmlns:a16="http://schemas.microsoft.com/office/drawing/2014/main" xmlns:p14="http://schemas.microsoft.com/office/powerpoint/2010/main" xmlns:a14="http://schemas.microsoft.com/office/drawing/2010/main" w="9525">
                   <a:solidFill>
                     <a:srgbClr val="000000"/>
                   </a:solidFill>
@@ -35455,7 +35637,7 @@
             </a:ln>
             <a:extLst>
               <a:ext uri="{91240B29-F687-4f45-9708-019B960494DF}">
-                <a14:hiddenLine xmlns:a14="http://schemas.microsoft.com/office/drawing/2010/main" xmlns:p14="http://schemas.microsoft.com/office/powerpoint/2010/main" xmlns:a16="http://schemas.microsoft.com/office/drawing/2014/main" xmlns="" w="9525">
+                <a14:hiddenLine xmlns="" xmlns:a16="http://schemas.microsoft.com/office/drawing/2014/main" xmlns:p14="http://schemas.microsoft.com/office/powerpoint/2010/main" xmlns:a14="http://schemas.microsoft.com/office/drawing/2010/main" w="9525">
                   <a:solidFill>
                     <a:srgbClr val="000000"/>
                   </a:solidFill>
@@ -35587,7 +35769,7 @@
             </a:ln>
             <a:extLst>
               <a:ext uri="{91240B29-F687-4f45-9708-019B960494DF}">
-                <a14:hiddenLine xmlns:a14="http://schemas.microsoft.com/office/drawing/2010/main" xmlns:p14="http://schemas.microsoft.com/office/powerpoint/2010/main" xmlns:a16="http://schemas.microsoft.com/office/drawing/2014/main" xmlns="" w="9525">
+                <a14:hiddenLine xmlns="" xmlns:a16="http://schemas.microsoft.com/office/drawing/2014/main" xmlns:p14="http://schemas.microsoft.com/office/powerpoint/2010/main" xmlns:a14="http://schemas.microsoft.com/office/drawing/2010/main" w="9525">
                   <a:solidFill>
                     <a:srgbClr val="000000"/>
                   </a:solidFill>
@@ -35715,7 +35897,7 @@
             </a:ln>
             <a:extLst>
               <a:ext uri="{91240B29-F687-4f45-9708-019B960494DF}">
-                <a14:hiddenLine xmlns:a14="http://schemas.microsoft.com/office/drawing/2010/main" xmlns:p14="http://schemas.microsoft.com/office/powerpoint/2010/main" xmlns:a16="http://schemas.microsoft.com/office/drawing/2014/main" xmlns="" w="9525">
+                <a14:hiddenLine xmlns="" xmlns:a16="http://schemas.microsoft.com/office/drawing/2014/main" xmlns:p14="http://schemas.microsoft.com/office/powerpoint/2010/main" xmlns:a14="http://schemas.microsoft.com/office/drawing/2010/main" w="9525">
                   <a:solidFill>
                     <a:srgbClr val="000000"/>
                   </a:solidFill>
@@ -35799,7 +35981,7 @@
             </a:ln>
             <a:extLst>
               <a:ext uri="{91240B29-F687-4f45-9708-019B960494DF}">
-                <a14:hiddenLine xmlns:a14="http://schemas.microsoft.com/office/drawing/2010/main" xmlns:p14="http://schemas.microsoft.com/office/powerpoint/2010/main" xmlns:a16="http://schemas.microsoft.com/office/drawing/2014/main" xmlns="" w="9525">
+                <a14:hiddenLine xmlns="" xmlns:a16="http://schemas.microsoft.com/office/drawing/2014/main" xmlns:p14="http://schemas.microsoft.com/office/powerpoint/2010/main" xmlns:a14="http://schemas.microsoft.com/office/drawing/2010/main" w="9525">
                   <a:solidFill>
                     <a:srgbClr val="000000"/>
                   </a:solidFill>
@@ -35883,7 +36065,7 @@
             </a:ln>
             <a:extLst>
               <a:ext uri="{91240B29-F687-4f45-9708-019B960494DF}">
-                <a14:hiddenLine xmlns:a14="http://schemas.microsoft.com/office/drawing/2010/main" xmlns:p14="http://schemas.microsoft.com/office/powerpoint/2010/main" xmlns:a16="http://schemas.microsoft.com/office/drawing/2014/main" xmlns="" w="9525">
+                <a14:hiddenLine xmlns="" xmlns:a16="http://schemas.microsoft.com/office/drawing/2014/main" xmlns:p14="http://schemas.microsoft.com/office/powerpoint/2010/main" xmlns:a14="http://schemas.microsoft.com/office/drawing/2010/main" w="9525">
                   <a:solidFill>
                     <a:srgbClr val="000000"/>
                   </a:solidFill>
@@ -35995,7 +36177,7 @@
             </a:ln>
             <a:extLst>
               <a:ext uri="{91240B29-F687-4f45-9708-019B960494DF}">
-                <a14:hiddenLine xmlns:a14="http://schemas.microsoft.com/office/drawing/2010/main" xmlns:p14="http://schemas.microsoft.com/office/powerpoint/2010/main" xmlns:a16="http://schemas.microsoft.com/office/drawing/2014/main" xmlns="" w="9525">
+                <a14:hiddenLine xmlns="" xmlns:a16="http://schemas.microsoft.com/office/drawing/2014/main" xmlns:p14="http://schemas.microsoft.com/office/powerpoint/2010/main" xmlns:a14="http://schemas.microsoft.com/office/drawing/2010/main" w="9525">
                   <a:solidFill>
                     <a:srgbClr val="000000"/>
                   </a:solidFill>
@@ -36051,7 +36233,7 @@
             </a:ln>
             <a:extLst>
               <a:ext uri="{91240B29-F687-4f45-9708-019B960494DF}">
-                <a14:hiddenLine xmlns:a14="http://schemas.microsoft.com/office/drawing/2010/main" xmlns:p14="http://schemas.microsoft.com/office/powerpoint/2010/main" xmlns:a16="http://schemas.microsoft.com/office/drawing/2014/main" xmlns="" w="9525">
+                <a14:hiddenLine xmlns="" xmlns:a16="http://schemas.microsoft.com/office/drawing/2014/main" xmlns:p14="http://schemas.microsoft.com/office/powerpoint/2010/main" xmlns:a14="http://schemas.microsoft.com/office/drawing/2010/main" w="9525">
                   <a:solidFill>
                     <a:srgbClr val="000000"/>
                   </a:solidFill>
@@ -36138,7 +36320,7 @@
             </a:ln>
             <a:extLst>
               <a:ext uri="{91240B29-F687-4f45-9708-019B960494DF}">
-                <a14:hiddenLine xmlns:a14="http://schemas.microsoft.com/office/drawing/2010/main" xmlns:p14="http://schemas.microsoft.com/office/powerpoint/2010/main" xmlns:a16="http://schemas.microsoft.com/office/drawing/2014/main" xmlns="" w="9525">
+                <a14:hiddenLine xmlns="" xmlns:a16="http://schemas.microsoft.com/office/drawing/2014/main" xmlns:p14="http://schemas.microsoft.com/office/powerpoint/2010/main" xmlns:a14="http://schemas.microsoft.com/office/drawing/2010/main" w="9525">
                   <a:solidFill>
                     <a:srgbClr val="000000"/>
                   </a:solidFill>
@@ -36250,7 +36432,7 @@
             </a:ln>
             <a:extLst>
               <a:ext uri="{91240B29-F687-4f45-9708-019B960494DF}">
-                <a14:hiddenLine xmlns:a14="http://schemas.microsoft.com/office/drawing/2010/main" xmlns:p14="http://schemas.microsoft.com/office/powerpoint/2010/main" xmlns:a16="http://schemas.microsoft.com/office/drawing/2014/main" xmlns="" w="9525">
+                <a14:hiddenLine xmlns="" xmlns:a16="http://schemas.microsoft.com/office/drawing/2014/main" xmlns:p14="http://schemas.microsoft.com/office/powerpoint/2010/main" xmlns:a14="http://schemas.microsoft.com/office/drawing/2010/main" w="9525">
                   <a:solidFill>
                     <a:srgbClr val="000000"/>
                   </a:solidFill>
@@ -36334,7 +36516,7 @@
             </a:ln>
             <a:extLst>
               <a:ext uri="{91240B29-F687-4f45-9708-019B960494DF}">
-                <a14:hiddenLine xmlns:a14="http://schemas.microsoft.com/office/drawing/2010/main" xmlns:p14="http://schemas.microsoft.com/office/powerpoint/2010/main" xmlns:a16="http://schemas.microsoft.com/office/drawing/2014/main" xmlns="" w="9525">
+                <a14:hiddenLine xmlns="" xmlns:a16="http://schemas.microsoft.com/office/drawing/2014/main" xmlns:p14="http://schemas.microsoft.com/office/powerpoint/2010/main" xmlns:a14="http://schemas.microsoft.com/office/drawing/2010/main" w="9525">
                   <a:solidFill>
                     <a:srgbClr val="000000"/>
                   </a:solidFill>
@@ -36446,7 +36628,7 @@
             </a:ln>
             <a:extLst>
               <a:ext uri="{91240B29-F687-4f45-9708-019B960494DF}">
-                <a14:hiddenLine xmlns:a14="http://schemas.microsoft.com/office/drawing/2010/main" xmlns:p14="http://schemas.microsoft.com/office/powerpoint/2010/main" xmlns:a16="http://schemas.microsoft.com/office/drawing/2014/main" xmlns="" w="9525">
+                <a14:hiddenLine xmlns="" xmlns:a16="http://schemas.microsoft.com/office/drawing/2014/main" xmlns:p14="http://schemas.microsoft.com/office/powerpoint/2010/main" xmlns:a14="http://schemas.microsoft.com/office/drawing/2010/main" w="9525">
                   <a:solidFill>
                     <a:srgbClr val="000000"/>
                   </a:solidFill>
@@ -36533,7 +36715,7 @@
             </a:ln>
             <a:extLst>
               <a:ext uri="{91240B29-F687-4f45-9708-019B960494DF}">
-                <a14:hiddenLine xmlns:a14="http://schemas.microsoft.com/office/drawing/2010/main" xmlns:p14="http://schemas.microsoft.com/office/powerpoint/2010/main" xmlns:a16="http://schemas.microsoft.com/office/drawing/2014/main" xmlns="" w="9525">
+                <a14:hiddenLine xmlns="" xmlns:a16="http://schemas.microsoft.com/office/drawing/2014/main" xmlns:p14="http://schemas.microsoft.com/office/powerpoint/2010/main" xmlns:a14="http://schemas.microsoft.com/office/drawing/2010/main" w="9525">
                   <a:solidFill>
                     <a:srgbClr val="000000"/>
                   </a:solidFill>
@@ -36617,7 +36799,7 @@
             </a:ln>
             <a:extLst>
               <a:ext uri="{91240B29-F687-4f45-9708-019B960494DF}">
-                <a14:hiddenLine xmlns:a14="http://schemas.microsoft.com/office/drawing/2010/main" xmlns:p14="http://schemas.microsoft.com/office/powerpoint/2010/main" xmlns:a16="http://schemas.microsoft.com/office/drawing/2014/main" xmlns="" w="9525">
+                <a14:hiddenLine xmlns="" xmlns:a16="http://schemas.microsoft.com/office/drawing/2014/main" xmlns:p14="http://schemas.microsoft.com/office/powerpoint/2010/main" xmlns:a14="http://schemas.microsoft.com/office/drawing/2010/main" w="9525">
                   <a:solidFill>
                     <a:srgbClr val="000000"/>
                   </a:solidFill>
@@ -36729,7 +36911,7 @@
             </a:ln>
             <a:extLst>
               <a:ext uri="{91240B29-F687-4f45-9708-019B960494DF}">
-                <a14:hiddenLine xmlns:a14="http://schemas.microsoft.com/office/drawing/2010/main" xmlns:p14="http://schemas.microsoft.com/office/powerpoint/2010/main" xmlns:a16="http://schemas.microsoft.com/office/drawing/2014/main" xmlns="" w="9525">
+                <a14:hiddenLine xmlns="" xmlns:a16="http://schemas.microsoft.com/office/drawing/2014/main" xmlns:p14="http://schemas.microsoft.com/office/powerpoint/2010/main" xmlns:a14="http://schemas.microsoft.com/office/drawing/2010/main" w="9525">
                   <a:solidFill>
                     <a:srgbClr val="000000"/>
                   </a:solidFill>
@@ -36841,7 +37023,7 @@
             </a:ln>
             <a:extLst>
               <a:ext uri="{91240B29-F687-4f45-9708-019B960494DF}">
-                <a14:hiddenLine xmlns:a14="http://schemas.microsoft.com/office/drawing/2010/main" xmlns:p14="http://schemas.microsoft.com/office/powerpoint/2010/main" xmlns:a16="http://schemas.microsoft.com/office/drawing/2014/main" xmlns="" w="9525">
+                <a14:hiddenLine xmlns="" xmlns:a16="http://schemas.microsoft.com/office/drawing/2014/main" xmlns:p14="http://schemas.microsoft.com/office/powerpoint/2010/main" xmlns:a14="http://schemas.microsoft.com/office/drawing/2010/main" w="9525">
                   <a:solidFill>
                     <a:srgbClr val="000000"/>
                   </a:solidFill>
@@ -36928,7 +37110,7 @@
             </a:ln>
             <a:extLst>
               <a:ext uri="{91240B29-F687-4f45-9708-019B960494DF}">
-                <a14:hiddenLine xmlns:a14="http://schemas.microsoft.com/office/drawing/2010/main" xmlns:p14="http://schemas.microsoft.com/office/powerpoint/2010/main" xmlns:a16="http://schemas.microsoft.com/office/drawing/2014/main" xmlns="" w="9525">
+                <a14:hiddenLine xmlns="" xmlns:a16="http://schemas.microsoft.com/office/drawing/2014/main" xmlns:p14="http://schemas.microsoft.com/office/powerpoint/2010/main" xmlns:a14="http://schemas.microsoft.com/office/drawing/2010/main" w="9525">
                   <a:solidFill>
                     <a:srgbClr val="000000"/>
                   </a:solidFill>
@@ -37070,7 +37252,7 @@
             </a:ln>
             <a:extLst>
               <a:ext uri="{91240B29-F687-4f45-9708-019B960494DF}">
-                <a14:hiddenLine xmlns:a14="http://schemas.microsoft.com/office/drawing/2010/main" xmlns:p14="http://schemas.microsoft.com/office/powerpoint/2010/main" xmlns:a16="http://schemas.microsoft.com/office/drawing/2014/main" xmlns="" w="9525">
+                <a14:hiddenLine xmlns="" xmlns:a16="http://schemas.microsoft.com/office/drawing/2014/main" xmlns:p14="http://schemas.microsoft.com/office/powerpoint/2010/main" xmlns:a14="http://schemas.microsoft.com/office/drawing/2010/main" w="9525">
                   <a:solidFill>
                     <a:srgbClr val="000000"/>
                   </a:solidFill>
@@ -37261,7 +37443,7 @@
             </a:ln>
             <a:extLst>
               <a:ext uri="{91240B29-F687-4f45-9708-019B960494DF}">
-                <a14:hiddenLine xmlns:a14="http://schemas.microsoft.com/office/drawing/2010/main" xmlns:p14="http://schemas.microsoft.com/office/powerpoint/2010/main" xmlns:a16="http://schemas.microsoft.com/office/drawing/2014/main" xmlns="" w="9525">
+                <a14:hiddenLine xmlns="" xmlns:a16="http://schemas.microsoft.com/office/drawing/2014/main" xmlns:p14="http://schemas.microsoft.com/office/powerpoint/2010/main" xmlns:a14="http://schemas.microsoft.com/office/drawing/2010/main" w="9525">
                   <a:solidFill>
                     <a:srgbClr val="000000"/>
                   </a:solidFill>
@@ -37398,7 +37580,7 @@
             </a:ln>
             <a:extLst>
               <a:ext uri="{91240B29-F687-4f45-9708-019B960494DF}">
-                <a14:hiddenLine xmlns:a14="http://schemas.microsoft.com/office/drawing/2010/main" xmlns:p14="http://schemas.microsoft.com/office/powerpoint/2010/main" xmlns:a16="http://schemas.microsoft.com/office/drawing/2014/main" xmlns="" w="9525">
+                <a14:hiddenLine xmlns="" xmlns:a16="http://schemas.microsoft.com/office/drawing/2014/main" xmlns:p14="http://schemas.microsoft.com/office/powerpoint/2010/main" xmlns:a14="http://schemas.microsoft.com/office/drawing/2010/main" w="9525">
                   <a:solidFill>
                     <a:srgbClr val="000000"/>
                   </a:solidFill>
@@ -37510,7 +37692,7 @@
             </a:ln>
             <a:extLst>
               <a:ext uri="{91240B29-F687-4f45-9708-019B960494DF}">
-                <a14:hiddenLine xmlns:a14="http://schemas.microsoft.com/office/drawing/2010/main" xmlns:p14="http://schemas.microsoft.com/office/powerpoint/2010/main" xmlns:a16="http://schemas.microsoft.com/office/drawing/2014/main" xmlns="" w="9525">
+                <a14:hiddenLine xmlns="" xmlns:a16="http://schemas.microsoft.com/office/drawing/2014/main" xmlns:p14="http://schemas.microsoft.com/office/powerpoint/2010/main" xmlns:a14="http://schemas.microsoft.com/office/drawing/2010/main" w="9525">
                   <a:solidFill>
                     <a:srgbClr val="000000"/>
                   </a:solidFill>
@@ -37597,7 +37779,7 @@
             </a:ln>
             <a:extLst>
               <a:ext uri="{91240B29-F687-4f45-9708-019B960494DF}">
-                <a14:hiddenLine xmlns:a14="http://schemas.microsoft.com/office/drawing/2010/main" xmlns:p14="http://schemas.microsoft.com/office/powerpoint/2010/main" xmlns:a16="http://schemas.microsoft.com/office/drawing/2014/main" xmlns="" w="9525">
+                <a14:hiddenLine xmlns="" xmlns:a16="http://schemas.microsoft.com/office/drawing/2014/main" xmlns:p14="http://schemas.microsoft.com/office/powerpoint/2010/main" xmlns:a14="http://schemas.microsoft.com/office/drawing/2010/main" w="9525">
                   <a:solidFill>
                     <a:srgbClr val="000000"/>
                   </a:solidFill>
@@ -37709,7 +37891,7 @@
             </a:ln>
             <a:extLst>
               <a:ext uri="{91240B29-F687-4f45-9708-019B960494DF}">
-                <a14:hiddenLine xmlns:a14="http://schemas.microsoft.com/office/drawing/2010/main" xmlns:p14="http://schemas.microsoft.com/office/powerpoint/2010/main" xmlns:a16="http://schemas.microsoft.com/office/drawing/2014/main" xmlns="" w="9525">
+                <a14:hiddenLine xmlns="" xmlns:a16="http://schemas.microsoft.com/office/drawing/2014/main" xmlns:p14="http://schemas.microsoft.com/office/powerpoint/2010/main" xmlns:a14="http://schemas.microsoft.com/office/drawing/2010/main" w="9525">
                   <a:solidFill>
                     <a:srgbClr val="000000"/>
                   </a:solidFill>
@@ -37799,7 +37981,7 @@
             </a:ln>
             <a:extLst>
               <a:ext uri="{91240B29-F687-4f45-9708-019B960494DF}">
-                <a14:hiddenLine xmlns:a14="http://schemas.microsoft.com/office/drawing/2010/main" xmlns:p14="http://schemas.microsoft.com/office/powerpoint/2010/main" xmlns:a16="http://schemas.microsoft.com/office/drawing/2014/main" xmlns="" w="9525">
+                <a14:hiddenLine xmlns="" xmlns:a16="http://schemas.microsoft.com/office/drawing/2014/main" xmlns:p14="http://schemas.microsoft.com/office/powerpoint/2010/main" xmlns:a14="http://schemas.microsoft.com/office/drawing/2010/main" w="9525">
                   <a:solidFill>
                     <a:srgbClr val="000000"/>
                   </a:solidFill>
@@ -37911,7 +38093,7 @@
             </a:ln>
             <a:extLst>
               <a:ext uri="{91240B29-F687-4f45-9708-019B960494DF}">
-                <a14:hiddenLine xmlns:a14="http://schemas.microsoft.com/office/drawing/2010/main" xmlns:p14="http://schemas.microsoft.com/office/powerpoint/2010/main" xmlns:a16="http://schemas.microsoft.com/office/drawing/2014/main" xmlns="" w="9525">
+                <a14:hiddenLine xmlns="" xmlns:a16="http://schemas.microsoft.com/office/drawing/2014/main" xmlns:p14="http://schemas.microsoft.com/office/powerpoint/2010/main" xmlns:a14="http://schemas.microsoft.com/office/drawing/2010/main" w="9525">
                   <a:solidFill>
                     <a:srgbClr val="000000"/>
                   </a:solidFill>
@@ -38001,7 +38183,7 @@
             </a:ln>
             <a:extLst>
               <a:ext uri="{91240B29-F687-4f45-9708-019B960494DF}">
-                <a14:hiddenLine xmlns:a14="http://schemas.microsoft.com/office/drawing/2010/main" xmlns:p14="http://schemas.microsoft.com/office/powerpoint/2010/main" xmlns:a16="http://schemas.microsoft.com/office/drawing/2014/main" xmlns="" w="9525">
+                <a14:hiddenLine xmlns="" xmlns:a16="http://schemas.microsoft.com/office/drawing/2014/main" xmlns:p14="http://schemas.microsoft.com/office/powerpoint/2010/main" xmlns:a14="http://schemas.microsoft.com/office/drawing/2010/main" w="9525">
                   <a:solidFill>
                     <a:srgbClr val="000000"/>
                   </a:solidFill>
@@ -38113,7 +38295,7 @@
             </a:ln>
             <a:extLst>
               <a:ext uri="{91240B29-F687-4f45-9708-019B960494DF}">
-                <a14:hiddenLine xmlns:a14="http://schemas.microsoft.com/office/drawing/2010/main" xmlns:p14="http://schemas.microsoft.com/office/powerpoint/2010/main" xmlns:a16="http://schemas.microsoft.com/office/drawing/2014/main" xmlns="" w="9525">
+                <a14:hiddenLine xmlns="" xmlns:a16="http://schemas.microsoft.com/office/drawing/2014/main" xmlns:p14="http://schemas.microsoft.com/office/powerpoint/2010/main" xmlns:a14="http://schemas.microsoft.com/office/drawing/2010/main" w="9525">
                   <a:solidFill>
                     <a:srgbClr val="000000"/>
                   </a:solidFill>
@@ -38169,7 +38351,7 @@
             </a:ln>
             <a:extLst>
               <a:ext uri="{91240B29-F687-4f45-9708-019B960494DF}">
-                <a14:hiddenLine xmlns:a14="http://schemas.microsoft.com/office/drawing/2010/main" xmlns:p14="http://schemas.microsoft.com/office/powerpoint/2010/main" xmlns:a16="http://schemas.microsoft.com/office/drawing/2014/main" xmlns="" w="9525">
+                <a14:hiddenLine xmlns="" xmlns:a16="http://schemas.microsoft.com/office/drawing/2014/main" xmlns:p14="http://schemas.microsoft.com/office/powerpoint/2010/main" xmlns:a14="http://schemas.microsoft.com/office/drawing/2010/main" w="9525">
                   <a:solidFill>
                     <a:srgbClr val="000000"/>
                   </a:solidFill>

</xml_diff>